<commit_message>
Adding image to architecture slides
</commit_message>
<xml_diff>
--- a/presentations/02 - Application Architecture.pptx
+++ b/presentations/02 - Application Architecture.pptx
@@ -5,10 +5,10 @@
     <p:sldMasterId id="2147483660" r:id="rId4"/>
   </p:sldMasterIdLst>
   <p:notesMasterIdLst>
-    <p:notesMasterId r:id="rId20"/>
+    <p:notesMasterId r:id="rId30"/>
   </p:notesMasterIdLst>
   <p:handoutMasterIdLst>
-    <p:handoutMasterId r:id="rId21"/>
+    <p:handoutMasterId r:id="rId31"/>
   </p:handoutMasterIdLst>
   <p:sldIdLst>
     <p:sldId id="271" r:id="rId5"/>
@@ -23,9 +23,19 @@
     <p:sldId id="290" r:id="rId14"/>
     <p:sldId id="291" r:id="rId15"/>
     <p:sldId id="292" r:id="rId16"/>
-    <p:sldId id="276" r:id="rId17"/>
-    <p:sldId id="283" r:id="rId18"/>
-    <p:sldId id="269" r:id="rId19"/>
+    <p:sldId id="293" r:id="rId17"/>
+    <p:sldId id="294" r:id="rId18"/>
+    <p:sldId id="295" r:id="rId19"/>
+    <p:sldId id="297" r:id="rId20"/>
+    <p:sldId id="298" r:id="rId21"/>
+    <p:sldId id="299" r:id="rId22"/>
+    <p:sldId id="300" r:id="rId23"/>
+    <p:sldId id="296" r:id="rId24"/>
+    <p:sldId id="301" r:id="rId25"/>
+    <p:sldId id="302" r:id="rId26"/>
+    <p:sldId id="303" r:id="rId27"/>
+    <p:sldId id="304" r:id="rId28"/>
+    <p:sldId id="269" r:id="rId29"/>
   </p:sldIdLst>
   <p:sldSz cx="12192000" cy="6858000"/>
   <p:notesSz cx="6858000" cy="9144000"/>
@@ -1043,16 +1053,42 @@
             <p:ph type="sldImg"/>
           </p:nvPr>
         </p:nvSpPr>
+        <p:spPr>
+          <a:xfrm>
+            <a:off x="381000" y="685800"/>
+            <a:ext cx="6096000" cy="3429000"/>
+          </a:xfrm>
+        </p:spPr>
+      </p:sp>
+      <p:sp>
+        <p:nvSpPr>
+          <p:cNvPr id="3" name="Notes Placeholder 2"/>
+          <p:cNvSpPr>
+            <a:spLocks noGrp="1"/>
+          </p:cNvSpPr>
+          <p:nvPr>
+            <p:ph type="body" idx="1"/>
+          </p:nvPr>
+        </p:nvSpPr>
         <p:spPr/>
-      </p:sp>
-      <p:sp>
-        <p:nvSpPr>
-          <p:cNvPr id="3" name="Notes Placeholder 2"/>
+        <p:txBody>
+          <a:bodyPr>
+            <a:normAutofit/>
+          </a:bodyPr>
+          <a:lstStyle/>
+          <a:p>
+            <a:endParaRPr lang="en-CA" b="0" dirty="0" smtClean="0"/>
+          </a:p>
+        </p:txBody>
+      </p:sp>
+      <p:sp>
+        <p:nvSpPr>
+          <p:cNvPr id="4" name="Slide Number Placeholder 3"/>
           <p:cNvSpPr>
             <a:spLocks noGrp="1"/>
           </p:cNvSpPr>
           <p:nvPr>
-            <p:ph type="body" idx="1"/>
+            <p:ph type="sldNum" sz="quarter" idx="10"/>
           </p:nvPr>
         </p:nvSpPr>
         <p:spPr/>
@@ -1060,37 +1096,19 @@
           <a:bodyPr/>
           <a:lstStyle/>
           <a:p>
-            <a:endParaRPr lang="en-US"/>
-          </a:p>
-        </p:txBody>
-      </p:sp>
-      <p:sp>
-        <p:nvSpPr>
-          <p:cNvPr id="4" name="Slide Number Placeholder 3"/>
-          <p:cNvSpPr>
-            <a:spLocks noGrp="1"/>
-          </p:cNvSpPr>
-          <p:nvPr>
-            <p:ph type="sldNum" sz="quarter" idx="10"/>
-          </p:nvPr>
-        </p:nvSpPr>
-        <p:spPr/>
-        <p:txBody>
-          <a:bodyPr/>
-          <a:lstStyle/>
-          <a:p>
-            <a:fld id="{4CFD207A-07DF-40AD-A916-9872E089CE7A}" type="slidenum">
+            <a:fld id="{13F0F35F-DD44-4607-AEC1-49D7A4BC4066}" type="slidenum">
               <a:rPr lang="en-US" smtClean="0"/>
+              <a:pPr/>
               <a:t>13</a:t>
             </a:fld>
-            <a:endParaRPr lang="en-US"/>
+            <a:endParaRPr lang="en-US" dirty="0"/>
           </a:p>
         </p:txBody>
       </p:sp>
     </p:spTree>
     <p:extLst>
       <p:ext uri="{BB962C8B-B14F-4D97-AF65-F5344CB8AC3E}">
-        <p14:creationId xmlns:p14="http://schemas.microsoft.com/office/powerpoint/2010/main" val="3925211110"/>
+        <p14:creationId xmlns:p14="http://schemas.microsoft.com/office/powerpoint/2010/main" val="2911304509"/>
       </p:ext>
     </p:extLst>
   </p:cSld>
@@ -1127,16 +1145,42 @@
             <p:ph type="sldImg"/>
           </p:nvPr>
         </p:nvSpPr>
+        <p:spPr>
+          <a:xfrm>
+            <a:off x="381000" y="685800"/>
+            <a:ext cx="6096000" cy="3429000"/>
+          </a:xfrm>
+        </p:spPr>
+      </p:sp>
+      <p:sp>
+        <p:nvSpPr>
+          <p:cNvPr id="3" name="Notes Placeholder 2"/>
+          <p:cNvSpPr>
+            <a:spLocks noGrp="1"/>
+          </p:cNvSpPr>
+          <p:nvPr>
+            <p:ph type="body" idx="1"/>
+          </p:nvPr>
+        </p:nvSpPr>
         <p:spPr/>
-      </p:sp>
-      <p:sp>
-        <p:nvSpPr>
-          <p:cNvPr id="3" name="Notes Placeholder 2"/>
+        <p:txBody>
+          <a:bodyPr>
+            <a:normAutofit/>
+          </a:bodyPr>
+          <a:lstStyle/>
+          <a:p>
+            <a:endParaRPr lang="en-CA" b="0" dirty="0" smtClean="0"/>
+          </a:p>
+        </p:txBody>
+      </p:sp>
+      <p:sp>
+        <p:nvSpPr>
+          <p:cNvPr id="4" name="Slide Number Placeholder 3"/>
           <p:cNvSpPr>
             <a:spLocks noGrp="1"/>
           </p:cNvSpPr>
           <p:nvPr>
-            <p:ph type="body" idx="1"/>
+            <p:ph type="sldNum" sz="quarter" idx="10"/>
           </p:nvPr>
         </p:nvSpPr>
         <p:spPr/>
@@ -1144,37 +1188,479 @@
           <a:bodyPr/>
           <a:lstStyle/>
           <a:p>
-            <a:endParaRPr lang="en-US"/>
-          </a:p>
-        </p:txBody>
-      </p:sp>
-      <p:sp>
-        <p:nvSpPr>
-          <p:cNvPr id="4" name="Slide Number Placeholder 3"/>
-          <p:cNvSpPr>
-            <a:spLocks noGrp="1"/>
-          </p:cNvSpPr>
-          <p:nvPr>
-            <p:ph type="sldNum" sz="quarter" idx="10"/>
-          </p:nvPr>
-        </p:nvSpPr>
-        <p:spPr/>
-        <p:txBody>
-          <a:bodyPr/>
-          <a:lstStyle/>
-          <a:p>
-            <a:fld id="{4CFD207A-07DF-40AD-A916-9872E089CE7A}" type="slidenum">
+            <a:fld id="{13F0F35F-DD44-4607-AEC1-49D7A4BC4066}" type="slidenum">
               <a:rPr lang="en-US" smtClean="0"/>
+              <a:pPr/>
               <a:t>14</a:t>
             </a:fld>
-            <a:endParaRPr lang="en-US"/>
+            <a:endParaRPr lang="en-US" dirty="0"/>
           </a:p>
         </p:txBody>
       </p:sp>
     </p:spTree>
     <p:extLst>
       <p:ext uri="{BB962C8B-B14F-4D97-AF65-F5344CB8AC3E}">
-        <p14:creationId xmlns:p14="http://schemas.microsoft.com/office/powerpoint/2010/main" val="1260161593"/>
+        <p14:creationId xmlns:p14="http://schemas.microsoft.com/office/powerpoint/2010/main" val="2911304509"/>
+      </p:ext>
+    </p:extLst>
+  </p:cSld>
+  <p:clrMapOvr>
+    <a:masterClrMapping/>
+  </p:clrMapOvr>
+</p:notes>
+</file>
+
+<file path=ppt/notesSlides/notesSlide15.xml><?xml version="1.0" encoding="utf-8"?>
+<p:notes xmlns:a="http://schemas.openxmlformats.org/drawingml/2006/main" xmlns:r="http://schemas.openxmlformats.org/officeDocument/2006/relationships" xmlns:p="http://schemas.openxmlformats.org/presentationml/2006/main">
+  <p:cSld>
+    <p:spTree>
+      <p:nvGrpSpPr>
+        <p:cNvPr id="1" name=""/>
+        <p:cNvGrpSpPr/>
+        <p:nvPr/>
+      </p:nvGrpSpPr>
+      <p:grpSpPr>
+        <a:xfrm>
+          <a:off x="0" y="0"/>
+          <a:ext cx="0" cy="0"/>
+          <a:chOff x="0" y="0"/>
+          <a:chExt cx="0" cy="0"/>
+        </a:xfrm>
+      </p:grpSpPr>
+      <p:sp>
+        <p:nvSpPr>
+          <p:cNvPr id="2" name="Slide Image Placeholder 1"/>
+          <p:cNvSpPr>
+            <a:spLocks noGrp="1" noRot="1" noChangeAspect="1"/>
+          </p:cNvSpPr>
+          <p:nvPr>
+            <p:ph type="sldImg"/>
+          </p:nvPr>
+        </p:nvSpPr>
+        <p:spPr>
+          <a:xfrm>
+            <a:off x="381000" y="685800"/>
+            <a:ext cx="6096000" cy="3429000"/>
+          </a:xfrm>
+        </p:spPr>
+      </p:sp>
+      <p:sp>
+        <p:nvSpPr>
+          <p:cNvPr id="3" name="Notes Placeholder 2"/>
+          <p:cNvSpPr>
+            <a:spLocks noGrp="1"/>
+          </p:cNvSpPr>
+          <p:nvPr>
+            <p:ph type="body" idx="1"/>
+          </p:nvPr>
+        </p:nvSpPr>
+        <p:spPr/>
+        <p:txBody>
+          <a:bodyPr>
+            <a:normAutofit/>
+          </a:bodyPr>
+          <a:lstStyle/>
+          <a:p>
+            <a:endParaRPr lang="en-CA" b="0" dirty="0" smtClean="0"/>
+          </a:p>
+        </p:txBody>
+      </p:sp>
+      <p:sp>
+        <p:nvSpPr>
+          <p:cNvPr id="4" name="Slide Number Placeholder 3"/>
+          <p:cNvSpPr>
+            <a:spLocks noGrp="1"/>
+          </p:cNvSpPr>
+          <p:nvPr>
+            <p:ph type="sldNum" sz="quarter" idx="10"/>
+          </p:nvPr>
+        </p:nvSpPr>
+        <p:spPr/>
+        <p:txBody>
+          <a:bodyPr/>
+          <a:lstStyle/>
+          <a:p>
+            <a:fld id="{13F0F35F-DD44-4607-AEC1-49D7A4BC4066}" type="slidenum">
+              <a:rPr lang="en-US" smtClean="0"/>
+              <a:pPr/>
+              <a:t>15</a:t>
+            </a:fld>
+            <a:endParaRPr lang="en-US" dirty="0"/>
+          </a:p>
+        </p:txBody>
+      </p:sp>
+    </p:spTree>
+    <p:extLst>
+      <p:ext uri="{BB962C8B-B14F-4D97-AF65-F5344CB8AC3E}">
+        <p14:creationId xmlns:p14="http://schemas.microsoft.com/office/powerpoint/2010/main" val="2911304509"/>
+      </p:ext>
+    </p:extLst>
+  </p:cSld>
+  <p:clrMapOvr>
+    <a:masterClrMapping/>
+  </p:clrMapOvr>
+</p:notes>
+</file>
+
+<file path=ppt/notesSlides/notesSlide16.xml><?xml version="1.0" encoding="utf-8"?>
+<p:notes xmlns:a="http://schemas.openxmlformats.org/drawingml/2006/main" xmlns:r="http://schemas.openxmlformats.org/officeDocument/2006/relationships" xmlns:p="http://schemas.openxmlformats.org/presentationml/2006/main">
+  <p:cSld>
+    <p:spTree>
+      <p:nvGrpSpPr>
+        <p:cNvPr id="1" name=""/>
+        <p:cNvGrpSpPr/>
+        <p:nvPr/>
+      </p:nvGrpSpPr>
+      <p:grpSpPr>
+        <a:xfrm>
+          <a:off x="0" y="0"/>
+          <a:ext cx="0" cy="0"/>
+          <a:chOff x="0" y="0"/>
+          <a:chExt cx="0" cy="0"/>
+        </a:xfrm>
+      </p:grpSpPr>
+      <p:sp>
+        <p:nvSpPr>
+          <p:cNvPr id="2" name="Slide Image Placeholder 1"/>
+          <p:cNvSpPr>
+            <a:spLocks noGrp="1" noRot="1" noChangeAspect="1"/>
+          </p:cNvSpPr>
+          <p:nvPr>
+            <p:ph type="sldImg"/>
+          </p:nvPr>
+        </p:nvSpPr>
+        <p:spPr>
+          <a:xfrm>
+            <a:off x="381000" y="685800"/>
+            <a:ext cx="6096000" cy="3429000"/>
+          </a:xfrm>
+        </p:spPr>
+      </p:sp>
+      <p:sp>
+        <p:nvSpPr>
+          <p:cNvPr id="3" name="Notes Placeholder 2"/>
+          <p:cNvSpPr>
+            <a:spLocks noGrp="1"/>
+          </p:cNvSpPr>
+          <p:nvPr>
+            <p:ph type="body" idx="1"/>
+          </p:nvPr>
+        </p:nvSpPr>
+        <p:spPr/>
+        <p:txBody>
+          <a:bodyPr>
+            <a:normAutofit/>
+          </a:bodyPr>
+          <a:lstStyle/>
+          <a:p>
+            <a:endParaRPr lang="en-CA" b="0" dirty="0" smtClean="0"/>
+          </a:p>
+        </p:txBody>
+      </p:sp>
+      <p:sp>
+        <p:nvSpPr>
+          <p:cNvPr id="4" name="Slide Number Placeholder 3"/>
+          <p:cNvSpPr>
+            <a:spLocks noGrp="1"/>
+          </p:cNvSpPr>
+          <p:nvPr>
+            <p:ph type="sldNum" sz="quarter" idx="10"/>
+          </p:nvPr>
+        </p:nvSpPr>
+        <p:spPr/>
+        <p:txBody>
+          <a:bodyPr/>
+          <a:lstStyle/>
+          <a:p>
+            <a:fld id="{13F0F35F-DD44-4607-AEC1-49D7A4BC4066}" type="slidenum">
+              <a:rPr lang="en-US" smtClean="0"/>
+              <a:pPr/>
+              <a:t>16</a:t>
+            </a:fld>
+            <a:endParaRPr lang="en-US" dirty="0"/>
+          </a:p>
+        </p:txBody>
+      </p:sp>
+    </p:spTree>
+    <p:extLst>
+      <p:ext uri="{BB962C8B-B14F-4D97-AF65-F5344CB8AC3E}">
+        <p14:creationId xmlns:p14="http://schemas.microsoft.com/office/powerpoint/2010/main" val="2911304509"/>
+      </p:ext>
+    </p:extLst>
+  </p:cSld>
+  <p:clrMapOvr>
+    <a:masterClrMapping/>
+  </p:clrMapOvr>
+</p:notes>
+</file>
+
+<file path=ppt/notesSlides/notesSlide17.xml><?xml version="1.0" encoding="utf-8"?>
+<p:notes xmlns:a="http://schemas.openxmlformats.org/drawingml/2006/main" xmlns:r="http://schemas.openxmlformats.org/officeDocument/2006/relationships" xmlns:p="http://schemas.openxmlformats.org/presentationml/2006/main">
+  <p:cSld>
+    <p:spTree>
+      <p:nvGrpSpPr>
+        <p:cNvPr id="1" name=""/>
+        <p:cNvGrpSpPr/>
+        <p:nvPr/>
+      </p:nvGrpSpPr>
+      <p:grpSpPr>
+        <a:xfrm>
+          <a:off x="0" y="0"/>
+          <a:ext cx="0" cy="0"/>
+          <a:chOff x="0" y="0"/>
+          <a:chExt cx="0" cy="0"/>
+        </a:xfrm>
+      </p:grpSpPr>
+      <p:sp>
+        <p:nvSpPr>
+          <p:cNvPr id="2" name="Slide Image Placeholder 1"/>
+          <p:cNvSpPr>
+            <a:spLocks noGrp="1" noRot="1" noChangeAspect="1"/>
+          </p:cNvSpPr>
+          <p:nvPr>
+            <p:ph type="sldImg"/>
+          </p:nvPr>
+        </p:nvSpPr>
+        <p:spPr>
+          <a:xfrm>
+            <a:off x="381000" y="685800"/>
+            <a:ext cx="6096000" cy="3429000"/>
+          </a:xfrm>
+        </p:spPr>
+      </p:sp>
+      <p:sp>
+        <p:nvSpPr>
+          <p:cNvPr id="3" name="Notes Placeholder 2"/>
+          <p:cNvSpPr>
+            <a:spLocks noGrp="1"/>
+          </p:cNvSpPr>
+          <p:nvPr>
+            <p:ph type="body" idx="1"/>
+          </p:nvPr>
+        </p:nvSpPr>
+        <p:spPr/>
+        <p:txBody>
+          <a:bodyPr>
+            <a:normAutofit/>
+          </a:bodyPr>
+          <a:lstStyle/>
+          <a:p>
+            <a:endParaRPr lang="en-CA" b="0" dirty="0" smtClean="0"/>
+          </a:p>
+        </p:txBody>
+      </p:sp>
+      <p:sp>
+        <p:nvSpPr>
+          <p:cNvPr id="4" name="Slide Number Placeholder 3"/>
+          <p:cNvSpPr>
+            <a:spLocks noGrp="1"/>
+          </p:cNvSpPr>
+          <p:nvPr>
+            <p:ph type="sldNum" sz="quarter" idx="10"/>
+          </p:nvPr>
+        </p:nvSpPr>
+        <p:spPr/>
+        <p:txBody>
+          <a:bodyPr/>
+          <a:lstStyle/>
+          <a:p>
+            <a:fld id="{13F0F35F-DD44-4607-AEC1-49D7A4BC4066}" type="slidenum">
+              <a:rPr lang="en-US" smtClean="0"/>
+              <a:pPr/>
+              <a:t>17</a:t>
+            </a:fld>
+            <a:endParaRPr lang="en-US" dirty="0"/>
+          </a:p>
+        </p:txBody>
+      </p:sp>
+    </p:spTree>
+    <p:extLst>
+      <p:ext uri="{BB962C8B-B14F-4D97-AF65-F5344CB8AC3E}">
+        <p14:creationId xmlns:p14="http://schemas.microsoft.com/office/powerpoint/2010/main" val="2911304509"/>
+      </p:ext>
+    </p:extLst>
+  </p:cSld>
+  <p:clrMapOvr>
+    <a:masterClrMapping/>
+  </p:clrMapOvr>
+</p:notes>
+</file>
+
+<file path=ppt/notesSlides/notesSlide18.xml><?xml version="1.0" encoding="utf-8"?>
+<p:notes xmlns:a="http://schemas.openxmlformats.org/drawingml/2006/main" xmlns:r="http://schemas.openxmlformats.org/officeDocument/2006/relationships" xmlns:p="http://schemas.openxmlformats.org/presentationml/2006/main">
+  <p:cSld>
+    <p:spTree>
+      <p:nvGrpSpPr>
+        <p:cNvPr id="1" name=""/>
+        <p:cNvGrpSpPr/>
+        <p:nvPr/>
+      </p:nvGrpSpPr>
+      <p:grpSpPr>
+        <a:xfrm>
+          <a:off x="0" y="0"/>
+          <a:ext cx="0" cy="0"/>
+          <a:chOff x="0" y="0"/>
+          <a:chExt cx="0" cy="0"/>
+        </a:xfrm>
+      </p:grpSpPr>
+      <p:sp>
+        <p:nvSpPr>
+          <p:cNvPr id="2" name="Slide Image Placeholder 1"/>
+          <p:cNvSpPr>
+            <a:spLocks noGrp="1" noRot="1" noChangeAspect="1"/>
+          </p:cNvSpPr>
+          <p:nvPr>
+            <p:ph type="sldImg"/>
+          </p:nvPr>
+        </p:nvSpPr>
+        <p:spPr>
+          <a:xfrm>
+            <a:off x="381000" y="685800"/>
+            <a:ext cx="6096000" cy="3429000"/>
+          </a:xfrm>
+        </p:spPr>
+      </p:sp>
+      <p:sp>
+        <p:nvSpPr>
+          <p:cNvPr id="3" name="Notes Placeholder 2"/>
+          <p:cNvSpPr>
+            <a:spLocks noGrp="1"/>
+          </p:cNvSpPr>
+          <p:nvPr>
+            <p:ph type="body" idx="1"/>
+          </p:nvPr>
+        </p:nvSpPr>
+        <p:spPr/>
+        <p:txBody>
+          <a:bodyPr>
+            <a:normAutofit/>
+          </a:bodyPr>
+          <a:lstStyle/>
+          <a:p>
+            <a:endParaRPr lang="en-CA" b="0" dirty="0" smtClean="0"/>
+          </a:p>
+        </p:txBody>
+      </p:sp>
+      <p:sp>
+        <p:nvSpPr>
+          <p:cNvPr id="4" name="Slide Number Placeholder 3"/>
+          <p:cNvSpPr>
+            <a:spLocks noGrp="1"/>
+          </p:cNvSpPr>
+          <p:nvPr>
+            <p:ph type="sldNum" sz="quarter" idx="10"/>
+          </p:nvPr>
+        </p:nvSpPr>
+        <p:spPr/>
+        <p:txBody>
+          <a:bodyPr/>
+          <a:lstStyle/>
+          <a:p>
+            <a:fld id="{13F0F35F-DD44-4607-AEC1-49D7A4BC4066}" type="slidenum">
+              <a:rPr lang="en-US" smtClean="0"/>
+              <a:pPr/>
+              <a:t>18</a:t>
+            </a:fld>
+            <a:endParaRPr lang="en-US" dirty="0"/>
+          </a:p>
+        </p:txBody>
+      </p:sp>
+    </p:spTree>
+    <p:extLst>
+      <p:ext uri="{BB962C8B-B14F-4D97-AF65-F5344CB8AC3E}">
+        <p14:creationId xmlns:p14="http://schemas.microsoft.com/office/powerpoint/2010/main" val="2911304509"/>
+      </p:ext>
+    </p:extLst>
+  </p:cSld>
+  <p:clrMapOvr>
+    <a:masterClrMapping/>
+  </p:clrMapOvr>
+</p:notes>
+</file>
+
+<file path=ppt/notesSlides/notesSlide19.xml><?xml version="1.0" encoding="utf-8"?>
+<p:notes xmlns:a="http://schemas.openxmlformats.org/drawingml/2006/main" xmlns:r="http://schemas.openxmlformats.org/officeDocument/2006/relationships" xmlns:p="http://schemas.openxmlformats.org/presentationml/2006/main">
+  <p:cSld>
+    <p:spTree>
+      <p:nvGrpSpPr>
+        <p:cNvPr id="1" name=""/>
+        <p:cNvGrpSpPr/>
+        <p:nvPr/>
+      </p:nvGrpSpPr>
+      <p:grpSpPr>
+        <a:xfrm>
+          <a:off x="0" y="0"/>
+          <a:ext cx="0" cy="0"/>
+          <a:chOff x="0" y="0"/>
+          <a:chExt cx="0" cy="0"/>
+        </a:xfrm>
+      </p:grpSpPr>
+      <p:sp>
+        <p:nvSpPr>
+          <p:cNvPr id="2" name="Slide Image Placeholder 1"/>
+          <p:cNvSpPr>
+            <a:spLocks noGrp="1" noRot="1" noChangeAspect="1"/>
+          </p:cNvSpPr>
+          <p:nvPr>
+            <p:ph type="sldImg"/>
+          </p:nvPr>
+        </p:nvSpPr>
+        <p:spPr>
+          <a:xfrm>
+            <a:off x="381000" y="685800"/>
+            <a:ext cx="6096000" cy="3429000"/>
+          </a:xfrm>
+        </p:spPr>
+      </p:sp>
+      <p:sp>
+        <p:nvSpPr>
+          <p:cNvPr id="3" name="Notes Placeholder 2"/>
+          <p:cNvSpPr>
+            <a:spLocks noGrp="1"/>
+          </p:cNvSpPr>
+          <p:nvPr>
+            <p:ph type="body" idx="1"/>
+          </p:nvPr>
+        </p:nvSpPr>
+        <p:spPr/>
+        <p:txBody>
+          <a:bodyPr>
+            <a:normAutofit/>
+          </a:bodyPr>
+          <a:lstStyle/>
+          <a:p>
+            <a:endParaRPr lang="en-CA" b="0" dirty="0" smtClean="0"/>
+          </a:p>
+        </p:txBody>
+      </p:sp>
+      <p:sp>
+        <p:nvSpPr>
+          <p:cNvPr id="4" name="Slide Number Placeholder 3"/>
+          <p:cNvSpPr>
+            <a:spLocks noGrp="1"/>
+          </p:cNvSpPr>
+          <p:nvPr>
+            <p:ph type="sldNum" sz="quarter" idx="10"/>
+          </p:nvPr>
+        </p:nvSpPr>
+        <p:spPr/>
+        <p:txBody>
+          <a:bodyPr/>
+          <a:lstStyle/>
+          <a:p>
+            <a:fld id="{13F0F35F-DD44-4607-AEC1-49D7A4BC4066}" type="slidenum">
+              <a:rPr lang="en-US" smtClean="0"/>
+              <a:pPr/>
+              <a:t>19</a:t>
+            </a:fld>
+            <a:endParaRPr lang="en-US" dirty="0"/>
+          </a:p>
+        </p:txBody>
+      </p:sp>
+    </p:spTree>
+    <p:extLst>
+      <p:ext uri="{BB962C8B-B14F-4D97-AF65-F5344CB8AC3E}">
+        <p14:creationId xmlns:p14="http://schemas.microsoft.com/office/powerpoint/2010/main" val="2911304509"/>
       </p:ext>
     </p:extLst>
   </p:cSld>
@@ -1260,6 +1746,466 @@
     <p:extLst>
       <p:ext uri="{BB962C8B-B14F-4D97-AF65-F5344CB8AC3E}">
         <p14:creationId xmlns:p14="http://schemas.microsoft.com/office/powerpoint/2010/main" val="2595756465"/>
+      </p:ext>
+    </p:extLst>
+  </p:cSld>
+  <p:clrMapOvr>
+    <a:masterClrMapping/>
+  </p:clrMapOvr>
+</p:notes>
+</file>
+
+<file path=ppt/notesSlides/notesSlide20.xml><?xml version="1.0" encoding="utf-8"?>
+<p:notes xmlns:a="http://schemas.openxmlformats.org/drawingml/2006/main" xmlns:r="http://schemas.openxmlformats.org/officeDocument/2006/relationships" xmlns:p="http://schemas.openxmlformats.org/presentationml/2006/main">
+  <p:cSld>
+    <p:spTree>
+      <p:nvGrpSpPr>
+        <p:cNvPr id="1" name=""/>
+        <p:cNvGrpSpPr/>
+        <p:nvPr/>
+      </p:nvGrpSpPr>
+      <p:grpSpPr>
+        <a:xfrm>
+          <a:off x="0" y="0"/>
+          <a:ext cx="0" cy="0"/>
+          <a:chOff x="0" y="0"/>
+          <a:chExt cx="0" cy="0"/>
+        </a:xfrm>
+      </p:grpSpPr>
+      <p:sp>
+        <p:nvSpPr>
+          <p:cNvPr id="2" name="Slide Image Placeholder 1"/>
+          <p:cNvSpPr>
+            <a:spLocks noGrp="1" noRot="1" noChangeAspect="1"/>
+          </p:cNvSpPr>
+          <p:nvPr>
+            <p:ph type="sldImg"/>
+          </p:nvPr>
+        </p:nvSpPr>
+        <p:spPr>
+          <a:xfrm>
+            <a:off x="381000" y="685800"/>
+            <a:ext cx="6096000" cy="3429000"/>
+          </a:xfrm>
+        </p:spPr>
+      </p:sp>
+      <p:sp>
+        <p:nvSpPr>
+          <p:cNvPr id="3" name="Notes Placeholder 2"/>
+          <p:cNvSpPr>
+            <a:spLocks noGrp="1"/>
+          </p:cNvSpPr>
+          <p:nvPr>
+            <p:ph type="body" idx="1"/>
+          </p:nvPr>
+        </p:nvSpPr>
+        <p:spPr/>
+        <p:txBody>
+          <a:bodyPr>
+            <a:normAutofit/>
+          </a:bodyPr>
+          <a:lstStyle/>
+          <a:p>
+            <a:endParaRPr lang="en-CA" b="0" dirty="0" smtClean="0"/>
+          </a:p>
+        </p:txBody>
+      </p:sp>
+      <p:sp>
+        <p:nvSpPr>
+          <p:cNvPr id="4" name="Slide Number Placeholder 3"/>
+          <p:cNvSpPr>
+            <a:spLocks noGrp="1"/>
+          </p:cNvSpPr>
+          <p:nvPr>
+            <p:ph type="sldNum" sz="quarter" idx="10"/>
+          </p:nvPr>
+        </p:nvSpPr>
+        <p:spPr/>
+        <p:txBody>
+          <a:bodyPr/>
+          <a:lstStyle/>
+          <a:p>
+            <a:fld id="{13F0F35F-DD44-4607-AEC1-49D7A4BC4066}" type="slidenum">
+              <a:rPr lang="en-US" smtClean="0"/>
+              <a:pPr/>
+              <a:t>20</a:t>
+            </a:fld>
+            <a:endParaRPr lang="en-US" dirty="0"/>
+          </a:p>
+        </p:txBody>
+      </p:sp>
+    </p:spTree>
+    <p:extLst>
+      <p:ext uri="{BB962C8B-B14F-4D97-AF65-F5344CB8AC3E}">
+        <p14:creationId xmlns:p14="http://schemas.microsoft.com/office/powerpoint/2010/main" val="2911304509"/>
+      </p:ext>
+    </p:extLst>
+  </p:cSld>
+  <p:clrMapOvr>
+    <a:masterClrMapping/>
+  </p:clrMapOvr>
+</p:notes>
+</file>
+
+<file path=ppt/notesSlides/notesSlide21.xml><?xml version="1.0" encoding="utf-8"?>
+<p:notes xmlns:a="http://schemas.openxmlformats.org/drawingml/2006/main" xmlns:r="http://schemas.openxmlformats.org/officeDocument/2006/relationships" xmlns:p="http://schemas.openxmlformats.org/presentationml/2006/main">
+  <p:cSld>
+    <p:spTree>
+      <p:nvGrpSpPr>
+        <p:cNvPr id="1" name=""/>
+        <p:cNvGrpSpPr/>
+        <p:nvPr/>
+      </p:nvGrpSpPr>
+      <p:grpSpPr>
+        <a:xfrm>
+          <a:off x="0" y="0"/>
+          <a:ext cx="0" cy="0"/>
+          <a:chOff x="0" y="0"/>
+          <a:chExt cx="0" cy="0"/>
+        </a:xfrm>
+      </p:grpSpPr>
+      <p:sp>
+        <p:nvSpPr>
+          <p:cNvPr id="2" name="Slide Image Placeholder 1"/>
+          <p:cNvSpPr>
+            <a:spLocks noGrp="1" noRot="1" noChangeAspect="1"/>
+          </p:cNvSpPr>
+          <p:nvPr>
+            <p:ph type="sldImg"/>
+          </p:nvPr>
+        </p:nvSpPr>
+        <p:spPr>
+          <a:xfrm>
+            <a:off x="381000" y="685800"/>
+            <a:ext cx="6096000" cy="3429000"/>
+          </a:xfrm>
+        </p:spPr>
+      </p:sp>
+      <p:sp>
+        <p:nvSpPr>
+          <p:cNvPr id="3" name="Notes Placeholder 2"/>
+          <p:cNvSpPr>
+            <a:spLocks noGrp="1"/>
+          </p:cNvSpPr>
+          <p:nvPr>
+            <p:ph type="body" idx="1"/>
+          </p:nvPr>
+        </p:nvSpPr>
+        <p:spPr/>
+        <p:txBody>
+          <a:bodyPr>
+            <a:normAutofit/>
+          </a:bodyPr>
+          <a:lstStyle/>
+          <a:p>
+            <a:endParaRPr lang="en-CA" b="0" dirty="0" smtClean="0"/>
+          </a:p>
+        </p:txBody>
+      </p:sp>
+      <p:sp>
+        <p:nvSpPr>
+          <p:cNvPr id="4" name="Slide Number Placeholder 3"/>
+          <p:cNvSpPr>
+            <a:spLocks noGrp="1"/>
+          </p:cNvSpPr>
+          <p:nvPr>
+            <p:ph type="sldNum" sz="quarter" idx="10"/>
+          </p:nvPr>
+        </p:nvSpPr>
+        <p:spPr/>
+        <p:txBody>
+          <a:bodyPr/>
+          <a:lstStyle/>
+          <a:p>
+            <a:fld id="{13F0F35F-DD44-4607-AEC1-49D7A4BC4066}" type="slidenum">
+              <a:rPr lang="en-US" smtClean="0"/>
+              <a:pPr/>
+              <a:t>21</a:t>
+            </a:fld>
+            <a:endParaRPr lang="en-US" dirty="0"/>
+          </a:p>
+        </p:txBody>
+      </p:sp>
+    </p:spTree>
+    <p:extLst>
+      <p:ext uri="{BB962C8B-B14F-4D97-AF65-F5344CB8AC3E}">
+        <p14:creationId xmlns:p14="http://schemas.microsoft.com/office/powerpoint/2010/main" val="2911304509"/>
+      </p:ext>
+    </p:extLst>
+  </p:cSld>
+  <p:clrMapOvr>
+    <a:masterClrMapping/>
+  </p:clrMapOvr>
+</p:notes>
+</file>
+
+<file path=ppt/notesSlides/notesSlide22.xml><?xml version="1.0" encoding="utf-8"?>
+<p:notes xmlns:a="http://schemas.openxmlformats.org/drawingml/2006/main" xmlns:r="http://schemas.openxmlformats.org/officeDocument/2006/relationships" xmlns:p="http://schemas.openxmlformats.org/presentationml/2006/main">
+  <p:cSld>
+    <p:spTree>
+      <p:nvGrpSpPr>
+        <p:cNvPr id="1" name=""/>
+        <p:cNvGrpSpPr/>
+        <p:nvPr/>
+      </p:nvGrpSpPr>
+      <p:grpSpPr>
+        <a:xfrm>
+          <a:off x="0" y="0"/>
+          <a:ext cx="0" cy="0"/>
+          <a:chOff x="0" y="0"/>
+          <a:chExt cx="0" cy="0"/>
+        </a:xfrm>
+      </p:grpSpPr>
+      <p:sp>
+        <p:nvSpPr>
+          <p:cNvPr id="2" name="Slide Image Placeholder 1"/>
+          <p:cNvSpPr>
+            <a:spLocks noGrp="1" noRot="1" noChangeAspect="1"/>
+          </p:cNvSpPr>
+          <p:nvPr>
+            <p:ph type="sldImg"/>
+          </p:nvPr>
+        </p:nvSpPr>
+        <p:spPr>
+          <a:xfrm>
+            <a:off x="381000" y="685800"/>
+            <a:ext cx="6096000" cy="3429000"/>
+          </a:xfrm>
+        </p:spPr>
+      </p:sp>
+      <p:sp>
+        <p:nvSpPr>
+          <p:cNvPr id="3" name="Notes Placeholder 2"/>
+          <p:cNvSpPr>
+            <a:spLocks noGrp="1"/>
+          </p:cNvSpPr>
+          <p:nvPr>
+            <p:ph type="body" idx="1"/>
+          </p:nvPr>
+        </p:nvSpPr>
+        <p:spPr/>
+        <p:txBody>
+          <a:bodyPr>
+            <a:normAutofit/>
+          </a:bodyPr>
+          <a:lstStyle/>
+          <a:p>
+            <a:endParaRPr lang="en-CA" b="0" dirty="0" smtClean="0"/>
+          </a:p>
+        </p:txBody>
+      </p:sp>
+      <p:sp>
+        <p:nvSpPr>
+          <p:cNvPr id="4" name="Slide Number Placeholder 3"/>
+          <p:cNvSpPr>
+            <a:spLocks noGrp="1"/>
+          </p:cNvSpPr>
+          <p:nvPr>
+            <p:ph type="sldNum" sz="quarter" idx="10"/>
+          </p:nvPr>
+        </p:nvSpPr>
+        <p:spPr/>
+        <p:txBody>
+          <a:bodyPr/>
+          <a:lstStyle/>
+          <a:p>
+            <a:fld id="{13F0F35F-DD44-4607-AEC1-49D7A4BC4066}" type="slidenum">
+              <a:rPr lang="en-US" smtClean="0"/>
+              <a:pPr/>
+              <a:t>22</a:t>
+            </a:fld>
+            <a:endParaRPr lang="en-US" dirty="0"/>
+          </a:p>
+        </p:txBody>
+      </p:sp>
+    </p:spTree>
+    <p:extLst>
+      <p:ext uri="{BB962C8B-B14F-4D97-AF65-F5344CB8AC3E}">
+        <p14:creationId xmlns:p14="http://schemas.microsoft.com/office/powerpoint/2010/main" val="2911304509"/>
+      </p:ext>
+    </p:extLst>
+  </p:cSld>
+  <p:clrMapOvr>
+    <a:masterClrMapping/>
+  </p:clrMapOvr>
+</p:notes>
+</file>
+
+<file path=ppt/notesSlides/notesSlide23.xml><?xml version="1.0" encoding="utf-8"?>
+<p:notes xmlns:a="http://schemas.openxmlformats.org/drawingml/2006/main" xmlns:r="http://schemas.openxmlformats.org/officeDocument/2006/relationships" xmlns:p="http://schemas.openxmlformats.org/presentationml/2006/main">
+  <p:cSld>
+    <p:spTree>
+      <p:nvGrpSpPr>
+        <p:cNvPr id="1" name=""/>
+        <p:cNvGrpSpPr/>
+        <p:nvPr/>
+      </p:nvGrpSpPr>
+      <p:grpSpPr>
+        <a:xfrm>
+          <a:off x="0" y="0"/>
+          <a:ext cx="0" cy="0"/>
+          <a:chOff x="0" y="0"/>
+          <a:chExt cx="0" cy="0"/>
+        </a:xfrm>
+      </p:grpSpPr>
+      <p:sp>
+        <p:nvSpPr>
+          <p:cNvPr id="2" name="Slide Image Placeholder 1"/>
+          <p:cNvSpPr>
+            <a:spLocks noGrp="1" noRot="1" noChangeAspect="1"/>
+          </p:cNvSpPr>
+          <p:nvPr>
+            <p:ph type="sldImg"/>
+          </p:nvPr>
+        </p:nvSpPr>
+        <p:spPr>
+          <a:xfrm>
+            <a:off x="381000" y="685800"/>
+            <a:ext cx="6096000" cy="3429000"/>
+          </a:xfrm>
+        </p:spPr>
+      </p:sp>
+      <p:sp>
+        <p:nvSpPr>
+          <p:cNvPr id="3" name="Notes Placeholder 2"/>
+          <p:cNvSpPr>
+            <a:spLocks noGrp="1"/>
+          </p:cNvSpPr>
+          <p:nvPr>
+            <p:ph type="body" idx="1"/>
+          </p:nvPr>
+        </p:nvSpPr>
+        <p:spPr/>
+        <p:txBody>
+          <a:bodyPr>
+            <a:normAutofit/>
+          </a:bodyPr>
+          <a:lstStyle/>
+          <a:p>
+            <a:endParaRPr lang="en-CA" b="0" dirty="0" smtClean="0"/>
+          </a:p>
+        </p:txBody>
+      </p:sp>
+      <p:sp>
+        <p:nvSpPr>
+          <p:cNvPr id="4" name="Slide Number Placeholder 3"/>
+          <p:cNvSpPr>
+            <a:spLocks noGrp="1"/>
+          </p:cNvSpPr>
+          <p:nvPr>
+            <p:ph type="sldNum" sz="quarter" idx="10"/>
+          </p:nvPr>
+        </p:nvSpPr>
+        <p:spPr/>
+        <p:txBody>
+          <a:bodyPr/>
+          <a:lstStyle/>
+          <a:p>
+            <a:fld id="{13F0F35F-DD44-4607-AEC1-49D7A4BC4066}" type="slidenum">
+              <a:rPr lang="en-US" smtClean="0"/>
+              <a:pPr/>
+              <a:t>23</a:t>
+            </a:fld>
+            <a:endParaRPr lang="en-US" dirty="0"/>
+          </a:p>
+        </p:txBody>
+      </p:sp>
+    </p:spTree>
+    <p:extLst>
+      <p:ext uri="{BB962C8B-B14F-4D97-AF65-F5344CB8AC3E}">
+        <p14:creationId xmlns:p14="http://schemas.microsoft.com/office/powerpoint/2010/main" val="2911304509"/>
+      </p:ext>
+    </p:extLst>
+  </p:cSld>
+  <p:clrMapOvr>
+    <a:masterClrMapping/>
+  </p:clrMapOvr>
+</p:notes>
+</file>
+
+<file path=ppt/notesSlides/notesSlide24.xml><?xml version="1.0" encoding="utf-8"?>
+<p:notes xmlns:a="http://schemas.openxmlformats.org/drawingml/2006/main" xmlns:r="http://schemas.openxmlformats.org/officeDocument/2006/relationships" xmlns:p="http://schemas.openxmlformats.org/presentationml/2006/main">
+  <p:cSld>
+    <p:spTree>
+      <p:nvGrpSpPr>
+        <p:cNvPr id="1" name=""/>
+        <p:cNvGrpSpPr/>
+        <p:nvPr/>
+      </p:nvGrpSpPr>
+      <p:grpSpPr>
+        <a:xfrm>
+          <a:off x="0" y="0"/>
+          <a:ext cx="0" cy="0"/>
+          <a:chOff x="0" y="0"/>
+          <a:chExt cx="0" cy="0"/>
+        </a:xfrm>
+      </p:grpSpPr>
+      <p:sp>
+        <p:nvSpPr>
+          <p:cNvPr id="2" name="Slide Image Placeholder 1"/>
+          <p:cNvSpPr>
+            <a:spLocks noGrp="1" noRot="1" noChangeAspect="1"/>
+          </p:cNvSpPr>
+          <p:nvPr>
+            <p:ph type="sldImg"/>
+          </p:nvPr>
+        </p:nvSpPr>
+        <p:spPr>
+          <a:xfrm>
+            <a:off x="381000" y="685800"/>
+            <a:ext cx="6096000" cy="3429000"/>
+          </a:xfrm>
+        </p:spPr>
+      </p:sp>
+      <p:sp>
+        <p:nvSpPr>
+          <p:cNvPr id="3" name="Notes Placeholder 2"/>
+          <p:cNvSpPr>
+            <a:spLocks noGrp="1"/>
+          </p:cNvSpPr>
+          <p:nvPr>
+            <p:ph type="body" idx="1"/>
+          </p:nvPr>
+        </p:nvSpPr>
+        <p:spPr/>
+        <p:txBody>
+          <a:bodyPr>
+            <a:normAutofit/>
+          </a:bodyPr>
+          <a:lstStyle/>
+          <a:p>
+            <a:endParaRPr lang="en-CA" b="0" dirty="0" smtClean="0"/>
+          </a:p>
+        </p:txBody>
+      </p:sp>
+      <p:sp>
+        <p:nvSpPr>
+          <p:cNvPr id="4" name="Slide Number Placeholder 3"/>
+          <p:cNvSpPr>
+            <a:spLocks noGrp="1"/>
+          </p:cNvSpPr>
+          <p:nvPr>
+            <p:ph type="sldNum" sz="quarter" idx="10"/>
+          </p:nvPr>
+        </p:nvSpPr>
+        <p:spPr/>
+        <p:txBody>
+          <a:bodyPr/>
+          <a:lstStyle/>
+          <a:p>
+            <a:fld id="{13F0F35F-DD44-4607-AEC1-49D7A4BC4066}" type="slidenum">
+              <a:rPr lang="en-US" smtClean="0"/>
+              <a:pPr/>
+              <a:t>24</a:t>
+            </a:fld>
+            <a:endParaRPr lang="en-US" dirty="0"/>
+          </a:p>
+        </p:txBody>
+      </p:sp>
+    </p:spTree>
+    <p:extLst>
+      <p:ext uri="{BB962C8B-B14F-4D97-AF65-F5344CB8AC3E}">
+        <p14:creationId xmlns:p14="http://schemas.microsoft.com/office/powerpoint/2010/main" val="2911304509"/>
       </p:ext>
     </p:extLst>
   </p:cSld>
@@ -4479,42 +5425,6 @@
           </a:p>
         </p:txBody>
       </p:sp>
-      <p:sp>
-        <p:nvSpPr>
-          <p:cNvPr id="4" name="Content Placeholder 3"/>
-          <p:cNvSpPr>
-            <a:spLocks noGrp="1"/>
-          </p:cNvSpPr>
-          <p:nvPr>
-            <p:ph sz="quarter" idx="10"/>
-          </p:nvPr>
-        </p:nvSpPr>
-        <p:spPr/>
-        <p:txBody>
-          <a:bodyPr/>
-          <a:lstStyle/>
-          <a:p>
-            <a:pPr marL="0" marR="0" lvl="0" indent="0" defTabSz="914400" eaLnBrk="1" fontAlgn="auto" latinLnBrk="0" hangingPunct="1">
-              <a:lnSpc>
-                <a:spcPct val="100000"/>
-              </a:lnSpc>
-              <a:spcBef>
-                <a:spcPts val="0"/>
-              </a:spcBef>
-              <a:spcAft>
-                <a:spcPts val="0"/>
-              </a:spcAft>
-              <a:buClrTx/>
-              <a:buSzTx/>
-              <a:buFontTx/>
-              <a:buNone/>
-              <a:tabLst/>
-              <a:defRPr/>
-            </a:pPr>
-            <a:endParaRPr lang="en-US" dirty="0"/>
-          </a:p>
-        </p:txBody>
-      </p:sp>
     </p:spTree>
     <p:extLst>
       <p:ext uri="{BB962C8B-B14F-4D97-AF65-F5344CB8AC3E}">
@@ -4554,136 +5464,27 @@
       </p:grpSpPr>
       <p:sp>
         <p:nvSpPr>
-          <p:cNvPr id="2" name="Content Placeholder 1"/>
+          <p:cNvPr id="2" name="Title 1"/>
           <p:cNvSpPr>
             <a:spLocks noGrp="1"/>
           </p:cNvSpPr>
           <p:nvPr>
-            <p:ph sz="quarter" idx="10"/>
-          </p:nvPr>
-        </p:nvSpPr>
-        <p:spPr>
-          <a:xfrm>
-            <a:off x="277813" y="1427918"/>
-            <a:ext cx="11525250" cy="5290388"/>
-          </a:xfrm>
-        </p:spPr>
+            <p:ph type="title"/>
+          </p:nvPr>
+        </p:nvSpPr>
+        <p:spPr/>
         <p:txBody>
           <a:bodyPr/>
           <a:lstStyle/>
           <a:p>
-            <a:r>
-              <a:rPr lang="en-US" dirty="0"/>
-              <a:t>Microsoft Virtual Academy</a:t>
-            </a:r>
-          </a:p>
-          <a:p>
-            <a:pPr lvl="1"/>
-            <a:r>
-              <a:rPr lang="en-US" dirty="0"/>
-              <a:t>Free online learning tailored for IT Pros and Developers </a:t>
-            </a:r>
-          </a:p>
-          <a:p>
-            <a:pPr lvl="1"/>
-            <a:r>
-              <a:rPr lang="en-US"/>
-              <a:t>Over </a:t>
-            </a:r>
-            <a:r>
-              <a:rPr lang="en-US" smtClean="0"/>
-              <a:t>3M </a:t>
-            </a:r>
-            <a:r>
-              <a:rPr lang="en-US" dirty="0"/>
-              <a:t>registered users</a:t>
-            </a:r>
-          </a:p>
-          <a:p>
-            <a:pPr lvl="1"/>
-            <a:r>
-              <a:rPr lang="en-US" dirty="0"/>
-              <a:t>Up-to-date, relevant training on variety of Microsoft products</a:t>
-            </a:r>
-          </a:p>
-          <a:p>
-            <a:r>
-              <a:rPr lang="en-US" dirty="0"/>
-              <a:t>“Earn while you learn!” </a:t>
-            </a:r>
-          </a:p>
-          <a:p>
-            <a:pPr lvl="1"/>
-            <a:r>
-              <a:rPr lang="en-US" dirty="0"/>
-              <a:t>Get 50 MVA Points for this event!</a:t>
-            </a:r>
-          </a:p>
-          <a:p>
-            <a:pPr lvl="1"/>
-            <a:r>
-              <a:rPr lang="en-US" dirty="0"/>
-              <a:t>Visit </a:t>
-            </a:r>
-            <a:r>
-              <a:rPr lang="en-US" dirty="0">
-                <a:hlinkClick r:id="rId3"/>
-              </a:rPr>
-              <a:t>http://aka.ms/MVA-Voucher</a:t>
-            </a:r>
-            <a:r>
-              <a:rPr lang="en-US" dirty="0"/>
-              <a:t> </a:t>
-            </a:r>
-          </a:p>
-          <a:p>
-            <a:pPr lvl="1"/>
-            <a:r>
-              <a:rPr lang="en-US" dirty="0"/>
-              <a:t>Enter this code: </a:t>
-            </a:r>
-            <a:r>
-              <a:rPr lang="en-US" b="1" dirty="0"/>
-              <a:t>PowerJump1 </a:t>
-            </a:r>
-            <a:r>
-              <a:rPr lang="en-US" dirty="0"/>
-              <a:t>(expires 8/15/2013)</a:t>
-            </a:r>
-          </a:p>
-        </p:txBody>
-      </p:sp>
-      <p:sp>
-        <p:nvSpPr>
-          <p:cNvPr id="3" name="Title 2"/>
-          <p:cNvSpPr>
-            <a:spLocks noGrp="1"/>
-          </p:cNvSpPr>
-          <p:nvPr>
-            <p:ph type="title"/>
-          </p:nvPr>
-        </p:nvSpPr>
-        <p:spPr>
-          <a:xfrm>
-            <a:off x="-367266" y="182215"/>
-            <a:ext cx="11416266" cy="1063487"/>
-          </a:xfrm>
-        </p:spPr>
-        <p:txBody>
-          <a:bodyPr/>
-          <a:lstStyle/>
-          <a:p>
-            <a:r>
-              <a:rPr lang="en-US" dirty="0" smtClean="0"/>
-              <a:t>     Join the MVA Community!</a:t>
-            </a:r>
-            <a:endParaRPr lang="en-US" dirty="0"/>
-          </a:p>
-        </p:txBody>
-      </p:sp>
-      <p:sp>
-        <p:nvSpPr>
-          <p:cNvPr id="7" name="TextBox 6"/>
+            <a:pPr lvl="0"/>
+            <a:endParaRPr lang="en-US" dirty="0"/>
+          </a:p>
+        </p:txBody>
+      </p:sp>
+      <p:sp>
+        <p:nvSpPr>
+          <p:cNvPr id="5" name="TextBox 4"/>
           <p:cNvSpPr txBox="1"/>
           <p:nvPr/>
         </p:nvSpPr>
@@ -4728,28 +5529,46 @@
           </a:p>
         </p:txBody>
       </p:sp>
+      <p:pic>
+        <p:nvPicPr>
+          <p:cNvPr id="4" name="Picture 3" descr="building blocks.png"/>
+          <p:cNvPicPr>
+            <a:picLocks noChangeAspect="1"/>
+          </p:cNvPicPr>
+          <p:nvPr/>
+        </p:nvPicPr>
+        <p:blipFill>
+          <a:blip r:embed="rId3">
+            <a:extLst>
+              <a:ext uri="{28A0092B-C50C-407E-A947-70E740481C1C}">
+                <a14:useLocalDpi xmlns:a14="http://schemas.microsoft.com/office/drawing/2010/main" val="0"/>
+              </a:ext>
+            </a:extLst>
+          </a:blip>
+          <a:stretch>
+            <a:fillRect/>
+          </a:stretch>
+        </p:blipFill>
+        <p:spPr>
+          <a:xfrm>
+            <a:off x="1035129" y="0"/>
+            <a:ext cx="8832405" cy="6858000"/>
+          </a:xfrm>
+          <a:prstGeom prst="rect">
+            <a:avLst/>
+          </a:prstGeom>
+        </p:spPr>
+      </p:pic>
     </p:spTree>
     <p:extLst>
       <p:ext uri="{BB962C8B-B14F-4D97-AF65-F5344CB8AC3E}">
-        <p14:creationId xmlns:p14="http://schemas.microsoft.com/office/powerpoint/2010/main" val="3654709363"/>
+        <p14:creationId xmlns:p14="http://schemas.microsoft.com/office/powerpoint/2010/main" val="1986936089"/>
       </p:ext>
     </p:extLst>
   </p:cSld>
   <p:clrMapOvr>
     <a:masterClrMapping/>
   </p:clrMapOvr>
-  <mc:AlternateContent xmlns:mc="http://schemas.openxmlformats.org/markup-compatibility/2006" xmlns:p14="http://schemas.microsoft.com/office/powerpoint/2010/main">
-    <mc:Choice Requires="p14">
-      <p:transition spd="med" p14:dur="700">
-        <p:fade/>
-      </p:transition>
-    </mc:Choice>
-    <mc:Fallback xmlns="">
-      <p:transition spd="med">
-        <p:fade/>
-      </p:transition>
-    </mc:Fallback>
-  </mc:AlternateContent>
   <p:timing>
     <p:tnLst>
       <p:par>
@@ -4792,44 +5611,20 @@
           <a:bodyPr/>
           <a:lstStyle/>
           <a:p>
-            <a:r>
-              <a:rPr lang="en-US"/>
-              <a:t>Recommended Resources</a:t>
-            </a:r>
-          </a:p>
-        </p:txBody>
-      </p:sp>
-      <p:sp>
-        <p:nvSpPr>
-          <p:cNvPr id="3" name="Content Placeholder 2"/>
-          <p:cNvSpPr>
-            <a:spLocks noGrp="1"/>
-          </p:cNvSpPr>
-          <p:nvPr>
-            <p:ph sz="quarter" idx="10"/>
-          </p:nvPr>
-        </p:nvSpPr>
-        <p:spPr/>
-        <p:txBody>
-          <a:bodyPr/>
-          <a:lstStyle/>
-          <a:p>
-            <a:r>
-              <a:rPr lang="en-US"/>
-              <a:t>For Corporate courses, this slide should list recommended LeX Resources as part of the Connected Content Strategy.  At the very least there should be 1 MOC referenced, 1 Book, and 1 Certification.  </a:t>
-            </a:r>
-          </a:p>
-        </p:txBody>
-      </p:sp>
-      <p:sp>
-        <p:nvSpPr>
-          <p:cNvPr id="4" name="TextBox 3"/>
+            <a:pPr lvl="0"/>
+            <a:endParaRPr lang="en-US" dirty="0"/>
+          </a:p>
+        </p:txBody>
+      </p:sp>
+      <p:sp>
+        <p:nvSpPr>
+          <p:cNvPr id="5" name="TextBox 4"/>
           <p:cNvSpPr txBox="1"/>
           <p:nvPr/>
         </p:nvSpPr>
         <p:spPr>
           <a:xfrm>
-            <a:off x="9899196" y="-10205"/>
+            <a:off x="9906000" y="-1"/>
             <a:ext cx="2286000" cy="2031325"/>
           </a:xfrm>
           <a:prstGeom prst="rect">
@@ -4868,16 +5663,97 @@
           </a:p>
         </p:txBody>
       </p:sp>
+      <p:pic>
+        <p:nvPicPr>
+          <p:cNvPr id="4" name="Picture 3" descr="building blocks.png"/>
+          <p:cNvPicPr>
+            <a:picLocks noChangeAspect="1"/>
+          </p:cNvPicPr>
+          <p:nvPr/>
+        </p:nvPicPr>
+        <p:blipFill>
+          <a:blip r:embed="rId3">
+            <a:extLst>
+              <a:ext uri="{28A0092B-C50C-407E-A947-70E740481C1C}">
+                <a14:useLocalDpi xmlns:a14="http://schemas.microsoft.com/office/drawing/2010/main" val="0"/>
+              </a:ext>
+            </a:extLst>
+          </a:blip>
+          <a:stretch>
+            <a:fillRect/>
+          </a:stretch>
+        </p:blipFill>
+        <p:spPr>
+          <a:xfrm>
+            <a:off x="1035129" y="0"/>
+            <a:ext cx="8832405" cy="6858000"/>
+          </a:xfrm>
+          <a:prstGeom prst="rect">
+            <a:avLst/>
+          </a:prstGeom>
+        </p:spPr>
+      </p:pic>
+      <p:sp>
+        <p:nvSpPr>
+          <p:cNvPr id="3" name="Frame 2"/>
+          <p:cNvSpPr/>
+          <p:nvPr/>
+        </p:nvSpPr>
+        <p:spPr>
+          <a:xfrm>
+            <a:off x="817306" y="-88024"/>
+            <a:ext cx="2338751" cy="2137722"/>
+          </a:xfrm>
+          <a:prstGeom prst="frame">
+            <a:avLst>
+              <a:gd name="adj1" fmla="val 4265"/>
+            </a:avLst>
+          </a:prstGeom>
+        </p:spPr>
+        <p:style>
+          <a:lnRef idx="1">
+            <a:schemeClr val="accent1"/>
+          </a:lnRef>
+          <a:fillRef idx="3">
+            <a:schemeClr val="accent1"/>
+          </a:fillRef>
+          <a:effectRef idx="2">
+            <a:schemeClr val="accent1"/>
+          </a:effectRef>
+          <a:fontRef idx="minor">
+            <a:schemeClr val="lt1"/>
+          </a:fontRef>
+        </p:style>
+        <p:txBody>
+          <a:bodyPr rtlCol="0" anchor="ctr"/>
+          <a:lstStyle/>
+          <a:p>
+            <a:pPr algn="ctr"/>
+            <a:endParaRPr lang="en-US">
+              <a:solidFill>
+                <a:schemeClr val="tx1"/>
+              </a:solidFill>
+            </a:endParaRPr>
+          </a:p>
+        </p:txBody>
+      </p:sp>
     </p:spTree>
     <p:extLst>
       <p:ext uri="{BB962C8B-B14F-4D97-AF65-F5344CB8AC3E}">
-        <p14:creationId xmlns:p14="http://schemas.microsoft.com/office/powerpoint/2010/main" val="375956509"/>
+        <p14:creationId xmlns:p14="http://schemas.microsoft.com/office/powerpoint/2010/main" val="4265329461"/>
       </p:ext>
     </p:extLst>
   </p:cSld>
   <p:clrMapOvr>
     <a:masterClrMapping/>
   </p:clrMapOvr>
+  <p:timing>
+    <p:tnLst>
+      <p:par>
+        <p:cTn xmlns:p14="http://schemas.microsoft.com/office/powerpoint/2010/main" id="1" dur="indefinite" restart="never" nodeType="tmRoot"/>
+      </p:par>
+    </p:tnLst>
+  </p:timing>
 </p:sld>
 </file>
 
@@ -4898,16 +5774,876 @@
           <a:chExt cx="0" cy="0"/>
         </a:xfrm>
       </p:grpSpPr>
+      <p:sp>
+        <p:nvSpPr>
+          <p:cNvPr id="2" name="Title 1"/>
+          <p:cNvSpPr>
+            <a:spLocks noGrp="1"/>
+          </p:cNvSpPr>
+          <p:nvPr>
+            <p:ph type="title"/>
+          </p:nvPr>
+        </p:nvSpPr>
+        <p:spPr/>
+        <p:txBody>
+          <a:bodyPr/>
+          <a:lstStyle/>
+          <a:p>
+            <a:pPr lvl="0"/>
+            <a:endParaRPr lang="en-US" dirty="0"/>
+          </a:p>
+        </p:txBody>
+      </p:sp>
+      <p:sp>
+        <p:nvSpPr>
+          <p:cNvPr id="5" name="TextBox 4"/>
+          <p:cNvSpPr txBox="1"/>
+          <p:nvPr/>
+        </p:nvSpPr>
+        <p:spPr>
+          <a:xfrm>
+            <a:off x="9906000" y="-1"/>
+            <a:ext cx="2286000" cy="2031325"/>
+          </a:xfrm>
+          <a:prstGeom prst="rect">
+            <a:avLst/>
+          </a:prstGeom>
+          <a:solidFill>
+            <a:srgbClr val="FFFF00"/>
+          </a:solidFill>
+          <a:ln>
+            <a:noFill/>
+          </a:ln>
+        </p:spPr>
+        <p:txBody>
+          <a:bodyPr wrap="square" rtlCol="0">
+            <a:spAutoFit/>
+          </a:bodyPr>
+          <a:lstStyle/>
+          <a:p>
+            <a:pPr algn="ctr"/>
+            <a:endParaRPr lang="en-US" dirty="0" smtClean="0"/>
+          </a:p>
+          <a:p>
+            <a:pPr algn="ctr"/>
+            <a:endParaRPr lang="en-US" dirty="0"/>
+          </a:p>
+          <a:p>
+            <a:pPr algn="ctr"/>
+            <a:r>
+              <a:rPr lang="en-US" dirty="0" smtClean="0"/>
+              <a:t>Please leave this area blank to allow for picture in picture recording</a:t>
+            </a:r>
+          </a:p>
+          <a:p>
+            <a:pPr algn="ctr"/>
+            <a:endParaRPr lang="en-US" dirty="0"/>
+          </a:p>
+        </p:txBody>
+      </p:sp>
+      <p:pic>
+        <p:nvPicPr>
+          <p:cNvPr id="4" name="Picture 3" descr="building blocks.png"/>
+          <p:cNvPicPr>
+            <a:picLocks noChangeAspect="1"/>
+          </p:cNvPicPr>
+          <p:nvPr/>
+        </p:nvPicPr>
+        <p:blipFill>
+          <a:blip r:embed="rId3">
+            <a:extLst>
+              <a:ext uri="{28A0092B-C50C-407E-A947-70E740481C1C}">
+                <a14:useLocalDpi xmlns:a14="http://schemas.microsoft.com/office/drawing/2010/main" val="0"/>
+              </a:ext>
+            </a:extLst>
+          </a:blip>
+          <a:stretch>
+            <a:fillRect/>
+          </a:stretch>
+        </p:blipFill>
+        <p:spPr>
+          <a:xfrm>
+            <a:off x="1035129" y="0"/>
+            <a:ext cx="8832405" cy="6858000"/>
+          </a:xfrm>
+          <a:prstGeom prst="rect">
+            <a:avLst/>
+          </a:prstGeom>
+        </p:spPr>
+      </p:pic>
+      <p:sp>
+        <p:nvSpPr>
+          <p:cNvPr id="3" name="Frame 2"/>
+          <p:cNvSpPr/>
+          <p:nvPr/>
+        </p:nvSpPr>
+        <p:spPr>
+          <a:xfrm>
+            <a:off x="804732" y="2087422"/>
+            <a:ext cx="2338751" cy="2137722"/>
+          </a:xfrm>
+          <a:prstGeom prst="frame">
+            <a:avLst>
+              <a:gd name="adj1" fmla="val 4265"/>
+            </a:avLst>
+          </a:prstGeom>
+        </p:spPr>
+        <p:style>
+          <a:lnRef idx="1">
+            <a:schemeClr val="accent1"/>
+          </a:lnRef>
+          <a:fillRef idx="3">
+            <a:schemeClr val="accent1"/>
+          </a:fillRef>
+          <a:effectRef idx="2">
+            <a:schemeClr val="accent1"/>
+          </a:effectRef>
+          <a:fontRef idx="minor">
+            <a:schemeClr val="lt1"/>
+          </a:fontRef>
+        </p:style>
+        <p:txBody>
+          <a:bodyPr rtlCol="0" anchor="ctr"/>
+          <a:lstStyle/>
+          <a:p>
+            <a:pPr algn="ctr"/>
+            <a:endParaRPr lang="en-US">
+              <a:solidFill>
+                <a:schemeClr val="tx1"/>
+              </a:solidFill>
+            </a:endParaRPr>
+          </a:p>
+        </p:txBody>
+      </p:sp>
     </p:spTree>
     <p:extLst>
       <p:ext uri="{BB962C8B-B14F-4D97-AF65-F5344CB8AC3E}">
-        <p14:creationId xmlns:p14="http://schemas.microsoft.com/office/powerpoint/2010/main" val="898363405"/>
+        <p14:creationId xmlns:p14="http://schemas.microsoft.com/office/powerpoint/2010/main" val="1071215674"/>
       </p:ext>
     </p:extLst>
   </p:cSld>
   <p:clrMapOvr>
     <a:masterClrMapping/>
   </p:clrMapOvr>
+  <p:timing>
+    <p:tnLst>
+      <p:par>
+        <p:cTn xmlns:p14="http://schemas.microsoft.com/office/powerpoint/2010/main" id="1" dur="indefinite" restart="never" nodeType="tmRoot"/>
+      </p:par>
+    </p:tnLst>
+  </p:timing>
+</p:sld>
+</file>
+
+<file path=ppt/slides/slide16.xml><?xml version="1.0" encoding="utf-8"?>
+<p:sld xmlns:a="http://schemas.openxmlformats.org/drawingml/2006/main" xmlns:r="http://schemas.openxmlformats.org/officeDocument/2006/relationships" xmlns:p="http://schemas.openxmlformats.org/presentationml/2006/main">
+  <p:cSld>
+    <p:spTree>
+      <p:nvGrpSpPr>
+        <p:cNvPr id="1" name=""/>
+        <p:cNvGrpSpPr/>
+        <p:nvPr/>
+      </p:nvGrpSpPr>
+      <p:grpSpPr>
+        <a:xfrm>
+          <a:off x="0" y="0"/>
+          <a:ext cx="0" cy="0"/>
+          <a:chOff x="0" y="0"/>
+          <a:chExt cx="0" cy="0"/>
+        </a:xfrm>
+      </p:grpSpPr>
+      <p:sp>
+        <p:nvSpPr>
+          <p:cNvPr id="2" name="Title 1"/>
+          <p:cNvSpPr>
+            <a:spLocks noGrp="1"/>
+          </p:cNvSpPr>
+          <p:nvPr>
+            <p:ph type="title"/>
+          </p:nvPr>
+        </p:nvSpPr>
+        <p:spPr/>
+        <p:txBody>
+          <a:bodyPr/>
+          <a:lstStyle/>
+          <a:p>
+            <a:pPr lvl="0"/>
+            <a:endParaRPr lang="en-US" dirty="0"/>
+          </a:p>
+        </p:txBody>
+      </p:sp>
+      <p:sp>
+        <p:nvSpPr>
+          <p:cNvPr id="5" name="TextBox 4"/>
+          <p:cNvSpPr txBox="1"/>
+          <p:nvPr/>
+        </p:nvSpPr>
+        <p:spPr>
+          <a:xfrm>
+            <a:off x="9906000" y="-1"/>
+            <a:ext cx="2286000" cy="2031325"/>
+          </a:xfrm>
+          <a:prstGeom prst="rect">
+            <a:avLst/>
+          </a:prstGeom>
+          <a:solidFill>
+            <a:srgbClr val="FFFF00"/>
+          </a:solidFill>
+          <a:ln>
+            <a:noFill/>
+          </a:ln>
+        </p:spPr>
+        <p:txBody>
+          <a:bodyPr wrap="square" rtlCol="0">
+            <a:spAutoFit/>
+          </a:bodyPr>
+          <a:lstStyle/>
+          <a:p>
+            <a:pPr algn="ctr"/>
+            <a:endParaRPr lang="en-US" dirty="0" smtClean="0"/>
+          </a:p>
+          <a:p>
+            <a:pPr algn="ctr"/>
+            <a:endParaRPr lang="en-US" dirty="0"/>
+          </a:p>
+          <a:p>
+            <a:pPr algn="ctr"/>
+            <a:r>
+              <a:rPr lang="en-US" dirty="0" smtClean="0"/>
+              <a:t>Please leave this area blank to allow for picture in picture recording</a:t>
+            </a:r>
+          </a:p>
+          <a:p>
+            <a:pPr algn="ctr"/>
+            <a:endParaRPr lang="en-US" dirty="0"/>
+          </a:p>
+        </p:txBody>
+      </p:sp>
+      <p:pic>
+        <p:nvPicPr>
+          <p:cNvPr id="4" name="Picture 3" descr="building blocks.png"/>
+          <p:cNvPicPr>
+            <a:picLocks noChangeAspect="1"/>
+          </p:cNvPicPr>
+          <p:nvPr/>
+        </p:nvPicPr>
+        <p:blipFill>
+          <a:blip r:embed="rId3">
+            <a:extLst>
+              <a:ext uri="{28A0092B-C50C-407E-A947-70E740481C1C}">
+                <a14:useLocalDpi xmlns:a14="http://schemas.microsoft.com/office/drawing/2010/main" val="0"/>
+              </a:ext>
+            </a:extLst>
+          </a:blip>
+          <a:stretch>
+            <a:fillRect/>
+          </a:stretch>
+        </p:blipFill>
+        <p:spPr>
+          <a:xfrm>
+            <a:off x="1035129" y="0"/>
+            <a:ext cx="8832405" cy="6858000"/>
+          </a:xfrm>
+          <a:prstGeom prst="rect">
+            <a:avLst/>
+          </a:prstGeom>
+        </p:spPr>
+      </p:pic>
+      <p:sp>
+        <p:nvSpPr>
+          <p:cNvPr id="3" name="Frame 2"/>
+          <p:cNvSpPr/>
+          <p:nvPr/>
+        </p:nvSpPr>
+        <p:spPr>
+          <a:xfrm>
+            <a:off x="792158" y="4627538"/>
+            <a:ext cx="2338751" cy="2137722"/>
+          </a:xfrm>
+          <a:prstGeom prst="frame">
+            <a:avLst>
+              <a:gd name="adj1" fmla="val 4265"/>
+            </a:avLst>
+          </a:prstGeom>
+        </p:spPr>
+        <p:style>
+          <a:lnRef idx="1">
+            <a:schemeClr val="accent1"/>
+          </a:lnRef>
+          <a:fillRef idx="3">
+            <a:schemeClr val="accent1"/>
+          </a:fillRef>
+          <a:effectRef idx="2">
+            <a:schemeClr val="accent1"/>
+          </a:effectRef>
+          <a:fontRef idx="minor">
+            <a:schemeClr val="lt1"/>
+          </a:fontRef>
+        </p:style>
+        <p:txBody>
+          <a:bodyPr rtlCol="0" anchor="ctr"/>
+          <a:lstStyle/>
+          <a:p>
+            <a:pPr algn="ctr"/>
+            <a:endParaRPr lang="en-US">
+              <a:solidFill>
+                <a:schemeClr val="tx1"/>
+              </a:solidFill>
+            </a:endParaRPr>
+          </a:p>
+        </p:txBody>
+      </p:sp>
+    </p:spTree>
+    <p:extLst>
+      <p:ext uri="{BB962C8B-B14F-4D97-AF65-F5344CB8AC3E}">
+        <p14:creationId xmlns:p14="http://schemas.microsoft.com/office/powerpoint/2010/main" val="4219127862"/>
+      </p:ext>
+    </p:extLst>
+  </p:cSld>
+  <p:clrMapOvr>
+    <a:masterClrMapping/>
+  </p:clrMapOvr>
+  <p:timing>
+    <p:tnLst>
+      <p:par>
+        <p:cTn xmlns:p14="http://schemas.microsoft.com/office/powerpoint/2010/main" id="1" dur="indefinite" restart="never" nodeType="tmRoot"/>
+      </p:par>
+    </p:tnLst>
+  </p:timing>
+</p:sld>
+</file>
+
+<file path=ppt/slides/slide17.xml><?xml version="1.0" encoding="utf-8"?>
+<p:sld xmlns:a="http://schemas.openxmlformats.org/drawingml/2006/main" xmlns:r="http://schemas.openxmlformats.org/officeDocument/2006/relationships" xmlns:p="http://schemas.openxmlformats.org/presentationml/2006/main">
+  <p:cSld>
+    <p:spTree>
+      <p:nvGrpSpPr>
+        <p:cNvPr id="1" name=""/>
+        <p:cNvGrpSpPr/>
+        <p:nvPr/>
+      </p:nvGrpSpPr>
+      <p:grpSpPr>
+        <a:xfrm>
+          <a:off x="0" y="0"/>
+          <a:ext cx="0" cy="0"/>
+          <a:chOff x="0" y="0"/>
+          <a:chExt cx="0" cy="0"/>
+        </a:xfrm>
+      </p:grpSpPr>
+      <p:sp>
+        <p:nvSpPr>
+          <p:cNvPr id="2" name="Title 1"/>
+          <p:cNvSpPr>
+            <a:spLocks noGrp="1"/>
+          </p:cNvSpPr>
+          <p:nvPr>
+            <p:ph type="title"/>
+          </p:nvPr>
+        </p:nvSpPr>
+        <p:spPr/>
+        <p:txBody>
+          <a:bodyPr/>
+          <a:lstStyle/>
+          <a:p>
+            <a:pPr lvl="0"/>
+            <a:endParaRPr lang="en-US" dirty="0"/>
+          </a:p>
+        </p:txBody>
+      </p:sp>
+      <p:sp>
+        <p:nvSpPr>
+          <p:cNvPr id="5" name="TextBox 4"/>
+          <p:cNvSpPr txBox="1"/>
+          <p:nvPr/>
+        </p:nvSpPr>
+        <p:spPr>
+          <a:xfrm>
+            <a:off x="9906000" y="-1"/>
+            <a:ext cx="2286000" cy="2031325"/>
+          </a:xfrm>
+          <a:prstGeom prst="rect">
+            <a:avLst/>
+          </a:prstGeom>
+          <a:solidFill>
+            <a:srgbClr val="FFFF00"/>
+          </a:solidFill>
+          <a:ln>
+            <a:noFill/>
+          </a:ln>
+        </p:spPr>
+        <p:txBody>
+          <a:bodyPr wrap="square" rtlCol="0">
+            <a:spAutoFit/>
+          </a:bodyPr>
+          <a:lstStyle/>
+          <a:p>
+            <a:pPr algn="ctr"/>
+            <a:endParaRPr lang="en-US" dirty="0" smtClean="0"/>
+          </a:p>
+          <a:p>
+            <a:pPr algn="ctr"/>
+            <a:endParaRPr lang="en-US" dirty="0"/>
+          </a:p>
+          <a:p>
+            <a:pPr algn="ctr"/>
+            <a:r>
+              <a:rPr lang="en-US" dirty="0" smtClean="0"/>
+              <a:t>Please leave this area blank to allow for picture in picture recording</a:t>
+            </a:r>
+          </a:p>
+          <a:p>
+            <a:pPr algn="ctr"/>
+            <a:endParaRPr lang="en-US" dirty="0"/>
+          </a:p>
+        </p:txBody>
+      </p:sp>
+      <p:pic>
+        <p:nvPicPr>
+          <p:cNvPr id="4" name="Picture 3" descr="building blocks.png"/>
+          <p:cNvPicPr>
+            <a:picLocks noChangeAspect="1"/>
+          </p:cNvPicPr>
+          <p:nvPr/>
+        </p:nvPicPr>
+        <p:blipFill>
+          <a:blip r:embed="rId3">
+            <a:extLst>
+              <a:ext uri="{28A0092B-C50C-407E-A947-70E740481C1C}">
+                <a14:useLocalDpi xmlns:a14="http://schemas.microsoft.com/office/drawing/2010/main" val="0"/>
+              </a:ext>
+            </a:extLst>
+          </a:blip>
+          <a:stretch>
+            <a:fillRect/>
+          </a:stretch>
+        </p:blipFill>
+        <p:spPr>
+          <a:xfrm>
+            <a:off x="1035129" y="0"/>
+            <a:ext cx="8832405" cy="6858000"/>
+          </a:xfrm>
+          <a:prstGeom prst="rect">
+            <a:avLst/>
+          </a:prstGeom>
+        </p:spPr>
+      </p:pic>
+      <p:sp>
+        <p:nvSpPr>
+          <p:cNvPr id="3" name="Frame 2"/>
+          <p:cNvSpPr/>
+          <p:nvPr/>
+        </p:nvSpPr>
+        <p:spPr>
+          <a:xfrm>
+            <a:off x="3281797" y="-100599"/>
+            <a:ext cx="2338751" cy="2137722"/>
+          </a:xfrm>
+          <a:prstGeom prst="frame">
+            <a:avLst>
+              <a:gd name="adj1" fmla="val 4265"/>
+            </a:avLst>
+          </a:prstGeom>
+        </p:spPr>
+        <p:style>
+          <a:lnRef idx="1">
+            <a:schemeClr val="accent1"/>
+          </a:lnRef>
+          <a:fillRef idx="3">
+            <a:schemeClr val="accent1"/>
+          </a:fillRef>
+          <a:effectRef idx="2">
+            <a:schemeClr val="accent1"/>
+          </a:effectRef>
+          <a:fontRef idx="minor">
+            <a:schemeClr val="lt1"/>
+          </a:fontRef>
+        </p:style>
+        <p:txBody>
+          <a:bodyPr rtlCol="0" anchor="ctr"/>
+          <a:lstStyle/>
+          <a:p>
+            <a:pPr algn="ctr"/>
+            <a:endParaRPr lang="en-US">
+              <a:solidFill>
+                <a:schemeClr val="tx1"/>
+              </a:solidFill>
+            </a:endParaRPr>
+          </a:p>
+        </p:txBody>
+      </p:sp>
+    </p:spTree>
+    <p:extLst>
+      <p:ext uri="{BB962C8B-B14F-4D97-AF65-F5344CB8AC3E}">
+        <p14:creationId xmlns:p14="http://schemas.microsoft.com/office/powerpoint/2010/main" val="3234788892"/>
+      </p:ext>
+    </p:extLst>
+  </p:cSld>
+  <p:clrMapOvr>
+    <a:masterClrMapping/>
+  </p:clrMapOvr>
+  <p:timing>
+    <p:tnLst>
+      <p:par>
+        <p:cTn xmlns:p14="http://schemas.microsoft.com/office/powerpoint/2010/main" id="1" dur="indefinite" restart="never" nodeType="tmRoot"/>
+      </p:par>
+    </p:tnLst>
+  </p:timing>
+</p:sld>
+</file>
+
+<file path=ppt/slides/slide18.xml><?xml version="1.0" encoding="utf-8"?>
+<p:sld xmlns:a="http://schemas.openxmlformats.org/drawingml/2006/main" xmlns:r="http://schemas.openxmlformats.org/officeDocument/2006/relationships" xmlns:p="http://schemas.openxmlformats.org/presentationml/2006/main">
+  <p:cSld>
+    <p:spTree>
+      <p:nvGrpSpPr>
+        <p:cNvPr id="1" name=""/>
+        <p:cNvGrpSpPr/>
+        <p:nvPr/>
+      </p:nvGrpSpPr>
+      <p:grpSpPr>
+        <a:xfrm>
+          <a:off x="0" y="0"/>
+          <a:ext cx="0" cy="0"/>
+          <a:chOff x="0" y="0"/>
+          <a:chExt cx="0" cy="0"/>
+        </a:xfrm>
+      </p:grpSpPr>
+      <p:sp>
+        <p:nvSpPr>
+          <p:cNvPr id="2" name="Title 1"/>
+          <p:cNvSpPr>
+            <a:spLocks noGrp="1"/>
+          </p:cNvSpPr>
+          <p:nvPr>
+            <p:ph type="title"/>
+          </p:nvPr>
+        </p:nvSpPr>
+        <p:spPr/>
+        <p:txBody>
+          <a:bodyPr/>
+          <a:lstStyle/>
+          <a:p>
+            <a:pPr lvl="0"/>
+            <a:endParaRPr lang="en-US" dirty="0"/>
+          </a:p>
+        </p:txBody>
+      </p:sp>
+      <p:sp>
+        <p:nvSpPr>
+          <p:cNvPr id="5" name="TextBox 4"/>
+          <p:cNvSpPr txBox="1"/>
+          <p:nvPr/>
+        </p:nvSpPr>
+        <p:spPr>
+          <a:xfrm>
+            <a:off x="9906000" y="-1"/>
+            <a:ext cx="2286000" cy="2031325"/>
+          </a:xfrm>
+          <a:prstGeom prst="rect">
+            <a:avLst/>
+          </a:prstGeom>
+          <a:solidFill>
+            <a:srgbClr val="FFFF00"/>
+          </a:solidFill>
+          <a:ln>
+            <a:noFill/>
+          </a:ln>
+        </p:spPr>
+        <p:txBody>
+          <a:bodyPr wrap="square" rtlCol="0">
+            <a:spAutoFit/>
+          </a:bodyPr>
+          <a:lstStyle/>
+          <a:p>
+            <a:pPr algn="ctr"/>
+            <a:endParaRPr lang="en-US" dirty="0" smtClean="0"/>
+          </a:p>
+          <a:p>
+            <a:pPr algn="ctr"/>
+            <a:endParaRPr lang="en-US" dirty="0"/>
+          </a:p>
+          <a:p>
+            <a:pPr algn="ctr"/>
+            <a:r>
+              <a:rPr lang="en-US" dirty="0" smtClean="0"/>
+              <a:t>Please leave this area blank to allow for picture in picture recording</a:t>
+            </a:r>
+          </a:p>
+          <a:p>
+            <a:pPr algn="ctr"/>
+            <a:endParaRPr lang="en-US" dirty="0"/>
+          </a:p>
+        </p:txBody>
+      </p:sp>
+      <p:pic>
+        <p:nvPicPr>
+          <p:cNvPr id="4" name="Picture 3" descr="building blocks.png"/>
+          <p:cNvPicPr>
+            <a:picLocks noChangeAspect="1"/>
+          </p:cNvPicPr>
+          <p:nvPr/>
+        </p:nvPicPr>
+        <p:blipFill>
+          <a:blip r:embed="rId3">
+            <a:extLst>
+              <a:ext uri="{28A0092B-C50C-407E-A947-70E740481C1C}">
+                <a14:useLocalDpi xmlns:a14="http://schemas.microsoft.com/office/drawing/2010/main" val="0"/>
+              </a:ext>
+            </a:extLst>
+          </a:blip>
+          <a:stretch>
+            <a:fillRect/>
+          </a:stretch>
+        </p:blipFill>
+        <p:spPr>
+          <a:xfrm>
+            <a:off x="1035129" y="0"/>
+            <a:ext cx="8832405" cy="6858000"/>
+          </a:xfrm>
+          <a:prstGeom prst="rect">
+            <a:avLst/>
+          </a:prstGeom>
+        </p:spPr>
+      </p:pic>
+      <p:sp>
+        <p:nvSpPr>
+          <p:cNvPr id="3" name="Frame 2"/>
+          <p:cNvSpPr/>
+          <p:nvPr/>
+        </p:nvSpPr>
+        <p:spPr>
+          <a:xfrm>
+            <a:off x="3344667" y="2313770"/>
+            <a:ext cx="2338751" cy="2137722"/>
+          </a:xfrm>
+          <a:prstGeom prst="frame">
+            <a:avLst>
+              <a:gd name="adj1" fmla="val 4265"/>
+            </a:avLst>
+          </a:prstGeom>
+        </p:spPr>
+        <p:style>
+          <a:lnRef idx="1">
+            <a:schemeClr val="accent1"/>
+          </a:lnRef>
+          <a:fillRef idx="3">
+            <a:schemeClr val="accent1"/>
+          </a:fillRef>
+          <a:effectRef idx="2">
+            <a:schemeClr val="accent1"/>
+          </a:effectRef>
+          <a:fontRef idx="minor">
+            <a:schemeClr val="lt1"/>
+          </a:fontRef>
+        </p:style>
+        <p:txBody>
+          <a:bodyPr rtlCol="0" anchor="ctr"/>
+          <a:lstStyle/>
+          <a:p>
+            <a:pPr algn="ctr"/>
+            <a:endParaRPr lang="en-US">
+              <a:solidFill>
+                <a:schemeClr val="tx1"/>
+              </a:solidFill>
+            </a:endParaRPr>
+          </a:p>
+        </p:txBody>
+      </p:sp>
+    </p:spTree>
+    <p:extLst>
+      <p:ext uri="{BB962C8B-B14F-4D97-AF65-F5344CB8AC3E}">
+        <p14:creationId xmlns:p14="http://schemas.microsoft.com/office/powerpoint/2010/main" val="3989791693"/>
+      </p:ext>
+    </p:extLst>
+  </p:cSld>
+  <p:clrMapOvr>
+    <a:masterClrMapping/>
+  </p:clrMapOvr>
+  <p:timing>
+    <p:tnLst>
+      <p:par>
+        <p:cTn xmlns:p14="http://schemas.microsoft.com/office/powerpoint/2010/main" id="1" dur="indefinite" restart="never" nodeType="tmRoot"/>
+      </p:par>
+    </p:tnLst>
+  </p:timing>
+</p:sld>
+</file>
+
+<file path=ppt/slides/slide19.xml><?xml version="1.0" encoding="utf-8"?>
+<p:sld xmlns:a="http://schemas.openxmlformats.org/drawingml/2006/main" xmlns:r="http://schemas.openxmlformats.org/officeDocument/2006/relationships" xmlns:p="http://schemas.openxmlformats.org/presentationml/2006/main">
+  <p:cSld>
+    <p:spTree>
+      <p:nvGrpSpPr>
+        <p:cNvPr id="1" name=""/>
+        <p:cNvGrpSpPr/>
+        <p:nvPr/>
+      </p:nvGrpSpPr>
+      <p:grpSpPr>
+        <a:xfrm>
+          <a:off x="0" y="0"/>
+          <a:ext cx="0" cy="0"/>
+          <a:chOff x="0" y="0"/>
+          <a:chExt cx="0" cy="0"/>
+        </a:xfrm>
+      </p:grpSpPr>
+      <p:sp>
+        <p:nvSpPr>
+          <p:cNvPr id="2" name="Title 1"/>
+          <p:cNvSpPr>
+            <a:spLocks noGrp="1"/>
+          </p:cNvSpPr>
+          <p:nvPr>
+            <p:ph type="title"/>
+          </p:nvPr>
+        </p:nvSpPr>
+        <p:spPr/>
+        <p:txBody>
+          <a:bodyPr/>
+          <a:lstStyle/>
+          <a:p>
+            <a:pPr lvl="0"/>
+            <a:endParaRPr lang="en-US" dirty="0"/>
+          </a:p>
+        </p:txBody>
+      </p:sp>
+      <p:sp>
+        <p:nvSpPr>
+          <p:cNvPr id="5" name="TextBox 4"/>
+          <p:cNvSpPr txBox="1"/>
+          <p:nvPr/>
+        </p:nvSpPr>
+        <p:spPr>
+          <a:xfrm>
+            <a:off x="9906000" y="-1"/>
+            <a:ext cx="2286000" cy="2031325"/>
+          </a:xfrm>
+          <a:prstGeom prst="rect">
+            <a:avLst/>
+          </a:prstGeom>
+          <a:solidFill>
+            <a:srgbClr val="FFFF00"/>
+          </a:solidFill>
+          <a:ln>
+            <a:noFill/>
+          </a:ln>
+        </p:spPr>
+        <p:txBody>
+          <a:bodyPr wrap="square" rtlCol="0">
+            <a:spAutoFit/>
+          </a:bodyPr>
+          <a:lstStyle/>
+          <a:p>
+            <a:pPr algn="ctr"/>
+            <a:endParaRPr lang="en-US" dirty="0" smtClean="0"/>
+          </a:p>
+          <a:p>
+            <a:pPr algn="ctr"/>
+            <a:endParaRPr lang="en-US" dirty="0"/>
+          </a:p>
+          <a:p>
+            <a:pPr algn="ctr"/>
+            <a:r>
+              <a:rPr lang="en-US" dirty="0" smtClean="0"/>
+              <a:t>Please leave this area blank to allow for picture in picture recording</a:t>
+            </a:r>
+          </a:p>
+          <a:p>
+            <a:pPr algn="ctr"/>
+            <a:endParaRPr lang="en-US" dirty="0"/>
+          </a:p>
+        </p:txBody>
+      </p:sp>
+      <p:pic>
+        <p:nvPicPr>
+          <p:cNvPr id="4" name="Picture 3" descr="building blocks.png"/>
+          <p:cNvPicPr>
+            <a:picLocks noChangeAspect="1"/>
+          </p:cNvPicPr>
+          <p:nvPr/>
+        </p:nvPicPr>
+        <p:blipFill>
+          <a:blip r:embed="rId3">
+            <a:extLst>
+              <a:ext uri="{28A0092B-C50C-407E-A947-70E740481C1C}">
+                <a14:useLocalDpi xmlns:a14="http://schemas.microsoft.com/office/drawing/2010/main" val="0"/>
+              </a:ext>
+            </a:extLst>
+          </a:blip>
+          <a:stretch>
+            <a:fillRect/>
+          </a:stretch>
+        </p:blipFill>
+        <p:spPr>
+          <a:xfrm>
+            <a:off x="1035129" y="0"/>
+            <a:ext cx="8832405" cy="6858000"/>
+          </a:xfrm>
+          <a:prstGeom prst="rect">
+            <a:avLst/>
+          </a:prstGeom>
+        </p:spPr>
+      </p:pic>
+      <p:sp>
+        <p:nvSpPr>
+          <p:cNvPr id="3" name="Frame 2"/>
+          <p:cNvSpPr/>
+          <p:nvPr/>
+        </p:nvSpPr>
+        <p:spPr>
+          <a:xfrm>
+            <a:off x="3319519" y="4720278"/>
+            <a:ext cx="2338751" cy="2137722"/>
+          </a:xfrm>
+          <a:prstGeom prst="frame">
+            <a:avLst>
+              <a:gd name="adj1" fmla="val 4265"/>
+            </a:avLst>
+          </a:prstGeom>
+        </p:spPr>
+        <p:style>
+          <a:lnRef idx="1">
+            <a:schemeClr val="accent1"/>
+          </a:lnRef>
+          <a:fillRef idx="3">
+            <a:schemeClr val="accent1"/>
+          </a:fillRef>
+          <a:effectRef idx="2">
+            <a:schemeClr val="accent1"/>
+          </a:effectRef>
+          <a:fontRef idx="minor">
+            <a:schemeClr val="lt1"/>
+          </a:fontRef>
+        </p:style>
+        <p:txBody>
+          <a:bodyPr rtlCol="0" anchor="ctr"/>
+          <a:lstStyle/>
+          <a:p>
+            <a:pPr algn="ctr"/>
+            <a:endParaRPr lang="en-US">
+              <a:solidFill>
+                <a:schemeClr val="tx1"/>
+              </a:solidFill>
+            </a:endParaRPr>
+          </a:p>
+        </p:txBody>
+      </p:sp>
+    </p:spTree>
+    <p:extLst>
+      <p:ext uri="{BB962C8B-B14F-4D97-AF65-F5344CB8AC3E}">
+        <p14:creationId xmlns:p14="http://schemas.microsoft.com/office/powerpoint/2010/main" val="309687607"/>
+      </p:ext>
+    </p:extLst>
+  </p:cSld>
+  <p:clrMapOvr>
+    <a:masterClrMapping/>
+  </p:clrMapOvr>
+  <p:timing>
+    <p:tnLst>
+      <p:par>
+        <p:cTn xmlns:p14="http://schemas.microsoft.com/office/powerpoint/2010/main" id="1" dur="indefinite" restart="never" nodeType="tmRoot"/>
+      </p:par>
+    </p:tnLst>
+  </p:timing>
 </p:sld>
 </file>
 
@@ -5363,6 +7099,933 @@
       <p:transition spd="slow"/>
     </mc:Fallback>
   </mc:AlternateContent>
+  <p:timing>
+    <p:tnLst>
+      <p:par>
+        <p:cTn xmlns:p14="http://schemas.microsoft.com/office/powerpoint/2010/main" id="1" dur="indefinite" restart="never" nodeType="tmRoot"/>
+      </p:par>
+    </p:tnLst>
+  </p:timing>
+</p:sld>
+</file>
+
+<file path=ppt/slides/slide20.xml><?xml version="1.0" encoding="utf-8"?>
+<p:sld xmlns:a="http://schemas.openxmlformats.org/drawingml/2006/main" xmlns:r="http://schemas.openxmlformats.org/officeDocument/2006/relationships" xmlns:p="http://schemas.openxmlformats.org/presentationml/2006/main">
+  <p:cSld>
+    <p:spTree>
+      <p:nvGrpSpPr>
+        <p:cNvPr id="1" name=""/>
+        <p:cNvGrpSpPr/>
+        <p:nvPr/>
+      </p:nvGrpSpPr>
+      <p:grpSpPr>
+        <a:xfrm>
+          <a:off x="0" y="0"/>
+          <a:ext cx="0" cy="0"/>
+          <a:chOff x="0" y="0"/>
+          <a:chExt cx="0" cy="0"/>
+        </a:xfrm>
+      </p:grpSpPr>
+      <p:sp>
+        <p:nvSpPr>
+          <p:cNvPr id="2" name="Title 1"/>
+          <p:cNvSpPr>
+            <a:spLocks noGrp="1"/>
+          </p:cNvSpPr>
+          <p:nvPr>
+            <p:ph type="title"/>
+          </p:nvPr>
+        </p:nvSpPr>
+        <p:spPr/>
+        <p:txBody>
+          <a:bodyPr/>
+          <a:lstStyle/>
+          <a:p>
+            <a:pPr lvl="0"/>
+            <a:endParaRPr lang="en-US" dirty="0"/>
+          </a:p>
+        </p:txBody>
+      </p:sp>
+      <p:sp>
+        <p:nvSpPr>
+          <p:cNvPr id="5" name="TextBox 4"/>
+          <p:cNvSpPr txBox="1"/>
+          <p:nvPr/>
+        </p:nvSpPr>
+        <p:spPr>
+          <a:xfrm>
+            <a:off x="9906000" y="-1"/>
+            <a:ext cx="2286000" cy="2031325"/>
+          </a:xfrm>
+          <a:prstGeom prst="rect">
+            <a:avLst/>
+          </a:prstGeom>
+          <a:solidFill>
+            <a:srgbClr val="FFFF00"/>
+          </a:solidFill>
+          <a:ln>
+            <a:noFill/>
+          </a:ln>
+        </p:spPr>
+        <p:txBody>
+          <a:bodyPr wrap="square" rtlCol="0">
+            <a:spAutoFit/>
+          </a:bodyPr>
+          <a:lstStyle/>
+          <a:p>
+            <a:pPr algn="ctr"/>
+            <a:endParaRPr lang="en-US" dirty="0" smtClean="0"/>
+          </a:p>
+          <a:p>
+            <a:pPr algn="ctr"/>
+            <a:endParaRPr lang="en-US" dirty="0"/>
+          </a:p>
+          <a:p>
+            <a:pPr algn="ctr"/>
+            <a:r>
+              <a:rPr lang="en-US" dirty="0" smtClean="0"/>
+              <a:t>Please leave this area blank to allow for picture in picture recording</a:t>
+            </a:r>
+          </a:p>
+          <a:p>
+            <a:pPr algn="ctr"/>
+            <a:endParaRPr lang="en-US" dirty="0"/>
+          </a:p>
+        </p:txBody>
+      </p:sp>
+      <p:pic>
+        <p:nvPicPr>
+          <p:cNvPr id="4" name="Picture 3" descr="building blocks.png"/>
+          <p:cNvPicPr>
+            <a:picLocks noChangeAspect="1"/>
+          </p:cNvPicPr>
+          <p:nvPr/>
+        </p:nvPicPr>
+        <p:blipFill>
+          <a:blip r:embed="rId3">
+            <a:extLst>
+              <a:ext uri="{28A0092B-C50C-407E-A947-70E740481C1C}">
+                <a14:useLocalDpi xmlns:a14="http://schemas.microsoft.com/office/drawing/2010/main" val="0"/>
+              </a:ext>
+            </a:extLst>
+          </a:blip>
+          <a:stretch>
+            <a:fillRect/>
+          </a:stretch>
+        </p:blipFill>
+        <p:spPr>
+          <a:xfrm>
+            <a:off x="1035129" y="0"/>
+            <a:ext cx="8832405" cy="6858000"/>
+          </a:xfrm>
+          <a:prstGeom prst="rect">
+            <a:avLst/>
+          </a:prstGeom>
+        </p:spPr>
+      </p:pic>
+      <p:sp>
+        <p:nvSpPr>
+          <p:cNvPr id="3" name="Frame 2"/>
+          <p:cNvSpPr/>
+          <p:nvPr/>
+        </p:nvSpPr>
+        <p:spPr>
+          <a:xfrm>
+            <a:off x="5557679" y="-100599"/>
+            <a:ext cx="2338751" cy="2137722"/>
+          </a:xfrm>
+          <a:prstGeom prst="frame">
+            <a:avLst>
+              <a:gd name="adj1" fmla="val 4265"/>
+            </a:avLst>
+          </a:prstGeom>
+        </p:spPr>
+        <p:style>
+          <a:lnRef idx="1">
+            <a:schemeClr val="accent1"/>
+          </a:lnRef>
+          <a:fillRef idx="3">
+            <a:schemeClr val="accent1"/>
+          </a:fillRef>
+          <a:effectRef idx="2">
+            <a:schemeClr val="accent1"/>
+          </a:effectRef>
+          <a:fontRef idx="minor">
+            <a:schemeClr val="lt1"/>
+          </a:fontRef>
+        </p:style>
+        <p:txBody>
+          <a:bodyPr rtlCol="0" anchor="ctr"/>
+          <a:lstStyle/>
+          <a:p>
+            <a:pPr algn="ctr"/>
+            <a:endParaRPr lang="en-US">
+              <a:solidFill>
+                <a:schemeClr val="tx1"/>
+              </a:solidFill>
+            </a:endParaRPr>
+          </a:p>
+        </p:txBody>
+      </p:sp>
+    </p:spTree>
+    <p:extLst>
+      <p:ext uri="{BB962C8B-B14F-4D97-AF65-F5344CB8AC3E}">
+        <p14:creationId xmlns:p14="http://schemas.microsoft.com/office/powerpoint/2010/main" val="1154263567"/>
+      </p:ext>
+    </p:extLst>
+  </p:cSld>
+  <p:clrMapOvr>
+    <a:masterClrMapping/>
+  </p:clrMapOvr>
+  <p:timing>
+    <p:tnLst>
+      <p:par>
+        <p:cTn xmlns:p14="http://schemas.microsoft.com/office/powerpoint/2010/main" id="1" dur="indefinite" restart="never" nodeType="tmRoot"/>
+      </p:par>
+    </p:tnLst>
+  </p:timing>
+</p:sld>
+</file>
+
+<file path=ppt/slides/slide21.xml><?xml version="1.0" encoding="utf-8"?>
+<p:sld xmlns:a="http://schemas.openxmlformats.org/drawingml/2006/main" xmlns:r="http://schemas.openxmlformats.org/officeDocument/2006/relationships" xmlns:p="http://schemas.openxmlformats.org/presentationml/2006/main">
+  <p:cSld>
+    <p:spTree>
+      <p:nvGrpSpPr>
+        <p:cNvPr id="1" name=""/>
+        <p:cNvGrpSpPr/>
+        <p:nvPr/>
+      </p:nvGrpSpPr>
+      <p:grpSpPr>
+        <a:xfrm>
+          <a:off x="0" y="0"/>
+          <a:ext cx="0" cy="0"/>
+          <a:chOff x="0" y="0"/>
+          <a:chExt cx="0" cy="0"/>
+        </a:xfrm>
+      </p:grpSpPr>
+      <p:sp>
+        <p:nvSpPr>
+          <p:cNvPr id="2" name="Title 1"/>
+          <p:cNvSpPr>
+            <a:spLocks noGrp="1"/>
+          </p:cNvSpPr>
+          <p:nvPr>
+            <p:ph type="title"/>
+          </p:nvPr>
+        </p:nvSpPr>
+        <p:spPr/>
+        <p:txBody>
+          <a:bodyPr/>
+          <a:lstStyle/>
+          <a:p>
+            <a:pPr lvl="0"/>
+            <a:endParaRPr lang="en-US" dirty="0"/>
+          </a:p>
+        </p:txBody>
+      </p:sp>
+      <p:sp>
+        <p:nvSpPr>
+          <p:cNvPr id="5" name="TextBox 4"/>
+          <p:cNvSpPr txBox="1"/>
+          <p:nvPr/>
+        </p:nvSpPr>
+        <p:spPr>
+          <a:xfrm>
+            <a:off x="9906000" y="-1"/>
+            <a:ext cx="2286000" cy="2031325"/>
+          </a:xfrm>
+          <a:prstGeom prst="rect">
+            <a:avLst/>
+          </a:prstGeom>
+          <a:solidFill>
+            <a:srgbClr val="FFFF00"/>
+          </a:solidFill>
+          <a:ln>
+            <a:noFill/>
+          </a:ln>
+        </p:spPr>
+        <p:txBody>
+          <a:bodyPr wrap="square" rtlCol="0">
+            <a:spAutoFit/>
+          </a:bodyPr>
+          <a:lstStyle/>
+          <a:p>
+            <a:pPr algn="ctr"/>
+            <a:endParaRPr lang="en-US" dirty="0" smtClean="0"/>
+          </a:p>
+          <a:p>
+            <a:pPr algn="ctr"/>
+            <a:endParaRPr lang="en-US" dirty="0"/>
+          </a:p>
+          <a:p>
+            <a:pPr algn="ctr"/>
+            <a:r>
+              <a:rPr lang="en-US" dirty="0" smtClean="0"/>
+              <a:t>Please leave this area blank to allow for picture in picture recording</a:t>
+            </a:r>
+          </a:p>
+          <a:p>
+            <a:pPr algn="ctr"/>
+            <a:endParaRPr lang="en-US" dirty="0"/>
+          </a:p>
+        </p:txBody>
+      </p:sp>
+      <p:pic>
+        <p:nvPicPr>
+          <p:cNvPr id="4" name="Picture 3" descr="building blocks.png"/>
+          <p:cNvPicPr>
+            <a:picLocks noChangeAspect="1"/>
+          </p:cNvPicPr>
+          <p:nvPr/>
+        </p:nvPicPr>
+        <p:blipFill>
+          <a:blip r:embed="rId3">
+            <a:extLst>
+              <a:ext uri="{28A0092B-C50C-407E-A947-70E740481C1C}">
+                <a14:useLocalDpi xmlns:a14="http://schemas.microsoft.com/office/drawing/2010/main" val="0"/>
+              </a:ext>
+            </a:extLst>
+          </a:blip>
+          <a:stretch>
+            <a:fillRect/>
+          </a:stretch>
+        </p:blipFill>
+        <p:spPr>
+          <a:xfrm>
+            <a:off x="1035129" y="0"/>
+            <a:ext cx="8832405" cy="6858000"/>
+          </a:xfrm>
+          <a:prstGeom prst="rect">
+            <a:avLst/>
+          </a:prstGeom>
+        </p:spPr>
+      </p:pic>
+      <p:sp>
+        <p:nvSpPr>
+          <p:cNvPr id="3" name="Frame 2"/>
+          <p:cNvSpPr/>
+          <p:nvPr/>
+        </p:nvSpPr>
+        <p:spPr>
+          <a:xfrm>
+            <a:off x="5708566" y="2452093"/>
+            <a:ext cx="2338751" cy="2137722"/>
+          </a:xfrm>
+          <a:prstGeom prst="frame">
+            <a:avLst>
+              <a:gd name="adj1" fmla="val 4265"/>
+            </a:avLst>
+          </a:prstGeom>
+        </p:spPr>
+        <p:style>
+          <a:lnRef idx="1">
+            <a:schemeClr val="accent1"/>
+          </a:lnRef>
+          <a:fillRef idx="3">
+            <a:schemeClr val="accent1"/>
+          </a:fillRef>
+          <a:effectRef idx="2">
+            <a:schemeClr val="accent1"/>
+          </a:effectRef>
+          <a:fontRef idx="minor">
+            <a:schemeClr val="lt1"/>
+          </a:fontRef>
+        </p:style>
+        <p:txBody>
+          <a:bodyPr rtlCol="0" anchor="ctr"/>
+          <a:lstStyle/>
+          <a:p>
+            <a:pPr algn="ctr"/>
+            <a:endParaRPr lang="en-US">
+              <a:solidFill>
+                <a:schemeClr val="tx1"/>
+              </a:solidFill>
+            </a:endParaRPr>
+          </a:p>
+        </p:txBody>
+      </p:sp>
+    </p:spTree>
+    <p:extLst>
+      <p:ext uri="{BB962C8B-B14F-4D97-AF65-F5344CB8AC3E}">
+        <p14:creationId xmlns:p14="http://schemas.microsoft.com/office/powerpoint/2010/main" val="1199705719"/>
+      </p:ext>
+    </p:extLst>
+  </p:cSld>
+  <p:clrMapOvr>
+    <a:masterClrMapping/>
+  </p:clrMapOvr>
+  <p:timing>
+    <p:tnLst>
+      <p:par>
+        <p:cTn xmlns:p14="http://schemas.microsoft.com/office/powerpoint/2010/main" id="1" dur="indefinite" restart="never" nodeType="tmRoot"/>
+      </p:par>
+    </p:tnLst>
+  </p:timing>
+</p:sld>
+</file>
+
+<file path=ppt/slides/slide22.xml><?xml version="1.0" encoding="utf-8"?>
+<p:sld xmlns:a="http://schemas.openxmlformats.org/drawingml/2006/main" xmlns:r="http://schemas.openxmlformats.org/officeDocument/2006/relationships" xmlns:p="http://schemas.openxmlformats.org/presentationml/2006/main">
+  <p:cSld>
+    <p:spTree>
+      <p:nvGrpSpPr>
+        <p:cNvPr id="1" name=""/>
+        <p:cNvGrpSpPr/>
+        <p:nvPr/>
+      </p:nvGrpSpPr>
+      <p:grpSpPr>
+        <a:xfrm>
+          <a:off x="0" y="0"/>
+          <a:ext cx="0" cy="0"/>
+          <a:chOff x="0" y="0"/>
+          <a:chExt cx="0" cy="0"/>
+        </a:xfrm>
+      </p:grpSpPr>
+      <p:sp>
+        <p:nvSpPr>
+          <p:cNvPr id="2" name="Title 1"/>
+          <p:cNvSpPr>
+            <a:spLocks noGrp="1"/>
+          </p:cNvSpPr>
+          <p:nvPr>
+            <p:ph type="title"/>
+          </p:nvPr>
+        </p:nvSpPr>
+        <p:spPr/>
+        <p:txBody>
+          <a:bodyPr/>
+          <a:lstStyle/>
+          <a:p>
+            <a:pPr lvl="0"/>
+            <a:endParaRPr lang="en-US" dirty="0"/>
+          </a:p>
+        </p:txBody>
+      </p:sp>
+      <p:sp>
+        <p:nvSpPr>
+          <p:cNvPr id="5" name="TextBox 4"/>
+          <p:cNvSpPr txBox="1"/>
+          <p:nvPr/>
+        </p:nvSpPr>
+        <p:spPr>
+          <a:xfrm>
+            <a:off x="9906000" y="-1"/>
+            <a:ext cx="2286000" cy="2031325"/>
+          </a:xfrm>
+          <a:prstGeom prst="rect">
+            <a:avLst/>
+          </a:prstGeom>
+          <a:solidFill>
+            <a:srgbClr val="FFFF00"/>
+          </a:solidFill>
+          <a:ln>
+            <a:noFill/>
+          </a:ln>
+        </p:spPr>
+        <p:txBody>
+          <a:bodyPr wrap="square" rtlCol="0">
+            <a:spAutoFit/>
+          </a:bodyPr>
+          <a:lstStyle/>
+          <a:p>
+            <a:pPr algn="ctr"/>
+            <a:endParaRPr lang="en-US" dirty="0" smtClean="0"/>
+          </a:p>
+          <a:p>
+            <a:pPr algn="ctr"/>
+            <a:endParaRPr lang="en-US" dirty="0"/>
+          </a:p>
+          <a:p>
+            <a:pPr algn="ctr"/>
+            <a:r>
+              <a:rPr lang="en-US" dirty="0" smtClean="0"/>
+              <a:t>Please leave this area blank to allow for picture in picture recording</a:t>
+            </a:r>
+          </a:p>
+          <a:p>
+            <a:pPr algn="ctr"/>
+            <a:endParaRPr lang="en-US" dirty="0"/>
+          </a:p>
+        </p:txBody>
+      </p:sp>
+      <p:pic>
+        <p:nvPicPr>
+          <p:cNvPr id="4" name="Picture 3" descr="building blocks.png"/>
+          <p:cNvPicPr>
+            <a:picLocks noChangeAspect="1"/>
+          </p:cNvPicPr>
+          <p:nvPr/>
+        </p:nvPicPr>
+        <p:blipFill>
+          <a:blip r:embed="rId3">
+            <a:extLst>
+              <a:ext uri="{28A0092B-C50C-407E-A947-70E740481C1C}">
+                <a14:useLocalDpi xmlns:a14="http://schemas.microsoft.com/office/drawing/2010/main" val="0"/>
+              </a:ext>
+            </a:extLst>
+          </a:blip>
+          <a:stretch>
+            <a:fillRect/>
+          </a:stretch>
+        </p:blipFill>
+        <p:spPr>
+          <a:xfrm>
+            <a:off x="1035129" y="0"/>
+            <a:ext cx="8832405" cy="6858000"/>
+          </a:xfrm>
+          <a:prstGeom prst="rect">
+            <a:avLst/>
+          </a:prstGeom>
+        </p:spPr>
+      </p:pic>
+      <p:sp>
+        <p:nvSpPr>
+          <p:cNvPr id="3" name="Frame 2"/>
+          <p:cNvSpPr/>
+          <p:nvPr/>
+        </p:nvSpPr>
+        <p:spPr>
+          <a:xfrm>
+            <a:off x="5746288" y="4627539"/>
+            <a:ext cx="2338751" cy="2137722"/>
+          </a:xfrm>
+          <a:prstGeom prst="frame">
+            <a:avLst>
+              <a:gd name="adj1" fmla="val 4265"/>
+            </a:avLst>
+          </a:prstGeom>
+        </p:spPr>
+        <p:style>
+          <a:lnRef idx="1">
+            <a:schemeClr val="accent1"/>
+          </a:lnRef>
+          <a:fillRef idx="3">
+            <a:schemeClr val="accent1"/>
+          </a:fillRef>
+          <a:effectRef idx="2">
+            <a:schemeClr val="accent1"/>
+          </a:effectRef>
+          <a:fontRef idx="minor">
+            <a:schemeClr val="lt1"/>
+          </a:fontRef>
+        </p:style>
+        <p:txBody>
+          <a:bodyPr rtlCol="0" anchor="ctr"/>
+          <a:lstStyle/>
+          <a:p>
+            <a:pPr algn="ctr"/>
+            <a:endParaRPr lang="en-US">
+              <a:solidFill>
+                <a:schemeClr val="tx1"/>
+              </a:solidFill>
+            </a:endParaRPr>
+          </a:p>
+        </p:txBody>
+      </p:sp>
+    </p:spTree>
+    <p:extLst>
+      <p:ext uri="{BB962C8B-B14F-4D97-AF65-F5344CB8AC3E}">
+        <p14:creationId xmlns:p14="http://schemas.microsoft.com/office/powerpoint/2010/main" val="885376574"/>
+      </p:ext>
+    </p:extLst>
+  </p:cSld>
+  <p:clrMapOvr>
+    <a:masterClrMapping/>
+  </p:clrMapOvr>
+  <p:timing>
+    <p:tnLst>
+      <p:par>
+        <p:cTn xmlns:p14="http://schemas.microsoft.com/office/powerpoint/2010/main" id="1" dur="indefinite" restart="never" nodeType="tmRoot"/>
+      </p:par>
+    </p:tnLst>
+  </p:timing>
+</p:sld>
+</file>
+
+<file path=ppt/slides/slide23.xml><?xml version="1.0" encoding="utf-8"?>
+<p:sld xmlns:a="http://schemas.openxmlformats.org/drawingml/2006/main" xmlns:r="http://schemas.openxmlformats.org/officeDocument/2006/relationships" xmlns:p="http://schemas.openxmlformats.org/presentationml/2006/main">
+  <p:cSld>
+    <p:spTree>
+      <p:nvGrpSpPr>
+        <p:cNvPr id="1" name=""/>
+        <p:cNvGrpSpPr/>
+        <p:nvPr/>
+      </p:nvGrpSpPr>
+      <p:grpSpPr>
+        <a:xfrm>
+          <a:off x="0" y="0"/>
+          <a:ext cx="0" cy="0"/>
+          <a:chOff x="0" y="0"/>
+          <a:chExt cx="0" cy="0"/>
+        </a:xfrm>
+      </p:grpSpPr>
+      <p:sp>
+        <p:nvSpPr>
+          <p:cNvPr id="2" name="Title 1"/>
+          <p:cNvSpPr>
+            <a:spLocks noGrp="1"/>
+          </p:cNvSpPr>
+          <p:nvPr>
+            <p:ph type="title"/>
+          </p:nvPr>
+        </p:nvSpPr>
+        <p:spPr/>
+        <p:txBody>
+          <a:bodyPr/>
+          <a:lstStyle/>
+          <a:p>
+            <a:pPr lvl="0"/>
+            <a:endParaRPr lang="en-US" dirty="0"/>
+          </a:p>
+        </p:txBody>
+      </p:sp>
+      <p:sp>
+        <p:nvSpPr>
+          <p:cNvPr id="5" name="TextBox 4"/>
+          <p:cNvSpPr txBox="1"/>
+          <p:nvPr/>
+        </p:nvSpPr>
+        <p:spPr>
+          <a:xfrm>
+            <a:off x="9906000" y="-1"/>
+            <a:ext cx="2286000" cy="2031325"/>
+          </a:xfrm>
+          <a:prstGeom prst="rect">
+            <a:avLst/>
+          </a:prstGeom>
+          <a:solidFill>
+            <a:srgbClr val="FFFF00"/>
+          </a:solidFill>
+          <a:ln>
+            <a:noFill/>
+          </a:ln>
+        </p:spPr>
+        <p:txBody>
+          <a:bodyPr wrap="square" rtlCol="0">
+            <a:spAutoFit/>
+          </a:bodyPr>
+          <a:lstStyle/>
+          <a:p>
+            <a:pPr algn="ctr"/>
+            <a:endParaRPr lang="en-US" dirty="0" smtClean="0"/>
+          </a:p>
+          <a:p>
+            <a:pPr algn="ctr"/>
+            <a:endParaRPr lang="en-US" dirty="0"/>
+          </a:p>
+          <a:p>
+            <a:pPr algn="ctr"/>
+            <a:r>
+              <a:rPr lang="en-US" dirty="0" smtClean="0"/>
+              <a:t>Please leave this area blank to allow for picture in picture recording</a:t>
+            </a:r>
+          </a:p>
+          <a:p>
+            <a:pPr algn="ctr"/>
+            <a:endParaRPr lang="en-US" dirty="0"/>
+          </a:p>
+        </p:txBody>
+      </p:sp>
+      <p:pic>
+        <p:nvPicPr>
+          <p:cNvPr id="4" name="Picture 3" descr="building blocks.png"/>
+          <p:cNvPicPr>
+            <a:picLocks noChangeAspect="1"/>
+          </p:cNvPicPr>
+          <p:nvPr/>
+        </p:nvPicPr>
+        <p:blipFill>
+          <a:blip r:embed="rId3">
+            <a:extLst>
+              <a:ext uri="{28A0092B-C50C-407E-A947-70E740481C1C}">
+                <a14:useLocalDpi xmlns:a14="http://schemas.microsoft.com/office/drawing/2010/main" val="0"/>
+              </a:ext>
+            </a:extLst>
+          </a:blip>
+          <a:stretch>
+            <a:fillRect/>
+          </a:stretch>
+        </p:blipFill>
+        <p:spPr>
+          <a:xfrm>
+            <a:off x="1035129" y="0"/>
+            <a:ext cx="8832405" cy="6858000"/>
+          </a:xfrm>
+          <a:prstGeom prst="rect">
+            <a:avLst/>
+          </a:prstGeom>
+        </p:spPr>
+      </p:pic>
+      <p:sp>
+        <p:nvSpPr>
+          <p:cNvPr id="3" name="Frame 2"/>
+          <p:cNvSpPr/>
+          <p:nvPr/>
+        </p:nvSpPr>
+        <p:spPr>
+          <a:xfrm>
+            <a:off x="7732969" y="0"/>
+            <a:ext cx="2338751" cy="2137722"/>
+          </a:xfrm>
+          <a:prstGeom prst="frame">
+            <a:avLst>
+              <a:gd name="adj1" fmla="val 4265"/>
+            </a:avLst>
+          </a:prstGeom>
+        </p:spPr>
+        <p:style>
+          <a:lnRef idx="1">
+            <a:schemeClr val="accent1"/>
+          </a:lnRef>
+          <a:fillRef idx="3">
+            <a:schemeClr val="accent1"/>
+          </a:fillRef>
+          <a:effectRef idx="2">
+            <a:schemeClr val="accent1"/>
+          </a:effectRef>
+          <a:fontRef idx="minor">
+            <a:schemeClr val="lt1"/>
+          </a:fontRef>
+        </p:style>
+        <p:txBody>
+          <a:bodyPr rtlCol="0" anchor="ctr"/>
+          <a:lstStyle/>
+          <a:p>
+            <a:pPr algn="ctr"/>
+            <a:endParaRPr lang="en-US">
+              <a:solidFill>
+                <a:schemeClr val="tx1"/>
+              </a:solidFill>
+            </a:endParaRPr>
+          </a:p>
+        </p:txBody>
+      </p:sp>
+    </p:spTree>
+    <p:extLst>
+      <p:ext uri="{BB962C8B-B14F-4D97-AF65-F5344CB8AC3E}">
+        <p14:creationId xmlns:p14="http://schemas.microsoft.com/office/powerpoint/2010/main" val="3568945219"/>
+      </p:ext>
+    </p:extLst>
+  </p:cSld>
+  <p:clrMapOvr>
+    <a:masterClrMapping/>
+  </p:clrMapOvr>
+  <p:timing>
+    <p:tnLst>
+      <p:par>
+        <p:cTn xmlns:p14="http://schemas.microsoft.com/office/powerpoint/2010/main" id="1" dur="indefinite" restart="never" nodeType="tmRoot"/>
+      </p:par>
+    </p:tnLst>
+  </p:timing>
+</p:sld>
+</file>
+
+<file path=ppt/slides/slide24.xml><?xml version="1.0" encoding="utf-8"?>
+<p:sld xmlns:a="http://schemas.openxmlformats.org/drawingml/2006/main" xmlns:r="http://schemas.openxmlformats.org/officeDocument/2006/relationships" xmlns:p="http://schemas.openxmlformats.org/presentationml/2006/main">
+  <p:cSld>
+    <p:spTree>
+      <p:nvGrpSpPr>
+        <p:cNvPr id="1" name=""/>
+        <p:cNvGrpSpPr/>
+        <p:nvPr/>
+      </p:nvGrpSpPr>
+      <p:grpSpPr>
+        <a:xfrm>
+          <a:off x="0" y="0"/>
+          <a:ext cx="0" cy="0"/>
+          <a:chOff x="0" y="0"/>
+          <a:chExt cx="0" cy="0"/>
+        </a:xfrm>
+      </p:grpSpPr>
+      <p:sp>
+        <p:nvSpPr>
+          <p:cNvPr id="2" name="Title 1"/>
+          <p:cNvSpPr>
+            <a:spLocks noGrp="1"/>
+          </p:cNvSpPr>
+          <p:nvPr>
+            <p:ph type="title"/>
+          </p:nvPr>
+        </p:nvSpPr>
+        <p:spPr/>
+        <p:txBody>
+          <a:bodyPr/>
+          <a:lstStyle/>
+          <a:p>
+            <a:pPr lvl="0"/>
+            <a:endParaRPr lang="en-US" dirty="0"/>
+          </a:p>
+        </p:txBody>
+      </p:sp>
+      <p:sp>
+        <p:nvSpPr>
+          <p:cNvPr id="5" name="TextBox 4"/>
+          <p:cNvSpPr txBox="1"/>
+          <p:nvPr/>
+        </p:nvSpPr>
+        <p:spPr>
+          <a:xfrm>
+            <a:off x="9906000" y="-1"/>
+            <a:ext cx="2286000" cy="2031325"/>
+          </a:xfrm>
+          <a:prstGeom prst="rect">
+            <a:avLst/>
+          </a:prstGeom>
+          <a:solidFill>
+            <a:srgbClr val="FFFF00"/>
+          </a:solidFill>
+          <a:ln>
+            <a:noFill/>
+          </a:ln>
+        </p:spPr>
+        <p:txBody>
+          <a:bodyPr wrap="square" rtlCol="0">
+            <a:spAutoFit/>
+          </a:bodyPr>
+          <a:lstStyle/>
+          <a:p>
+            <a:pPr algn="ctr"/>
+            <a:endParaRPr lang="en-US" dirty="0" smtClean="0"/>
+          </a:p>
+          <a:p>
+            <a:pPr algn="ctr"/>
+            <a:endParaRPr lang="en-US" dirty="0"/>
+          </a:p>
+          <a:p>
+            <a:pPr algn="ctr"/>
+            <a:r>
+              <a:rPr lang="en-US" dirty="0" smtClean="0"/>
+              <a:t>Please leave this area blank to allow for picture in picture recording</a:t>
+            </a:r>
+          </a:p>
+          <a:p>
+            <a:pPr algn="ctr"/>
+            <a:endParaRPr lang="en-US" dirty="0"/>
+          </a:p>
+        </p:txBody>
+      </p:sp>
+      <p:pic>
+        <p:nvPicPr>
+          <p:cNvPr id="4" name="Picture 3" descr="building blocks.png"/>
+          <p:cNvPicPr>
+            <a:picLocks noChangeAspect="1"/>
+          </p:cNvPicPr>
+          <p:nvPr/>
+        </p:nvPicPr>
+        <p:blipFill>
+          <a:blip r:embed="rId3">
+            <a:extLst>
+              <a:ext uri="{28A0092B-C50C-407E-A947-70E740481C1C}">
+                <a14:useLocalDpi xmlns:a14="http://schemas.microsoft.com/office/drawing/2010/main" val="0"/>
+              </a:ext>
+            </a:extLst>
+          </a:blip>
+          <a:stretch>
+            <a:fillRect/>
+          </a:stretch>
+        </p:blipFill>
+        <p:spPr>
+          <a:xfrm>
+            <a:off x="1035129" y="0"/>
+            <a:ext cx="8832405" cy="6858000"/>
+          </a:xfrm>
+          <a:prstGeom prst="rect">
+            <a:avLst/>
+          </a:prstGeom>
+        </p:spPr>
+      </p:pic>
+      <p:sp>
+        <p:nvSpPr>
+          <p:cNvPr id="3" name="Frame 2"/>
+          <p:cNvSpPr/>
+          <p:nvPr/>
+        </p:nvSpPr>
+        <p:spPr>
+          <a:xfrm>
+            <a:off x="7820986" y="2250896"/>
+            <a:ext cx="2338751" cy="2540116"/>
+          </a:xfrm>
+          <a:prstGeom prst="frame">
+            <a:avLst>
+              <a:gd name="adj1" fmla="val 4265"/>
+            </a:avLst>
+          </a:prstGeom>
+        </p:spPr>
+        <p:style>
+          <a:lnRef idx="1">
+            <a:schemeClr val="accent1"/>
+          </a:lnRef>
+          <a:fillRef idx="3">
+            <a:schemeClr val="accent1"/>
+          </a:fillRef>
+          <a:effectRef idx="2">
+            <a:schemeClr val="accent1"/>
+          </a:effectRef>
+          <a:fontRef idx="minor">
+            <a:schemeClr val="lt1"/>
+          </a:fontRef>
+        </p:style>
+        <p:txBody>
+          <a:bodyPr rtlCol="0" anchor="ctr"/>
+          <a:lstStyle/>
+          <a:p>
+            <a:pPr algn="ctr"/>
+            <a:endParaRPr lang="en-US">
+              <a:solidFill>
+                <a:schemeClr val="tx1"/>
+              </a:solidFill>
+            </a:endParaRPr>
+          </a:p>
+        </p:txBody>
+      </p:sp>
+    </p:spTree>
+    <p:extLst>
+      <p:ext uri="{BB962C8B-B14F-4D97-AF65-F5344CB8AC3E}">
+        <p14:creationId xmlns:p14="http://schemas.microsoft.com/office/powerpoint/2010/main" val="2896891020"/>
+      </p:ext>
+    </p:extLst>
+  </p:cSld>
+  <p:clrMapOvr>
+    <a:masterClrMapping/>
+  </p:clrMapOvr>
+  <p:timing>
+    <p:tnLst>
+      <p:par>
+        <p:cTn xmlns:p14="http://schemas.microsoft.com/office/powerpoint/2010/main" id="1" dur="indefinite" restart="never" nodeType="tmRoot"/>
+      </p:par>
+    </p:tnLst>
+  </p:timing>
+</p:sld>
+</file>
+
+<file path=ppt/slides/slide25.xml><?xml version="1.0" encoding="utf-8"?>
+<p:sld xmlns:a="http://schemas.openxmlformats.org/drawingml/2006/main" xmlns:r="http://schemas.openxmlformats.org/officeDocument/2006/relationships" xmlns:p="http://schemas.openxmlformats.org/presentationml/2006/main">
+  <p:cSld>
+    <p:spTree>
+      <p:nvGrpSpPr>
+        <p:cNvPr id="1" name=""/>
+        <p:cNvGrpSpPr/>
+        <p:nvPr/>
+      </p:nvGrpSpPr>
+      <p:grpSpPr>
+        <a:xfrm>
+          <a:off x="0" y="0"/>
+          <a:ext cx="0" cy="0"/>
+          <a:chOff x="0" y="0"/>
+          <a:chExt cx="0" cy="0"/>
+        </a:xfrm>
+      </p:grpSpPr>
+    </p:spTree>
+    <p:extLst>
+      <p:ext uri="{BB962C8B-B14F-4D97-AF65-F5344CB8AC3E}">
+        <p14:creationId xmlns:p14="http://schemas.microsoft.com/office/powerpoint/2010/main" val="898363405"/>
+      </p:ext>
+    </p:extLst>
+  </p:cSld>
+  <p:clrMapOvr>
+    <a:masterClrMapping/>
+  </p:clrMapOvr>
   <p:timing>
     <p:tnLst>
       <p:par>

</xml_diff>

<commit_message>
Adding a bunch of slides for talk 02
</commit_message>
<xml_diff>
--- a/presentations/02 - Application Architecture.pptx
+++ b/presentations/02 - Application Architecture.pptx
@@ -5,10 +5,10 @@
     <p:sldMasterId id="2147483660" r:id="rId4"/>
   </p:sldMasterIdLst>
   <p:notesMasterIdLst>
-    <p:notesMasterId r:id="rId30"/>
+    <p:notesMasterId r:id="rId43"/>
   </p:notesMasterIdLst>
   <p:handoutMasterIdLst>
-    <p:handoutMasterId r:id="rId31"/>
+    <p:handoutMasterId r:id="rId44"/>
   </p:handoutMasterIdLst>
   <p:sldIdLst>
     <p:sldId id="271" r:id="rId5"/>
@@ -20,22 +20,35 @@
     <p:sldId id="287" r:id="rId11"/>
     <p:sldId id="288" r:id="rId12"/>
     <p:sldId id="289" r:id="rId13"/>
-    <p:sldId id="290" r:id="rId14"/>
-    <p:sldId id="291" r:id="rId15"/>
-    <p:sldId id="292" r:id="rId16"/>
-    <p:sldId id="293" r:id="rId17"/>
-    <p:sldId id="294" r:id="rId18"/>
-    <p:sldId id="295" r:id="rId19"/>
-    <p:sldId id="297" r:id="rId20"/>
-    <p:sldId id="298" r:id="rId21"/>
-    <p:sldId id="299" r:id="rId22"/>
-    <p:sldId id="300" r:id="rId23"/>
-    <p:sldId id="296" r:id="rId24"/>
-    <p:sldId id="301" r:id="rId25"/>
-    <p:sldId id="302" r:id="rId26"/>
-    <p:sldId id="303" r:id="rId27"/>
-    <p:sldId id="304" r:id="rId28"/>
-    <p:sldId id="269" r:id="rId29"/>
+    <p:sldId id="291" r:id="rId14"/>
+    <p:sldId id="292" r:id="rId15"/>
+    <p:sldId id="293" r:id="rId16"/>
+    <p:sldId id="294" r:id="rId17"/>
+    <p:sldId id="295" r:id="rId18"/>
+    <p:sldId id="297" r:id="rId19"/>
+    <p:sldId id="298" r:id="rId20"/>
+    <p:sldId id="299" r:id="rId21"/>
+    <p:sldId id="300" r:id="rId22"/>
+    <p:sldId id="296" r:id="rId23"/>
+    <p:sldId id="301" r:id="rId24"/>
+    <p:sldId id="302" r:id="rId25"/>
+    <p:sldId id="303" r:id="rId26"/>
+    <p:sldId id="304" r:id="rId27"/>
+    <p:sldId id="306" r:id="rId28"/>
+    <p:sldId id="307" r:id="rId29"/>
+    <p:sldId id="308" r:id="rId30"/>
+    <p:sldId id="309" r:id="rId31"/>
+    <p:sldId id="310" r:id="rId32"/>
+    <p:sldId id="311" r:id="rId33"/>
+    <p:sldId id="312" r:id="rId34"/>
+    <p:sldId id="313" r:id="rId35"/>
+    <p:sldId id="314" r:id="rId36"/>
+    <p:sldId id="315" r:id="rId37"/>
+    <p:sldId id="319" r:id="rId38"/>
+    <p:sldId id="318" r:id="rId39"/>
+    <p:sldId id="316" r:id="rId40"/>
+    <p:sldId id="317" r:id="rId41"/>
+    <p:sldId id="269" r:id="rId42"/>
   </p:sldIdLst>
   <p:sldSz cx="12192000" cy="6858000"/>
   <p:notesSz cx="6858000" cy="9144000"/>
@@ -136,10 +149,21 @@
   </p:defaultTextStyle>
   <p:extLst>
     <p:ext uri="{EFAFB233-063F-42B5-8137-9DF3F51BA10A}">
-      <p15:sldGuideLst xmlns:p15="http://schemas.microsoft.com/office/powerpoint/2012/main" xmlns=""/>
+      <p15:sldGuideLst xmlns:p15="http://schemas.microsoft.com/office/powerpoint/2012/main">
+        <p15:guide id="1" orient="horz" pos="2160">
+          <p15:clr>
+            <a:srgbClr val="A4A3A4"/>
+          </p15:clr>
+        </p15:guide>
+        <p15:guide id="2" pos="3840">
+          <p15:clr>
+            <a:srgbClr val="A4A3A4"/>
+          </p15:clr>
+        </p15:guide>
+      </p15:sldGuideLst>
     </p:ext>
     <p:ext uri="{2D200454-40CA-4A62-9FC3-DE9A4176ACB9}">
-      <p15:notesGuideLst xmlns:p15="http://schemas.microsoft.com/office/powerpoint/2012/main" xmlns=""/>
+      <p15:notesGuideLst xmlns:p15="http://schemas.microsoft.com/office/powerpoint/2012/main"/>
     </p:ext>
   </p:extLst>
 </p:presentation>
@@ -227,7 +251,7 @@
           <a:p>
             <a:fld id="{312E7B4A-039C-48A2-9B2C-AF16AA3873D8}" type="datetimeFigureOut">
               <a:rPr lang="en-US" smtClean="0"/>
-              <a:t>2015-10-17</a:t>
+              <a:t>11/4/2015</a:t>
             </a:fld>
             <a:endParaRPr lang="en-US"/>
           </a:p>
@@ -392,7 +416,7 @@
           <a:p>
             <a:fld id="{DA005A0C-54D9-45AA-87D4-C551D08DFCE1}" type="datetimeFigureOut">
               <a:rPr lang="en-US" smtClean="0"/>
-              <a:t>2015-10-17</a:t>
+              <a:t>11/4/2015</a:t>
             </a:fld>
             <a:endParaRPr lang="en-US"/>
           </a:p>
@@ -2205,7 +2229,371 @@
     </p:spTree>
     <p:extLst>
       <p:ext uri="{BB962C8B-B14F-4D97-AF65-F5344CB8AC3E}">
-        <p14:creationId xmlns:p14="http://schemas.microsoft.com/office/powerpoint/2010/main" val="2911304509"/>
+        <p14:creationId xmlns:p14="http://schemas.microsoft.com/office/powerpoint/2010/main" val="1673947830"/>
+      </p:ext>
+    </p:extLst>
+  </p:cSld>
+  <p:clrMapOvr>
+    <a:masterClrMapping/>
+  </p:clrMapOvr>
+</p:notes>
+</file>
+
+<file path=ppt/notesSlides/notesSlide25.xml><?xml version="1.0" encoding="utf-8"?>
+<p:notes xmlns:a="http://schemas.openxmlformats.org/drawingml/2006/main" xmlns:r="http://schemas.openxmlformats.org/officeDocument/2006/relationships" xmlns:p="http://schemas.openxmlformats.org/presentationml/2006/main">
+  <p:cSld>
+    <p:spTree>
+      <p:nvGrpSpPr>
+        <p:cNvPr id="1" name=""/>
+        <p:cNvGrpSpPr/>
+        <p:nvPr/>
+      </p:nvGrpSpPr>
+      <p:grpSpPr>
+        <a:xfrm>
+          <a:off x="0" y="0"/>
+          <a:ext cx="0" cy="0"/>
+          <a:chOff x="0" y="0"/>
+          <a:chExt cx="0" cy="0"/>
+        </a:xfrm>
+      </p:grpSpPr>
+      <p:sp>
+        <p:nvSpPr>
+          <p:cNvPr id="2" name="Slide Image Placeholder 1"/>
+          <p:cNvSpPr>
+            <a:spLocks noGrp="1" noRot="1" noChangeAspect="1"/>
+          </p:cNvSpPr>
+          <p:nvPr>
+            <p:ph type="sldImg"/>
+          </p:nvPr>
+        </p:nvSpPr>
+        <p:spPr/>
+      </p:sp>
+      <p:sp>
+        <p:nvSpPr>
+          <p:cNvPr id="3" name="Notes Placeholder 2"/>
+          <p:cNvSpPr>
+            <a:spLocks noGrp="1"/>
+          </p:cNvSpPr>
+          <p:nvPr>
+            <p:ph type="body" idx="1"/>
+          </p:nvPr>
+        </p:nvSpPr>
+        <p:spPr/>
+        <p:txBody>
+          <a:bodyPr/>
+          <a:lstStyle/>
+          <a:p>
+            <a:r>
+              <a:rPr lang="en-US" dirty="0" smtClean="0"/>
+              <a:t>Event listeners perform</a:t>
+            </a:r>
+            <a:r>
+              <a:rPr lang="en-US" baseline="0" dirty="0" smtClean="0"/>
+              <a:t> dependent actions – update other views, publish messages on external busses, notify users</a:t>
+            </a:r>
+            <a:endParaRPr lang="en-US" dirty="0"/>
+          </a:p>
+        </p:txBody>
+      </p:sp>
+      <p:sp>
+        <p:nvSpPr>
+          <p:cNvPr id="4" name="Slide Number Placeholder 3"/>
+          <p:cNvSpPr>
+            <a:spLocks noGrp="1"/>
+          </p:cNvSpPr>
+          <p:nvPr>
+            <p:ph type="sldNum" sz="quarter" idx="10"/>
+          </p:nvPr>
+        </p:nvSpPr>
+        <p:spPr/>
+        <p:txBody>
+          <a:bodyPr/>
+          <a:lstStyle/>
+          <a:p>
+            <a:fld id="{4CFD207A-07DF-40AD-A916-9872E089CE7A}" type="slidenum">
+              <a:rPr lang="en-US" smtClean="0"/>
+              <a:t>34</a:t>
+            </a:fld>
+            <a:endParaRPr lang="en-US"/>
+          </a:p>
+        </p:txBody>
+      </p:sp>
+    </p:spTree>
+    <p:extLst>
+      <p:ext uri="{BB962C8B-B14F-4D97-AF65-F5344CB8AC3E}">
+        <p14:creationId xmlns:p14="http://schemas.microsoft.com/office/powerpoint/2010/main" val="1145526127"/>
+      </p:ext>
+    </p:extLst>
+  </p:cSld>
+  <p:clrMapOvr>
+    <a:masterClrMapping/>
+  </p:clrMapOvr>
+</p:notes>
+</file>
+
+<file path=ppt/notesSlides/notesSlide26.xml><?xml version="1.0" encoding="utf-8"?>
+<p:notes xmlns:a="http://schemas.openxmlformats.org/drawingml/2006/main" xmlns:r="http://schemas.openxmlformats.org/officeDocument/2006/relationships" xmlns:p="http://schemas.openxmlformats.org/presentationml/2006/main">
+  <p:cSld>
+    <p:spTree>
+      <p:nvGrpSpPr>
+        <p:cNvPr id="1" name=""/>
+        <p:cNvGrpSpPr/>
+        <p:nvPr/>
+      </p:nvGrpSpPr>
+      <p:grpSpPr>
+        <a:xfrm>
+          <a:off x="0" y="0"/>
+          <a:ext cx="0" cy="0"/>
+          <a:chOff x="0" y="0"/>
+          <a:chExt cx="0" cy="0"/>
+        </a:xfrm>
+      </p:grpSpPr>
+      <p:sp>
+        <p:nvSpPr>
+          <p:cNvPr id="2" name="Slide Image Placeholder 1"/>
+          <p:cNvSpPr>
+            <a:spLocks noGrp="1" noRot="1" noChangeAspect="1"/>
+          </p:cNvSpPr>
+          <p:nvPr>
+            <p:ph type="sldImg"/>
+          </p:nvPr>
+        </p:nvSpPr>
+        <p:spPr/>
+      </p:sp>
+      <p:sp>
+        <p:nvSpPr>
+          <p:cNvPr id="3" name="Notes Placeholder 2"/>
+          <p:cNvSpPr>
+            <a:spLocks noGrp="1"/>
+          </p:cNvSpPr>
+          <p:nvPr>
+            <p:ph type="body" idx="1"/>
+          </p:nvPr>
+        </p:nvSpPr>
+        <p:spPr/>
+        <p:txBody>
+          <a:bodyPr/>
+          <a:lstStyle/>
+          <a:p>
+            <a:r>
+              <a:rPr lang="en-US" dirty="0" smtClean="0"/>
+              <a:t>Drop to visual studio</a:t>
+            </a:r>
+            <a:endParaRPr lang="en-US" dirty="0"/>
+          </a:p>
+        </p:txBody>
+      </p:sp>
+      <p:sp>
+        <p:nvSpPr>
+          <p:cNvPr id="4" name="Slide Number Placeholder 3"/>
+          <p:cNvSpPr>
+            <a:spLocks noGrp="1"/>
+          </p:cNvSpPr>
+          <p:nvPr>
+            <p:ph type="sldNum" sz="quarter" idx="10"/>
+          </p:nvPr>
+        </p:nvSpPr>
+        <p:spPr/>
+        <p:txBody>
+          <a:bodyPr/>
+          <a:lstStyle/>
+          <a:p>
+            <a:fld id="{4CFD207A-07DF-40AD-A916-9872E089CE7A}" type="slidenum">
+              <a:rPr lang="en-US" smtClean="0"/>
+              <a:t>35</a:t>
+            </a:fld>
+            <a:endParaRPr lang="en-US"/>
+          </a:p>
+        </p:txBody>
+      </p:sp>
+    </p:spTree>
+    <p:extLst>
+      <p:ext uri="{BB962C8B-B14F-4D97-AF65-F5344CB8AC3E}">
+        <p14:creationId xmlns:p14="http://schemas.microsoft.com/office/powerpoint/2010/main" val="2620648370"/>
+      </p:ext>
+    </p:extLst>
+  </p:cSld>
+  <p:clrMapOvr>
+    <a:masterClrMapping/>
+  </p:clrMapOvr>
+</p:notes>
+</file>
+
+<file path=ppt/notesSlides/notesSlide27.xml><?xml version="1.0" encoding="utf-8"?>
+<p:notes xmlns:a="http://schemas.openxmlformats.org/drawingml/2006/main" xmlns:r="http://schemas.openxmlformats.org/officeDocument/2006/relationships" xmlns:p="http://schemas.openxmlformats.org/presentationml/2006/main">
+  <p:cSld>
+    <p:spTree>
+      <p:nvGrpSpPr>
+        <p:cNvPr id="1" name=""/>
+        <p:cNvGrpSpPr/>
+        <p:nvPr/>
+      </p:nvGrpSpPr>
+      <p:grpSpPr>
+        <a:xfrm>
+          <a:off x="0" y="0"/>
+          <a:ext cx="0" cy="0"/>
+          <a:chOff x="0" y="0"/>
+          <a:chExt cx="0" cy="0"/>
+        </a:xfrm>
+      </p:grpSpPr>
+      <p:sp>
+        <p:nvSpPr>
+          <p:cNvPr id="2" name="Slide Image Placeholder 1"/>
+          <p:cNvSpPr>
+            <a:spLocks noGrp="1" noRot="1" noChangeAspect="1"/>
+          </p:cNvSpPr>
+          <p:nvPr>
+            <p:ph type="sldImg"/>
+          </p:nvPr>
+        </p:nvSpPr>
+        <p:spPr/>
+      </p:sp>
+      <p:sp>
+        <p:nvSpPr>
+          <p:cNvPr id="3" name="Notes Placeholder 2"/>
+          <p:cNvSpPr>
+            <a:spLocks noGrp="1"/>
+          </p:cNvSpPr>
+          <p:nvPr>
+            <p:ph type="body" idx="1"/>
+          </p:nvPr>
+        </p:nvSpPr>
+        <p:spPr/>
+        <p:txBody>
+          <a:bodyPr/>
+          <a:lstStyle/>
+          <a:p>
+            <a:r>
+              <a:rPr lang="en-US" dirty="0" smtClean="0"/>
+              <a:t>There</a:t>
+            </a:r>
+            <a:r>
+              <a:rPr lang="en-US" baseline="0" dirty="0" smtClean="0"/>
+              <a:t> have been a lot of passwords stolen as of late. No matter how good your password security there could be a flaw which will let criminals &lt;space&gt; to steal your passwords or other user details.</a:t>
+            </a:r>
+            <a:endParaRPr lang="en-US" dirty="0"/>
+          </a:p>
+        </p:txBody>
+      </p:sp>
+      <p:sp>
+        <p:nvSpPr>
+          <p:cNvPr id="4" name="Slide Number Placeholder 3"/>
+          <p:cNvSpPr>
+            <a:spLocks noGrp="1"/>
+          </p:cNvSpPr>
+          <p:nvPr>
+            <p:ph type="sldNum" sz="quarter" idx="10"/>
+          </p:nvPr>
+        </p:nvSpPr>
+        <p:spPr/>
+        <p:txBody>
+          <a:bodyPr/>
+          <a:lstStyle/>
+          <a:p>
+            <a:fld id="{4CFD207A-07DF-40AD-A916-9872E089CE7A}" type="slidenum">
+              <a:rPr lang="en-US" smtClean="0"/>
+              <a:t>36</a:t>
+            </a:fld>
+            <a:endParaRPr lang="en-US"/>
+          </a:p>
+        </p:txBody>
+      </p:sp>
+    </p:spTree>
+    <p:extLst>
+      <p:ext uri="{BB962C8B-B14F-4D97-AF65-F5344CB8AC3E}">
+        <p14:creationId xmlns:p14="http://schemas.microsoft.com/office/powerpoint/2010/main" val="1797376832"/>
+      </p:ext>
+    </p:extLst>
+  </p:cSld>
+  <p:clrMapOvr>
+    <a:masterClrMapping/>
+  </p:clrMapOvr>
+</p:notes>
+</file>
+
+<file path=ppt/notesSlides/notesSlide28.xml><?xml version="1.0" encoding="utf-8"?>
+<p:notes xmlns:a="http://schemas.openxmlformats.org/drawingml/2006/main" xmlns:r="http://schemas.openxmlformats.org/officeDocument/2006/relationships" xmlns:p="http://schemas.openxmlformats.org/presentationml/2006/main">
+  <p:cSld>
+    <p:spTree>
+      <p:nvGrpSpPr>
+        <p:cNvPr id="1" name=""/>
+        <p:cNvGrpSpPr/>
+        <p:nvPr/>
+      </p:nvGrpSpPr>
+      <p:grpSpPr>
+        <a:xfrm>
+          <a:off x="0" y="0"/>
+          <a:ext cx="0" cy="0"/>
+          <a:chOff x="0" y="0"/>
+          <a:chExt cx="0" cy="0"/>
+        </a:xfrm>
+      </p:grpSpPr>
+      <p:sp>
+        <p:nvSpPr>
+          <p:cNvPr id="2" name="Slide Image Placeholder 1"/>
+          <p:cNvSpPr>
+            <a:spLocks noGrp="1" noRot="1" noChangeAspect="1"/>
+          </p:cNvSpPr>
+          <p:nvPr>
+            <p:ph type="sldImg"/>
+          </p:nvPr>
+        </p:nvSpPr>
+        <p:spPr/>
+      </p:sp>
+      <p:sp>
+        <p:nvSpPr>
+          <p:cNvPr id="3" name="Notes Placeholder 2"/>
+          <p:cNvSpPr>
+            <a:spLocks noGrp="1"/>
+          </p:cNvSpPr>
+          <p:nvPr>
+            <p:ph type="body" idx="1"/>
+          </p:nvPr>
+        </p:nvSpPr>
+        <p:spPr/>
+        <p:txBody>
+          <a:bodyPr/>
+          <a:lstStyle/>
+          <a:p>
+            <a:r>
+              <a:rPr lang="en-US" dirty="0" smtClean="0"/>
+              <a:t>Instead of storing</a:t>
+            </a:r>
+            <a:r>
+              <a:rPr lang="en-US" baseline="0" dirty="0" smtClean="0"/>
+              <a:t> passwords why don’t we just keep them somewhere else? We can use a service like twitter to do our authentication for us. That way when the criminals come calling there is nothing for them to steal.</a:t>
+            </a:r>
+            <a:endParaRPr lang="en-US" dirty="0"/>
+          </a:p>
+        </p:txBody>
+      </p:sp>
+      <p:sp>
+        <p:nvSpPr>
+          <p:cNvPr id="4" name="Slide Number Placeholder 3"/>
+          <p:cNvSpPr>
+            <a:spLocks noGrp="1"/>
+          </p:cNvSpPr>
+          <p:nvPr>
+            <p:ph type="sldNum" sz="quarter" idx="10"/>
+          </p:nvPr>
+        </p:nvSpPr>
+        <p:spPr/>
+        <p:txBody>
+          <a:bodyPr/>
+          <a:lstStyle/>
+          <a:p>
+            <a:fld id="{4CFD207A-07DF-40AD-A916-9872E089CE7A}" type="slidenum">
+              <a:rPr lang="en-US" smtClean="0"/>
+              <a:t>37</a:t>
+            </a:fld>
+            <a:endParaRPr lang="en-US"/>
+          </a:p>
+        </p:txBody>
+      </p:sp>
+    </p:spTree>
+    <p:extLst>
+      <p:ext uri="{BB962C8B-B14F-4D97-AF65-F5344CB8AC3E}">
+        <p14:creationId xmlns:p14="http://schemas.microsoft.com/office/powerpoint/2010/main" val="3881768025"/>
       </p:ext>
     </p:extLst>
   </p:cSld>
@@ -3240,13 +3628,13 @@
   <p:timing>
     <p:tnLst>
       <p:par>
-        <p:cTn xmlns:p14="http://schemas.microsoft.com/office/powerpoint/2010/main" id="1" dur="indefinite" restart="never" nodeType="tmRoot"/>
+        <p:cTn id="1" dur="indefinite" restart="never" nodeType="tmRoot"/>
       </p:par>
     </p:tnLst>
   </p:timing>
   <p:extLst mod="1">
     <p:ext uri="{DCECCB84-F9BA-43D5-87BE-67443E8EF086}">
-      <p15:sldGuideLst xmlns:p15="http://schemas.microsoft.com/office/powerpoint/2012/main" xmlns="">
+      <p15:sldGuideLst xmlns:p15="http://schemas.microsoft.com/office/powerpoint/2012/main">
         <p15:guide id="1" orient="horz" pos="3792">
           <p15:clr>
             <a:srgbClr val="FBAE40"/>
@@ -3479,7 +3867,7 @@
   <p:timing>
     <p:tnLst>
       <p:par>
-        <p:cTn xmlns:p14="http://schemas.microsoft.com/office/powerpoint/2010/main" id="1" dur="indefinite" restart="never" nodeType="tmRoot"/>
+        <p:cTn id="1" dur="indefinite" restart="never" nodeType="tmRoot"/>
       </p:par>
     </p:tnLst>
   </p:timing>
@@ -3638,7 +4026,7 @@
   <p:timing>
     <p:tnLst>
       <p:par>
-        <p:cTn xmlns:p14="http://schemas.microsoft.com/office/powerpoint/2010/main" id="1" dur="indefinite" restart="never" nodeType="tmRoot"/>
+        <p:cTn id="1" dur="indefinite" restart="never" nodeType="tmRoot"/>
       </p:par>
     </p:tnLst>
   </p:timing>
@@ -3878,7 +4266,7 @@
   <p:timing>
     <p:tnLst>
       <p:par>
-        <p:cTn xmlns:p14="http://schemas.microsoft.com/office/powerpoint/2010/main" id="1" dur="indefinite" restart="never" nodeType="tmRoot"/>
+        <p:cTn id="1" dur="indefinite" restart="never" nodeType="tmRoot"/>
       </p:par>
     </p:tnLst>
   </p:timing>
@@ -4270,7 +4658,7 @@
   <p:timing>
     <p:tnLst>
       <p:par>
-        <p:cTn xmlns:p14="http://schemas.microsoft.com/office/powerpoint/2010/main" id="1" dur="indefinite" restart="never" nodeType="tmRoot"/>
+        <p:cTn id="1" dur="indefinite" restart="never" nodeType="tmRoot"/>
       </p:par>
     </p:tnLst>
   </p:timing>
@@ -4330,7 +4718,7 @@
   <p:timing>
     <p:tnLst>
       <p:par>
-        <p:cTn xmlns:p14="http://schemas.microsoft.com/office/powerpoint/2010/main" id="1" dur="indefinite" restart="never" nodeType="tmRoot"/>
+        <p:cTn id="1" dur="indefinite" restart="never" nodeType="tmRoot"/>
       </p:par>
     </p:tnLst>
   </p:timing>
@@ -4367,7 +4755,7 @@
   <p:timing>
     <p:tnLst>
       <p:par>
-        <p:cTn xmlns:p14="http://schemas.microsoft.com/office/powerpoint/2010/main" id="1" dur="indefinite" restart="never" nodeType="tmRoot"/>
+        <p:cTn id="1" dur="indefinite" restart="never" nodeType="tmRoot"/>
       </p:par>
     </p:tnLst>
   </p:timing>
@@ -4578,7 +4966,7 @@
   <p:timing>
     <p:tnLst>
       <p:par>
-        <p:cTn xmlns:p14="http://schemas.microsoft.com/office/powerpoint/2010/main" id="1" dur="indefinite" restart="never" nodeType="tmRoot"/>
+        <p:cTn id="1" dur="indefinite" restart="never" nodeType="tmRoot"/>
       </p:par>
     </p:tnLst>
   </p:timing>
@@ -4661,7 +5049,7 @@
   <p:timing>
     <p:tnLst>
       <p:par>
-        <p:cTn xmlns:p14="http://schemas.microsoft.com/office/powerpoint/2010/main" id="1" dur="indefinite" restart="never" nodeType="tmRoot"/>
+        <p:cTn id="1" dur="indefinite" restart="never" nodeType="tmRoot"/>
       </p:par>
     </p:tnLst>
   </p:timing>
@@ -4961,13 +5349,8 @@
           <a:p>
             <a:r>
               <a:rPr lang="en-US" dirty="0" smtClean="0"/>
-              <a:t>James Chambers</a:t>
-            </a:r>
-            <a:r>
-              <a:rPr lang="en-US" dirty="0" smtClean="0"/>
-              <a:t>| Senior Software Developer</a:t>
-            </a:r>
-            <a:endParaRPr lang="en-US" dirty="0" smtClean="0"/>
+              <a:t>James Chambers| Senior Software Developer</a:t>
+            </a:r>
           </a:p>
           <a:p>
             <a:r>
@@ -5018,7 +5401,7 @@
   <p:timing>
     <p:tnLst>
       <p:par>
-        <p:cTn xmlns:p14="http://schemas.microsoft.com/office/powerpoint/2010/main" id="1" dur="indefinite" restart="never" nodeType="tmRoot"/>
+        <p:cTn id="1" dur="indefinite" restart="never" nodeType="tmRoot"/>
       </p:par>
     </p:tnLst>
   </p:timing>
@@ -5097,7 +5480,24 @@
               <a:rPr lang="en-US" dirty="0" smtClean="0"/>
               <a:t>Easy to support polyglot persistence </a:t>
             </a:r>
-            <a:endParaRPr lang="en-US" dirty="0"/>
+          </a:p>
+          <a:p>
+            <a:r>
+              <a:rPr lang="en-US" dirty="0" smtClean="0"/>
+              <a:t>Check out the </a:t>
+            </a:r>
+            <a:r>
+              <a:rPr lang="en-US" dirty="0"/>
+              <a:t>CQRS Journey https://</a:t>
+            </a:r>
+            <a:r>
+              <a:rPr lang="en-US" dirty="0" err="1"/>
+              <a:t>cqrsjourney.github.io</a:t>
+            </a:r>
+            <a:r>
+              <a:rPr lang="en-US" dirty="0"/>
+              <a:t>/</a:t>
+            </a:r>
           </a:p>
           <a:p>
             <a:pPr lvl="1"/>
@@ -5155,7 +5555,7 @@
     </p:spTree>
     <p:extLst>
       <p:ext uri="{BB962C8B-B14F-4D97-AF65-F5344CB8AC3E}">
-        <p14:creationId xmlns:p14="http://schemas.microsoft.com/office/powerpoint/2010/main" val="1869842288"/>
+        <p14:creationId xmlns:p14="http://schemas.microsoft.com/office/powerpoint/2010/main" val="3603381802"/>
       </p:ext>
     </p:extLst>
   </p:cSld>
@@ -5165,7 +5565,7 @@
   <p:timing>
     <p:tnLst>
       <p:par>
-        <p:cTn xmlns:p14="http://schemas.microsoft.com/office/powerpoint/2010/main" id="1" dur="indefinite" restart="never" nodeType="tmRoot"/>
+        <p:cTn id="1" dur="indefinite" restart="never" nodeType="tmRoot"/>
       </p:par>
     </p:tnLst>
   </p:timing>
@@ -5207,66 +5607,9 @@
             <a:pPr lvl="0"/>
             <a:r>
               <a:rPr lang="en-US" dirty="0" smtClean="0"/>
-              <a:t>CQRS?</a:t>
-            </a:r>
-            <a:endParaRPr lang="en-US" dirty="0"/>
-          </a:p>
-        </p:txBody>
-      </p:sp>
-      <p:sp>
-        <p:nvSpPr>
-          <p:cNvPr id="3" name="Content Placeholder 2"/>
-          <p:cNvSpPr>
-            <a:spLocks noGrp="1"/>
-          </p:cNvSpPr>
-          <p:nvPr>
-            <p:ph sz="quarter" idx="10"/>
-          </p:nvPr>
-        </p:nvSpPr>
-        <p:spPr/>
-        <p:txBody>
-          <a:bodyPr/>
-          <a:lstStyle/>
-          <a:p>
-            <a:r>
-              <a:rPr lang="en-US" dirty="0" smtClean="0"/>
-              <a:t>Splitting read and write models</a:t>
-            </a:r>
-          </a:p>
-          <a:p>
-            <a:r>
-              <a:rPr lang="en-US" dirty="0" smtClean="0"/>
-              <a:t>Have multiple read models to facilitate different views of data</a:t>
-            </a:r>
-          </a:p>
-          <a:p>
-            <a:r>
-              <a:rPr lang="en-US" dirty="0" smtClean="0"/>
-              <a:t>Easy to support polyglot persistence </a:t>
-            </a:r>
-          </a:p>
-          <a:p>
-            <a:r>
-              <a:rPr lang="en-US" dirty="0" smtClean="0"/>
-              <a:t>Check out the </a:t>
-            </a:r>
-            <a:r>
-              <a:rPr lang="en-US" dirty="0"/>
-              <a:t>CQRS Journey https://</a:t>
-            </a:r>
-            <a:r>
-              <a:rPr lang="en-US" dirty="0" err="1"/>
-              <a:t>cqrsjourney.github.io</a:t>
-            </a:r>
-            <a:r>
-              <a:rPr lang="en-US" dirty="0"/>
-              <a:t>/</a:t>
-            </a:r>
-            <a:endParaRPr lang="en-US" dirty="0"/>
-          </a:p>
-          <a:p>
-            <a:pPr lvl="1"/>
-            <a:endParaRPr lang="en-US" dirty="0" smtClean="0"/>
+              <a:t>Our Building Blocks</a:t>
+            </a:r>
+            <a:endParaRPr lang="en-US" dirty="0"/>
           </a:p>
         </p:txBody>
       </p:sp>
@@ -5320,7 +5663,7 @@
     </p:spTree>
     <p:extLst>
       <p:ext uri="{BB962C8B-B14F-4D97-AF65-F5344CB8AC3E}">
-        <p14:creationId xmlns:p14="http://schemas.microsoft.com/office/powerpoint/2010/main" val="3603381802"/>
+        <p14:creationId xmlns:p14="http://schemas.microsoft.com/office/powerpoint/2010/main" val="2404553195"/>
       </p:ext>
     </p:extLst>
   </p:cSld>
@@ -5330,7 +5673,7 @@
   <p:timing>
     <p:tnLst>
       <p:par>
-        <p:cTn xmlns:p14="http://schemas.microsoft.com/office/powerpoint/2010/main" id="1" dur="indefinite" restart="never" nodeType="tmRoot"/>
+        <p:cTn id="1" dur="indefinite" restart="never" nodeType="tmRoot"/>
       </p:par>
     </p:tnLst>
   </p:timing>
@@ -5370,10 +5713,6 @@
           <a:lstStyle/>
           <a:p>
             <a:pPr lvl="0"/>
-            <a:r>
-              <a:rPr lang="en-US" dirty="0" smtClean="0"/>
-              <a:t>Our Building Blocks</a:t>
-            </a:r>
             <a:endParaRPr lang="en-US" dirty="0"/>
           </a:p>
         </p:txBody>
@@ -5425,10 +5764,40 @@
           </a:p>
         </p:txBody>
       </p:sp>
+      <p:pic>
+        <p:nvPicPr>
+          <p:cNvPr id="4" name="Picture 3" descr="building blocks.png"/>
+          <p:cNvPicPr>
+            <a:picLocks noChangeAspect="1"/>
+          </p:cNvPicPr>
+          <p:nvPr/>
+        </p:nvPicPr>
+        <p:blipFill>
+          <a:blip r:embed="rId3">
+            <a:extLst>
+              <a:ext uri="{28A0092B-C50C-407E-A947-70E740481C1C}">
+                <a14:useLocalDpi xmlns:a14="http://schemas.microsoft.com/office/drawing/2010/main" val="0"/>
+              </a:ext>
+            </a:extLst>
+          </a:blip>
+          <a:stretch>
+            <a:fillRect/>
+          </a:stretch>
+        </p:blipFill>
+        <p:spPr>
+          <a:xfrm>
+            <a:off x="1035129" y="0"/>
+            <a:ext cx="8832405" cy="6858000"/>
+          </a:xfrm>
+          <a:prstGeom prst="rect">
+            <a:avLst/>
+          </a:prstGeom>
+        </p:spPr>
+      </p:pic>
     </p:spTree>
     <p:extLst>
       <p:ext uri="{BB962C8B-B14F-4D97-AF65-F5344CB8AC3E}">
-        <p14:creationId xmlns:p14="http://schemas.microsoft.com/office/powerpoint/2010/main" val="2404553195"/>
+        <p14:creationId xmlns:p14="http://schemas.microsoft.com/office/powerpoint/2010/main" val="1986936089"/>
       </p:ext>
     </p:extLst>
   </p:cSld>
@@ -5438,7 +5807,7 @@
   <p:timing>
     <p:tnLst>
       <p:par>
-        <p:cTn xmlns:p14="http://schemas.microsoft.com/office/powerpoint/2010/main" id="1" dur="indefinite" restart="never" nodeType="tmRoot"/>
+        <p:cTn id="1" dur="indefinite" restart="never" nodeType="tmRoot"/>
       </p:par>
     </p:tnLst>
   </p:timing>
@@ -5559,10 +5928,54 @@
           </a:prstGeom>
         </p:spPr>
       </p:pic>
+      <p:sp>
+        <p:nvSpPr>
+          <p:cNvPr id="3" name="Frame 2"/>
+          <p:cNvSpPr/>
+          <p:nvPr/>
+        </p:nvSpPr>
+        <p:spPr>
+          <a:xfrm>
+            <a:off x="817306" y="-88024"/>
+            <a:ext cx="2338751" cy="2137722"/>
+          </a:xfrm>
+          <a:prstGeom prst="frame">
+            <a:avLst>
+              <a:gd name="adj1" fmla="val 4265"/>
+            </a:avLst>
+          </a:prstGeom>
+        </p:spPr>
+        <p:style>
+          <a:lnRef idx="1">
+            <a:schemeClr val="accent1"/>
+          </a:lnRef>
+          <a:fillRef idx="3">
+            <a:schemeClr val="accent1"/>
+          </a:fillRef>
+          <a:effectRef idx="2">
+            <a:schemeClr val="accent1"/>
+          </a:effectRef>
+          <a:fontRef idx="minor">
+            <a:schemeClr val="lt1"/>
+          </a:fontRef>
+        </p:style>
+        <p:txBody>
+          <a:bodyPr rtlCol="0" anchor="ctr"/>
+          <a:lstStyle/>
+          <a:p>
+            <a:pPr algn="ctr"/>
+            <a:endParaRPr lang="en-US">
+              <a:solidFill>
+                <a:schemeClr val="tx1"/>
+              </a:solidFill>
+            </a:endParaRPr>
+          </a:p>
+        </p:txBody>
+      </p:sp>
     </p:spTree>
     <p:extLst>
       <p:ext uri="{BB962C8B-B14F-4D97-AF65-F5344CB8AC3E}">
-        <p14:creationId xmlns:p14="http://schemas.microsoft.com/office/powerpoint/2010/main" val="1986936089"/>
+        <p14:creationId xmlns:p14="http://schemas.microsoft.com/office/powerpoint/2010/main" val="4265329461"/>
       </p:ext>
     </p:extLst>
   </p:cSld>
@@ -5572,7 +5985,7 @@
   <p:timing>
     <p:tnLst>
       <p:par>
-        <p:cTn xmlns:p14="http://schemas.microsoft.com/office/powerpoint/2010/main" id="1" dur="indefinite" restart="never" nodeType="tmRoot"/>
+        <p:cTn id="1" dur="indefinite" restart="never" nodeType="tmRoot"/>
       </p:par>
     </p:tnLst>
   </p:timing>
@@ -5701,7 +6114,7 @@
         </p:nvSpPr>
         <p:spPr>
           <a:xfrm>
-            <a:off x="817306" y="-88024"/>
+            <a:off x="804732" y="2087422"/>
             <a:ext cx="2338751" cy="2137722"/>
           </a:xfrm>
           <a:prstGeom prst="frame">
@@ -5740,7 +6153,7 @@
     </p:spTree>
     <p:extLst>
       <p:ext uri="{BB962C8B-B14F-4D97-AF65-F5344CB8AC3E}">
-        <p14:creationId xmlns:p14="http://schemas.microsoft.com/office/powerpoint/2010/main" val="4265329461"/>
+        <p14:creationId xmlns:p14="http://schemas.microsoft.com/office/powerpoint/2010/main" val="1071215674"/>
       </p:ext>
     </p:extLst>
   </p:cSld>
@@ -5750,7 +6163,7 @@
   <p:timing>
     <p:tnLst>
       <p:par>
-        <p:cTn xmlns:p14="http://schemas.microsoft.com/office/powerpoint/2010/main" id="1" dur="indefinite" restart="never" nodeType="tmRoot"/>
+        <p:cTn id="1" dur="indefinite" restart="never" nodeType="tmRoot"/>
       </p:par>
     </p:tnLst>
   </p:timing>
@@ -5879,7 +6292,7 @@
         </p:nvSpPr>
         <p:spPr>
           <a:xfrm>
-            <a:off x="804732" y="2087422"/>
+            <a:off x="792158" y="4627538"/>
             <a:ext cx="2338751" cy="2137722"/>
           </a:xfrm>
           <a:prstGeom prst="frame">
@@ -5918,7 +6331,7 @@
     </p:spTree>
     <p:extLst>
       <p:ext uri="{BB962C8B-B14F-4D97-AF65-F5344CB8AC3E}">
-        <p14:creationId xmlns:p14="http://schemas.microsoft.com/office/powerpoint/2010/main" val="1071215674"/>
+        <p14:creationId xmlns:p14="http://schemas.microsoft.com/office/powerpoint/2010/main" val="4219127862"/>
       </p:ext>
     </p:extLst>
   </p:cSld>
@@ -5928,7 +6341,7 @@
   <p:timing>
     <p:tnLst>
       <p:par>
-        <p:cTn xmlns:p14="http://schemas.microsoft.com/office/powerpoint/2010/main" id="1" dur="indefinite" restart="never" nodeType="tmRoot"/>
+        <p:cTn id="1" dur="indefinite" restart="never" nodeType="tmRoot"/>
       </p:par>
     </p:tnLst>
   </p:timing>
@@ -6057,7 +6470,7 @@
         </p:nvSpPr>
         <p:spPr>
           <a:xfrm>
-            <a:off x="792158" y="4627538"/>
+            <a:off x="3281797" y="-100599"/>
             <a:ext cx="2338751" cy="2137722"/>
           </a:xfrm>
           <a:prstGeom prst="frame">
@@ -6096,7 +6509,7 @@
     </p:spTree>
     <p:extLst>
       <p:ext uri="{BB962C8B-B14F-4D97-AF65-F5344CB8AC3E}">
-        <p14:creationId xmlns:p14="http://schemas.microsoft.com/office/powerpoint/2010/main" val="4219127862"/>
+        <p14:creationId xmlns:p14="http://schemas.microsoft.com/office/powerpoint/2010/main" val="3234788892"/>
       </p:ext>
     </p:extLst>
   </p:cSld>
@@ -6106,7 +6519,7 @@
   <p:timing>
     <p:tnLst>
       <p:par>
-        <p:cTn xmlns:p14="http://schemas.microsoft.com/office/powerpoint/2010/main" id="1" dur="indefinite" restart="never" nodeType="tmRoot"/>
+        <p:cTn id="1" dur="indefinite" restart="never" nodeType="tmRoot"/>
       </p:par>
     </p:tnLst>
   </p:timing>
@@ -6235,7 +6648,7 @@
         </p:nvSpPr>
         <p:spPr>
           <a:xfrm>
-            <a:off x="3281797" y="-100599"/>
+            <a:off x="3344667" y="2313770"/>
             <a:ext cx="2338751" cy="2137722"/>
           </a:xfrm>
           <a:prstGeom prst="frame">
@@ -6274,7 +6687,7 @@
     </p:spTree>
     <p:extLst>
       <p:ext uri="{BB962C8B-B14F-4D97-AF65-F5344CB8AC3E}">
-        <p14:creationId xmlns:p14="http://schemas.microsoft.com/office/powerpoint/2010/main" val="3234788892"/>
+        <p14:creationId xmlns:p14="http://schemas.microsoft.com/office/powerpoint/2010/main" val="3989791693"/>
       </p:ext>
     </p:extLst>
   </p:cSld>
@@ -6284,7 +6697,7 @@
   <p:timing>
     <p:tnLst>
       <p:par>
-        <p:cTn xmlns:p14="http://schemas.microsoft.com/office/powerpoint/2010/main" id="1" dur="indefinite" restart="never" nodeType="tmRoot"/>
+        <p:cTn id="1" dur="indefinite" restart="never" nodeType="tmRoot"/>
       </p:par>
     </p:tnLst>
   </p:timing>
@@ -6413,7 +6826,7 @@
         </p:nvSpPr>
         <p:spPr>
           <a:xfrm>
-            <a:off x="3344667" y="2313770"/>
+            <a:off x="3319519" y="4720278"/>
             <a:ext cx="2338751" cy="2137722"/>
           </a:xfrm>
           <a:prstGeom prst="frame">
@@ -6452,7 +6865,7 @@
     </p:spTree>
     <p:extLst>
       <p:ext uri="{BB962C8B-B14F-4D97-AF65-F5344CB8AC3E}">
-        <p14:creationId xmlns:p14="http://schemas.microsoft.com/office/powerpoint/2010/main" val="3989791693"/>
+        <p14:creationId xmlns:p14="http://schemas.microsoft.com/office/powerpoint/2010/main" val="309687607"/>
       </p:ext>
     </p:extLst>
   </p:cSld>
@@ -6462,7 +6875,7 @@
   <p:timing>
     <p:tnLst>
       <p:par>
-        <p:cTn xmlns:p14="http://schemas.microsoft.com/office/powerpoint/2010/main" id="1" dur="indefinite" restart="never" nodeType="tmRoot"/>
+        <p:cTn id="1" dur="indefinite" restart="never" nodeType="tmRoot"/>
       </p:par>
     </p:tnLst>
   </p:timing>
@@ -6591,7 +7004,7 @@
         </p:nvSpPr>
         <p:spPr>
           <a:xfrm>
-            <a:off x="3319519" y="4720278"/>
+            <a:off x="5557679" y="-100599"/>
             <a:ext cx="2338751" cy="2137722"/>
           </a:xfrm>
           <a:prstGeom prst="frame">
@@ -6630,7 +7043,7 @@
     </p:spTree>
     <p:extLst>
       <p:ext uri="{BB962C8B-B14F-4D97-AF65-F5344CB8AC3E}">
-        <p14:creationId xmlns:p14="http://schemas.microsoft.com/office/powerpoint/2010/main" val="309687607"/>
+        <p14:creationId xmlns:p14="http://schemas.microsoft.com/office/powerpoint/2010/main" val="1154263567"/>
       </p:ext>
     </p:extLst>
   </p:cSld>
@@ -6640,7 +7053,7 @@
   <p:timing>
     <p:tnLst>
       <p:par>
-        <p:cTn xmlns:p14="http://schemas.microsoft.com/office/powerpoint/2010/main" id="1" dur="indefinite" restart="never" nodeType="tmRoot"/>
+        <p:cTn id="1" dur="indefinite" restart="never" nodeType="tmRoot"/>
       </p:par>
     </p:tnLst>
   </p:timing>
@@ -6719,14 +7132,14 @@
                 <a:gridCol w="5762625">
                   <a:extLst>
                     <a:ext uri="{9D8B030D-6E8A-4147-A177-3AD203B41FA5}">
-                      <a16:colId xmlns="" xmlns:a16="http://schemas.microsoft.com/office/drawing/2014/main" val="1632794655"/>
+                      <a16:colId xmlns:a16="http://schemas.microsoft.com/office/drawing/2014/main" xmlns="" val="1632794655"/>
                     </a:ext>
                   </a:extLst>
                 </a:gridCol>
                 <a:gridCol w="5762625">
                   <a:extLst>
                     <a:ext uri="{9D8B030D-6E8A-4147-A177-3AD203B41FA5}">
-                      <a16:colId xmlns="" xmlns:a16="http://schemas.microsoft.com/office/drawing/2014/main" val="2011313899"/>
+                      <a16:colId xmlns:a16="http://schemas.microsoft.com/office/drawing/2014/main" xmlns="" val="2011313899"/>
                     </a:ext>
                   </a:extLst>
                 </a:gridCol>
@@ -6771,7 +7184,7 @@
                 </a:tc>
                 <a:extLst>
                   <a:ext uri="{0D108BD9-81ED-4DB2-BD59-A6C34878D82A}">
-                    <a16:rowId xmlns="" xmlns:a16="http://schemas.microsoft.com/office/drawing/2014/main" val="1789177411"/>
+                    <a16:rowId xmlns:a16="http://schemas.microsoft.com/office/drawing/2014/main" xmlns="" val="1789177411"/>
                   </a:ext>
                 </a:extLst>
               </a:tr>
@@ -6786,14 +7199,7 @@
                           <a:latin typeface="Segoe UI Light" panose="020B0502040204020203" pitchFamily="34" charset="0"/>
                           <a:cs typeface="Segoe UI Light" panose="020B0502040204020203" pitchFamily="34" charset="0"/>
                         </a:rPr>
-                        <a:t>01 | </a:t>
-                      </a:r>
-                      <a:r>
-                        <a:rPr lang="en-US" sz="2400" dirty="0" smtClean="0">
-                          <a:latin typeface="Segoe UI Light" panose="020B0502040204020203" pitchFamily="34" charset="0"/>
-                          <a:cs typeface="Segoe UI Light" panose="020B0502040204020203" pitchFamily="34" charset="0"/>
-                        </a:rPr>
-                        <a:t>Introduction</a:t>
+                        <a:t>01 | Introduction</a:t>
                       </a:r>
                       <a:endParaRPr lang="en-US" sz="2400" dirty="0">
                         <a:latin typeface="Segoe UI Light" panose="020B0502040204020203" pitchFamily="34" charset="0"/>
@@ -6849,7 +7255,7 @@
                 </a:tc>
                 <a:extLst>
                   <a:ext uri="{0D108BD9-81ED-4DB2-BD59-A6C34878D82A}">
-                    <a16:rowId xmlns="" xmlns:a16="http://schemas.microsoft.com/office/drawing/2014/main" val="3842815335"/>
+                    <a16:rowId xmlns:a16="http://schemas.microsoft.com/office/drawing/2014/main" xmlns="" val="3842815335"/>
                   </a:ext>
                 </a:extLst>
               </a:tr>
@@ -6864,14 +7270,7 @@
                           <a:latin typeface="Segoe UI Light" panose="020B0502040204020203" pitchFamily="34" charset="0"/>
                           <a:cs typeface="Segoe UI Light" panose="020B0502040204020203" pitchFamily="34" charset="0"/>
                         </a:rPr>
-                        <a:t>02 | </a:t>
-                      </a:r>
-                      <a:r>
-                        <a:rPr lang="en-US" sz="2400" dirty="0" smtClean="0">
-                          <a:latin typeface="Segoe UI Light" panose="020B0502040204020203" pitchFamily="34" charset="0"/>
-                          <a:cs typeface="Segoe UI Light" panose="020B0502040204020203" pitchFamily="34" charset="0"/>
-                        </a:rPr>
-                        <a:t>Application Architecture</a:t>
+                        <a:t>02 | Application Architecture</a:t>
                       </a:r>
                       <a:endParaRPr lang="en-US" sz="2400" dirty="0">
                         <a:latin typeface="Segoe UI Light" panose="020B0502040204020203" pitchFamily="34" charset="0"/>
@@ -6913,7 +7312,7 @@
                 </a:tc>
                 <a:extLst>
                   <a:ext uri="{0D108BD9-81ED-4DB2-BD59-A6C34878D82A}">
-                    <a16:rowId xmlns="" xmlns:a16="http://schemas.microsoft.com/office/drawing/2014/main" val="321066646"/>
+                    <a16:rowId xmlns:a16="http://schemas.microsoft.com/office/drawing/2014/main" xmlns="" val="321066646"/>
                   </a:ext>
                 </a:extLst>
               </a:tr>
@@ -6952,14 +7351,7 @@
                           <a:latin typeface="Segoe UI Light" panose="020B0502040204020203" pitchFamily="34" charset="0"/>
                           <a:cs typeface="Segoe UI Light" panose="020B0502040204020203" pitchFamily="34" charset="0"/>
                         </a:rPr>
-                        <a:t> | </a:t>
-                      </a:r>
-                      <a:r>
-                        <a:rPr lang="en-US" sz="2400" baseline="0" dirty="0" smtClean="0">
-                          <a:latin typeface="Segoe UI Light" panose="020B0502040204020203" pitchFamily="34" charset="0"/>
-                          <a:cs typeface="Segoe UI Light" panose="020B0502040204020203" pitchFamily="34" charset="0"/>
-                        </a:rPr>
-                        <a:t>DNS</a:t>
+                        <a:t> | DNS</a:t>
                       </a:r>
                       <a:endParaRPr lang="en-US" sz="2400" dirty="0" smtClean="0">
                         <a:latin typeface="Segoe UI Light" panose="020B0502040204020203" pitchFamily="34" charset="0"/>
@@ -7005,7 +7397,7 @@
                 </a:tc>
                 <a:extLst>
                   <a:ext uri="{0D108BD9-81ED-4DB2-BD59-A6C34878D82A}">
-                    <a16:rowId xmlns="" xmlns:a16="http://schemas.microsoft.com/office/drawing/2014/main" val="3812060533"/>
+                    <a16:rowId xmlns:a16="http://schemas.microsoft.com/office/drawing/2014/main" xmlns="" val="3812060533"/>
                   </a:ext>
                 </a:extLst>
               </a:tr>
@@ -7020,14 +7412,7 @@
                           <a:latin typeface="Segoe UI Light" panose="020B0502040204020203" pitchFamily="34" charset="0"/>
                           <a:cs typeface="Segoe UI Light" panose="020B0502040204020203" pitchFamily="34" charset="0"/>
                         </a:rPr>
-                        <a:t>04 | </a:t>
-                      </a:r>
-                      <a:r>
-                        <a:rPr lang="en-US" sz="2400" dirty="0" smtClean="0">
-                          <a:latin typeface="Segoe UI Light" panose="020B0502040204020203" pitchFamily="34" charset="0"/>
-                          <a:cs typeface="Segoe UI Light" panose="020B0502040204020203" pitchFamily="34" charset="0"/>
-                        </a:rPr>
-                        <a:t>Batch</a:t>
+                        <a:t>04 | Batch</a:t>
                       </a:r>
                       <a:endParaRPr lang="en-US" sz="2400" dirty="0">
                         <a:latin typeface="Segoe UI Light" panose="020B0502040204020203" pitchFamily="34" charset="0"/>
@@ -7047,21 +7432,7 @@
                           <a:latin typeface="Segoe UI Light" panose="020B0502040204020203" pitchFamily="34" charset="0"/>
                           <a:cs typeface="Segoe UI Light" panose="020B0502040204020203" pitchFamily="34" charset="0"/>
                         </a:rPr>
-                        <a:t>08 </a:t>
-                      </a:r>
-                      <a:r>
-                        <a:rPr lang="en-US" sz="2400" dirty="0" smtClean="0">
-                          <a:latin typeface="Segoe UI Light" panose="020B0502040204020203" pitchFamily="34" charset="0"/>
-                          <a:cs typeface="Segoe UI Light" panose="020B0502040204020203" pitchFamily="34" charset="0"/>
-                        </a:rPr>
-                        <a:t>| </a:t>
-                      </a:r>
-                      <a:r>
-                        <a:rPr lang="en-US" sz="2400" dirty="0" smtClean="0">
-                          <a:latin typeface="Segoe UI Light" panose="020B0502040204020203" pitchFamily="34" charset="0"/>
-                          <a:cs typeface="Segoe UI Light" panose="020B0502040204020203" pitchFamily="34" charset="0"/>
-                        </a:rPr>
-                        <a:t>Review and Summary</a:t>
+                        <a:t>08 | Review and Summary</a:t>
                       </a:r>
                       <a:endParaRPr lang="en-US" sz="2400" dirty="0">
                         <a:latin typeface="Segoe UI Light" panose="020B0502040204020203" pitchFamily="34" charset="0"/>
@@ -7073,7 +7444,7 @@
                 </a:tc>
                 <a:extLst>
                   <a:ext uri="{0D108BD9-81ED-4DB2-BD59-A6C34878D82A}">
-                    <a16:rowId xmlns="" xmlns:a16="http://schemas.microsoft.com/office/drawing/2014/main" val="733235577"/>
+                    <a16:rowId xmlns:a16="http://schemas.microsoft.com/office/drawing/2014/main" xmlns="" val="733235577"/>
                   </a:ext>
                 </a:extLst>
               </a:tr>
@@ -7102,7 +7473,7 @@
   <p:timing>
     <p:tnLst>
       <p:par>
-        <p:cTn xmlns:p14="http://schemas.microsoft.com/office/powerpoint/2010/main" id="1" dur="indefinite" restart="never" nodeType="tmRoot"/>
+        <p:cTn id="1" dur="indefinite" restart="never" nodeType="tmRoot"/>
       </p:par>
     </p:tnLst>
   </p:timing>
@@ -7231,7 +7602,7 @@
         </p:nvSpPr>
         <p:spPr>
           <a:xfrm>
-            <a:off x="5557679" y="-100599"/>
+            <a:off x="5708566" y="2452093"/>
             <a:ext cx="2338751" cy="2137722"/>
           </a:xfrm>
           <a:prstGeom prst="frame">
@@ -7270,7 +7641,7 @@
     </p:spTree>
     <p:extLst>
       <p:ext uri="{BB962C8B-B14F-4D97-AF65-F5344CB8AC3E}">
-        <p14:creationId xmlns:p14="http://schemas.microsoft.com/office/powerpoint/2010/main" val="1154263567"/>
+        <p14:creationId xmlns:p14="http://schemas.microsoft.com/office/powerpoint/2010/main" val="1199705719"/>
       </p:ext>
     </p:extLst>
   </p:cSld>
@@ -7280,7 +7651,7 @@
   <p:timing>
     <p:tnLst>
       <p:par>
-        <p:cTn xmlns:p14="http://schemas.microsoft.com/office/powerpoint/2010/main" id="1" dur="indefinite" restart="never" nodeType="tmRoot"/>
+        <p:cTn id="1" dur="indefinite" restart="never" nodeType="tmRoot"/>
       </p:par>
     </p:tnLst>
   </p:timing>
@@ -7409,7 +7780,7 @@
         </p:nvSpPr>
         <p:spPr>
           <a:xfrm>
-            <a:off x="5708566" y="2452093"/>
+            <a:off x="5746288" y="4627539"/>
             <a:ext cx="2338751" cy="2137722"/>
           </a:xfrm>
           <a:prstGeom prst="frame">
@@ -7448,7 +7819,7 @@
     </p:spTree>
     <p:extLst>
       <p:ext uri="{BB962C8B-B14F-4D97-AF65-F5344CB8AC3E}">
-        <p14:creationId xmlns:p14="http://schemas.microsoft.com/office/powerpoint/2010/main" val="1199705719"/>
+        <p14:creationId xmlns:p14="http://schemas.microsoft.com/office/powerpoint/2010/main" val="885376574"/>
       </p:ext>
     </p:extLst>
   </p:cSld>
@@ -7458,7 +7829,7 @@
   <p:timing>
     <p:tnLst>
       <p:par>
-        <p:cTn xmlns:p14="http://schemas.microsoft.com/office/powerpoint/2010/main" id="1" dur="indefinite" restart="never" nodeType="tmRoot"/>
+        <p:cTn id="1" dur="indefinite" restart="never" nodeType="tmRoot"/>
       </p:par>
     </p:tnLst>
   </p:timing>
@@ -7587,7 +7958,7 @@
         </p:nvSpPr>
         <p:spPr>
           <a:xfrm>
-            <a:off x="5746288" y="4627539"/>
+            <a:off x="7732969" y="0"/>
             <a:ext cx="2338751" cy="2137722"/>
           </a:xfrm>
           <a:prstGeom prst="frame">
@@ -7626,7 +7997,7 @@
     </p:spTree>
     <p:extLst>
       <p:ext uri="{BB962C8B-B14F-4D97-AF65-F5344CB8AC3E}">
-        <p14:creationId xmlns:p14="http://schemas.microsoft.com/office/powerpoint/2010/main" val="885376574"/>
+        <p14:creationId xmlns:p14="http://schemas.microsoft.com/office/powerpoint/2010/main" val="3568945219"/>
       </p:ext>
     </p:extLst>
   </p:cSld>
@@ -7636,7 +8007,7 @@
   <p:timing>
     <p:tnLst>
       <p:par>
-        <p:cTn xmlns:p14="http://schemas.microsoft.com/office/powerpoint/2010/main" id="1" dur="indefinite" restart="never" nodeType="tmRoot"/>
+        <p:cTn id="1" dur="indefinite" restart="never" nodeType="tmRoot"/>
       </p:par>
     </p:tnLst>
   </p:timing>
@@ -7765,8 +8136,8 @@
         </p:nvSpPr>
         <p:spPr>
           <a:xfrm>
-            <a:off x="7732969" y="0"/>
-            <a:ext cx="2338751" cy="2137722"/>
+            <a:off x="7820986" y="2250896"/>
+            <a:ext cx="2338751" cy="2540116"/>
           </a:xfrm>
           <a:prstGeom prst="frame">
             <a:avLst>
@@ -7804,7 +8175,7 @@
     </p:spTree>
     <p:extLst>
       <p:ext uri="{BB962C8B-B14F-4D97-AF65-F5344CB8AC3E}">
-        <p14:creationId xmlns:p14="http://schemas.microsoft.com/office/powerpoint/2010/main" val="3568945219"/>
+        <p14:creationId xmlns:p14="http://schemas.microsoft.com/office/powerpoint/2010/main" val="2896891020"/>
       </p:ext>
     </p:extLst>
   </p:cSld>
@@ -7814,7 +8185,7 @@
   <p:timing>
     <p:tnLst>
       <p:par>
-        <p:cTn xmlns:p14="http://schemas.microsoft.com/office/powerpoint/2010/main" id="1" dur="indefinite" restart="never" nodeType="tmRoot"/>
+        <p:cTn id="1" dur="indefinite" restart="never" nodeType="tmRoot"/>
       </p:par>
     </p:tnLst>
   </p:timing>
@@ -7848,12 +8219,21 @@
             <p:ph type="title"/>
           </p:nvPr>
         </p:nvSpPr>
-        <p:spPr/>
+        <p:spPr>
+          <a:xfrm>
+            <a:off x="1262646" y="182215"/>
+            <a:ext cx="10641300" cy="1063487"/>
+          </a:xfrm>
+        </p:spPr>
         <p:txBody>
           <a:bodyPr/>
           <a:lstStyle/>
           <a:p>
             <a:pPr lvl="0"/>
+            <a:r>
+              <a:rPr lang="en-US" dirty="0"/>
+              <a:t>Web Application</a:t>
+            </a:r>
             <a:endParaRPr lang="en-US" dirty="0"/>
           </a:p>
         </p:txBody>
@@ -7907,82 +8287,56 @@
       </p:sp>
       <p:pic>
         <p:nvPicPr>
-          <p:cNvPr id="4" name="Picture 3" descr="building blocks.png"/>
+          <p:cNvPr id="3" name="Picture 2"/>
           <p:cNvPicPr>
             <a:picLocks noChangeAspect="1"/>
           </p:cNvPicPr>
           <p:nvPr/>
         </p:nvPicPr>
         <p:blipFill>
-          <a:blip r:embed="rId3">
-            <a:extLst>
-              <a:ext uri="{28A0092B-C50C-407E-A947-70E740481C1C}">
-                <a14:useLocalDpi xmlns:a14="http://schemas.microsoft.com/office/drawing/2010/main" val="0"/>
-              </a:ext>
-            </a:extLst>
-          </a:blip>
+          <a:blip r:embed="rId3"/>
           <a:stretch>
             <a:fillRect/>
           </a:stretch>
         </p:blipFill>
         <p:spPr>
           <a:xfrm>
-            <a:off x="1035129" y="0"/>
-            <a:ext cx="8832405" cy="6858000"/>
+            <a:off x="3199947" y="1619234"/>
+            <a:ext cx="3057143" cy="3866667"/>
           </a:xfrm>
           <a:prstGeom prst="rect">
             <a:avLst/>
           </a:prstGeom>
         </p:spPr>
       </p:pic>
-      <p:sp>
-        <p:nvSpPr>
-          <p:cNvPr id="3" name="Frame 2"/>
-          <p:cNvSpPr/>
+      <p:pic>
+        <p:nvPicPr>
+          <p:cNvPr id="6" name="Picture 5"/>
+          <p:cNvPicPr>
+            <a:picLocks noChangeAspect="1"/>
+          </p:cNvPicPr>
           <p:nvPr/>
-        </p:nvSpPr>
-        <p:spPr>
-          <a:xfrm>
-            <a:off x="7820986" y="2250896"/>
-            <a:ext cx="2338751" cy="2540116"/>
-          </a:xfrm>
-          <a:prstGeom prst="frame">
-            <a:avLst>
-              <a:gd name="adj1" fmla="val 4265"/>
-            </a:avLst>
+        </p:nvPicPr>
+        <p:blipFill>
+          <a:blip r:embed="rId4"/>
+          <a:stretch>
+            <a:fillRect/>
+          </a:stretch>
+        </p:blipFill>
+        <p:spPr>
+          <a:xfrm>
+            <a:off x="0" y="0"/>
+            <a:ext cx="1163127" cy="1169773"/>
+          </a:xfrm>
+          <a:prstGeom prst="rect">
+            <a:avLst/>
           </a:prstGeom>
         </p:spPr>
-        <p:style>
-          <a:lnRef idx="1">
-            <a:schemeClr val="accent1"/>
-          </a:lnRef>
-          <a:fillRef idx="3">
-            <a:schemeClr val="accent1"/>
-          </a:fillRef>
-          <a:effectRef idx="2">
-            <a:schemeClr val="accent1"/>
-          </a:effectRef>
-          <a:fontRef idx="minor">
-            <a:schemeClr val="lt1"/>
-          </a:fontRef>
-        </p:style>
-        <p:txBody>
-          <a:bodyPr rtlCol="0" anchor="ctr"/>
-          <a:lstStyle/>
-          <a:p>
-            <a:pPr algn="ctr"/>
-            <a:endParaRPr lang="en-US">
-              <a:solidFill>
-                <a:schemeClr val="tx1"/>
-              </a:solidFill>
-            </a:endParaRPr>
-          </a:p>
-        </p:txBody>
-      </p:sp>
+      </p:pic>
     </p:spTree>
     <p:extLst>
       <p:ext uri="{BB962C8B-B14F-4D97-AF65-F5344CB8AC3E}">
-        <p14:creationId xmlns:p14="http://schemas.microsoft.com/office/powerpoint/2010/main" val="2896891020"/>
+        <p14:creationId xmlns:p14="http://schemas.microsoft.com/office/powerpoint/2010/main" val="2602928001"/>
       </p:ext>
     </p:extLst>
   </p:cSld>
@@ -7992,7 +8346,7 @@
   <p:timing>
     <p:tnLst>
       <p:par>
-        <p:cTn xmlns:p14="http://schemas.microsoft.com/office/powerpoint/2010/main" id="1" dur="indefinite" restart="never" nodeType="tmRoot"/>
+        <p:cTn id="1" dur="indefinite" restart="never" nodeType="tmRoot"/>
       </p:par>
     </p:tnLst>
   </p:timing>
@@ -8016,10 +8370,109 @@
           <a:chExt cx="0" cy="0"/>
         </a:xfrm>
       </p:grpSpPr>
+      <p:sp>
+        <p:nvSpPr>
+          <p:cNvPr id="2" name="Title 1"/>
+          <p:cNvSpPr>
+            <a:spLocks noGrp="1"/>
+          </p:cNvSpPr>
+          <p:nvPr>
+            <p:ph type="title"/>
+          </p:nvPr>
+        </p:nvSpPr>
+        <p:spPr/>
+        <p:txBody>
+          <a:bodyPr/>
+          <a:lstStyle/>
+          <a:p>
+            <a:r>
+              <a:rPr lang="en-US" dirty="0" err="1" smtClean="0"/>
+              <a:t>MediatR</a:t>
+            </a:r>
+            <a:endParaRPr lang="en-US" dirty="0"/>
+          </a:p>
+        </p:txBody>
+      </p:sp>
+      <p:pic>
+        <p:nvPicPr>
+          <p:cNvPr id="4" name="Content Placeholder 3"/>
+          <p:cNvPicPr>
+            <a:picLocks noGrp="1" noChangeAspect="1"/>
+          </p:cNvPicPr>
+          <p:nvPr>
+            <p:ph sz="quarter" idx="10"/>
+          </p:nvPr>
+        </p:nvPicPr>
+        <p:blipFill>
+          <a:blip r:embed="rId2">
+            <a:extLst>
+              <a:ext uri="{28A0092B-C50C-407E-A947-70E740481C1C}">
+                <a14:useLocalDpi xmlns:a14="http://schemas.microsoft.com/office/drawing/2010/main" val="0"/>
+              </a:ext>
+            </a:extLst>
+          </a:blip>
+          <a:stretch>
+            <a:fillRect/>
+          </a:stretch>
+        </p:blipFill>
+        <p:spPr>
+          <a:xfrm>
+            <a:off x="2800865" y="687131"/>
+            <a:ext cx="5982994" cy="5991482"/>
+          </a:xfrm>
+        </p:spPr>
+      </p:pic>
+      <p:sp>
+        <p:nvSpPr>
+          <p:cNvPr id="5" name="TextBox 4"/>
+          <p:cNvSpPr txBox="1"/>
+          <p:nvPr/>
+        </p:nvSpPr>
+        <p:spPr>
+          <a:xfrm>
+            <a:off x="9906000" y="-1"/>
+            <a:ext cx="2286000" cy="2031325"/>
+          </a:xfrm>
+          <a:prstGeom prst="rect">
+            <a:avLst/>
+          </a:prstGeom>
+          <a:solidFill>
+            <a:srgbClr val="FFFF00"/>
+          </a:solidFill>
+          <a:ln>
+            <a:noFill/>
+          </a:ln>
+        </p:spPr>
+        <p:txBody>
+          <a:bodyPr wrap="square" rtlCol="0">
+            <a:spAutoFit/>
+          </a:bodyPr>
+          <a:lstStyle/>
+          <a:p>
+            <a:pPr algn="ctr"/>
+            <a:endParaRPr lang="en-US" dirty="0" smtClean="0"/>
+          </a:p>
+          <a:p>
+            <a:pPr algn="ctr"/>
+            <a:endParaRPr lang="en-US" dirty="0"/>
+          </a:p>
+          <a:p>
+            <a:pPr algn="ctr"/>
+            <a:r>
+              <a:rPr lang="en-US" dirty="0" smtClean="0"/>
+              <a:t>Please leave this area blank to allow for picture in picture recording</a:t>
+            </a:r>
+          </a:p>
+          <a:p>
+            <a:pPr algn="ctr"/>
+            <a:endParaRPr lang="en-US" dirty="0"/>
+          </a:p>
+        </p:txBody>
+      </p:sp>
     </p:spTree>
     <p:extLst>
       <p:ext uri="{BB962C8B-B14F-4D97-AF65-F5344CB8AC3E}">
-        <p14:creationId xmlns:p14="http://schemas.microsoft.com/office/powerpoint/2010/main" val="898363405"/>
+        <p14:creationId xmlns:p14="http://schemas.microsoft.com/office/powerpoint/2010/main" val="2625146686"/>
       </p:ext>
     </p:extLst>
   </p:cSld>
@@ -8029,7 +8482,624 @@
   <p:timing>
     <p:tnLst>
       <p:par>
-        <p:cTn xmlns:p14="http://schemas.microsoft.com/office/powerpoint/2010/main" id="1" dur="indefinite" restart="never" nodeType="tmRoot"/>
+        <p:cTn id="1" dur="indefinite" restart="never" nodeType="tmRoot"/>
+      </p:par>
+    </p:tnLst>
+  </p:timing>
+</p:sld>
+</file>
+
+<file path=ppt/slides/slide26.xml><?xml version="1.0" encoding="utf-8"?>
+<p:sld xmlns:a="http://schemas.openxmlformats.org/drawingml/2006/main" xmlns:r="http://schemas.openxmlformats.org/officeDocument/2006/relationships" xmlns:p="http://schemas.openxmlformats.org/presentationml/2006/main">
+  <p:cSld>
+    <p:spTree>
+      <p:nvGrpSpPr>
+        <p:cNvPr id="1" name=""/>
+        <p:cNvGrpSpPr/>
+        <p:nvPr/>
+      </p:nvGrpSpPr>
+      <p:grpSpPr>
+        <a:xfrm>
+          <a:off x="0" y="0"/>
+          <a:ext cx="0" cy="0"/>
+          <a:chOff x="0" y="0"/>
+          <a:chExt cx="0" cy="0"/>
+        </a:xfrm>
+      </p:grpSpPr>
+      <p:sp>
+        <p:nvSpPr>
+          <p:cNvPr id="2" name="Title 1"/>
+          <p:cNvSpPr>
+            <a:spLocks noGrp="1"/>
+          </p:cNvSpPr>
+          <p:nvPr>
+            <p:ph type="title"/>
+          </p:nvPr>
+        </p:nvSpPr>
+        <p:spPr/>
+        <p:txBody>
+          <a:bodyPr/>
+          <a:lstStyle/>
+          <a:p>
+            <a:r>
+              <a:rPr lang="en-US" dirty="0" err="1" smtClean="0"/>
+              <a:t>MediatR</a:t>
+            </a:r>
+            <a:endParaRPr lang="en-US" dirty="0"/>
+          </a:p>
+        </p:txBody>
+      </p:sp>
+      <p:pic>
+        <p:nvPicPr>
+          <p:cNvPr id="4" name="Content Placeholder 3"/>
+          <p:cNvPicPr>
+            <a:picLocks noGrp="1" noChangeAspect="1"/>
+          </p:cNvPicPr>
+          <p:nvPr>
+            <p:ph sz="quarter" idx="10"/>
+          </p:nvPr>
+        </p:nvPicPr>
+        <p:blipFill>
+          <a:blip r:embed="rId2">
+            <a:extLst>
+              <a:ext uri="{28A0092B-C50C-407E-A947-70E740481C1C}">
+                <a14:useLocalDpi xmlns:a14="http://schemas.microsoft.com/office/drawing/2010/main" val="0"/>
+              </a:ext>
+            </a:extLst>
+          </a:blip>
+          <a:stretch>
+            <a:fillRect/>
+          </a:stretch>
+        </p:blipFill>
+        <p:spPr>
+          <a:xfrm>
+            <a:off x="2800865" y="687131"/>
+            <a:ext cx="5982994" cy="5991482"/>
+          </a:xfrm>
+        </p:spPr>
+      </p:pic>
+      <p:sp>
+        <p:nvSpPr>
+          <p:cNvPr id="3" name="Lightning Bolt 2"/>
+          <p:cNvSpPr/>
+          <p:nvPr/>
+        </p:nvSpPr>
+        <p:spPr>
+          <a:xfrm>
+            <a:off x="3253946" y="788502"/>
+            <a:ext cx="914400" cy="914400"/>
+          </a:xfrm>
+          <a:prstGeom prst="lightningBolt">
+            <a:avLst/>
+          </a:prstGeom>
+          <a:solidFill>
+            <a:srgbClr val="FFFF00"/>
+          </a:solidFill>
+        </p:spPr>
+        <p:style>
+          <a:lnRef idx="2">
+            <a:schemeClr val="accent1">
+              <a:shade val="50000"/>
+            </a:schemeClr>
+          </a:lnRef>
+          <a:fillRef idx="1">
+            <a:schemeClr val="accent1"/>
+          </a:fillRef>
+          <a:effectRef idx="0">
+            <a:schemeClr val="accent1"/>
+          </a:effectRef>
+          <a:fontRef idx="minor">
+            <a:schemeClr val="lt1"/>
+          </a:fontRef>
+        </p:style>
+        <p:txBody>
+          <a:bodyPr rtlCol="0" anchor="ctr"/>
+          <a:lstStyle/>
+          <a:p>
+            <a:pPr algn="ctr"/>
+            <a:endParaRPr lang="en-US" dirty="0"/>
+          </a:p>
+        </p:txBody>
+      </p:sp>
+      <p:sp>
+        <p:nvSpPr>
+          <p:cNvPr id="5" name="TextBox 4"/>
+          <p:cNvSpPr txBox="1"/>
+          <p:nvPr/>
+        </p:nvSpPr>
+        <p:spPr>
+          <a:xfrm>
+            <a:off x="3089189" y="419170"/>
+            <a:ext cx="939873" cy="369332"/>
+          </a:xfrm>
+          <a:prstGeom prst="rect">
+            <a:avLst/>
+          </a:prstGeom>
+          <a:noFill/>
+        </p:spPr>
+        <p:txBody>
+          <a:bodyPr wrap="none" rtlCol="0">
+            <a:spAutoFit/>
+          </a:bodyPr>
+          <a:lstStyle/>
+          <a:p>
+            <a:r>
+              <a:rPr lang="en-US" dirty="0" smtClean="0"/>
+              <a:t>Validate</a:t>
+            </a:r>
+            <a:endParaRPr lang="en-US" dirty="0"/>
+          </a:p>
+        </p:txBody>
+      </p:sp>
+      <p:sp>
+        <p:nvSpPr>
+          <p:cNvPr id="6" name="TextBox 5"/>
+          <p:cNvSpPr txBox="1"/>
+          <p:nvPr/>
+        </p:nvSpPr>
+        <p:spPr>
+          <a:xfrm>
+            <a:off x="9906000" y="-1"/>
+            <a:ext cx="2286000" cy="2031325"/>
+          </a:xfrm>
+          <a:prstGeom prst="rect">
+            <a:avLst/>
+          </a:prstGeom>
+          <a:solidFill>
+            <a:srgbClr val="FFFF00"/>
+          </a:solidFill>
+          <a:ln>
+            <a:noFill/>
+          </a:ln>
+        </p:spPr>
+        <p:txBody>
+          <a:bodyPr wrap="square" rtlCol="0">
+            <a:spAutoFit/>
+          </a:bodyPr>
+          <a:lstStyle/>
+          <a:p>
+            <a:pPr algn="ctr"/>
+            <a:endParaRPr lang="en-US" dirty="0" smtClean="0"/>
+          </a:p>
+          <a:p>
+            <a:pPr algn="ctr"/>
+            <a:endParaRPr lang="en-US" dirty="0"/>
+          </a:p>
+          <a:p>
+            <a:pPr algn="ctr"/>
+            <a:r>
+              <a:rPr lang="en-US" dirty="0" smtClean="0"/>
+              <a:t>Please leave this area blank to allow for picture in picture recording</a:t>
+            </a:r>
+          </a:p>
+          <a:p>
+            <a:pPr algn="ctr"/>
+            <a:endParaRPr lang="en-US" dirty="0"/>
+          </a:p>
+        </p:txBody>
+      </p:sp>
+    </p:spTree>
+    <p:extLst>
+      <p:ext uri="{BB962C8B-B14F-4D97-AF65-F5344CB8AC3E}">
+        <p14:creationId xmlns:p14="http://schemas.microsoft.com/office/powerpoint/2010/main" val="2352649941"/>
+      </p:ext>
+    </p:extLst>
+  </p:cSld>
+  <p:clrMapOvr>
+    <a:masterClrMapping/>
+  </p:clrMapOvr>
+  <p:timing>
+    <p:tnLst>
+      <p:par>
+        <p:cTn id="1" dur="indefinite" restart="never" nodeType="tmRoot"/>
+      </p:par>
+    </p:tnLst>
+  </p:timing>
+</p:sld>
+</file>
+
+<file path=ppt/slides/slide27.xml><?xml version="1.0" encoding="utf-8"?>
+<p:sld xmlns:a="http://schemas.openxmlformats.org/drawingml/2006/main" xmlns:r="http://schemas.openxmlformats.org/officeDocument/2006/relationships" xmlns:p="http://schemas.openxmlformats.org/presentationml/2006/main">
+  <p:cSld>
+    <p:spTree>
+      <p:nvGrpSpPr>
+        <p:cNvPr id="1" name=""/>
+        <p:cNvGrpSpPr/>
+        <p:nvPr/>
+      </p:nvGrpSpPr>
+      <p:grpSpPr>
+        <a:xfrm>
+          <a:off x="0" y="0"/>
+          <a:ext cx="0" cy="0"/>
+          <a:chOff x="0" y="0"/>
+          <a:chExt cx="0" cy="0"/>
+        </a:xfrm>
+      </p:grpSpPr>
+      <p:sp>
+        <p:nvSpPr>
+          <p:cNvPr id="2" name="Title 1"/>
+          <p:cNvSpPr>
+            <a:spLocks noGrp="1"/>
+          </p:cNvSpPr>
+          <p:nvPr>
+            <p:ph type="title"/>
+          </p:nvPr>
+        </p:nvSpPr>
+        <p:spPr/>
+        <p:txBody>
+          <a:bodyPr/>
+          <a:lstStyle/>
+          <a:p>
+            <a:r>
+              <a:rPr lang="en-US" dirty="0" err="1" smtClean="0"/>
+              <a:t>MediatR</a:t>
+            </a:r>
+            <a:endParaRPr lang="en-US" dirty="0"/>
+          </a:p>
+        </p:txBody>
+      </p:sp>
+      <p:pic>
+        <p:nvPicPr>
+          <p:cNvPr id="5" name="Content Placeholder 4"/>
+          <p:cNvPicPr>
+            <a:picLocks noGrp="1" noChangeAspect="1"/>
+          </p:cNvPicPr>
+          <p:nvPr>
+            <p:ph sz="quarter" idx="10"/>
+          </p:nvPr>
+        </p:nvPicPr>
+        <p:blipFill>
+          <a:blip r:embed="rId2">
+            <a:extLst>
+              <a:ext uri="{28A0092B-C50C-407E-A947-70E740481C1C}">
+                <a14:useLocalDpi xmlns:a14="http://schemas.microsoft.com/office/drawing/2010/main" val="0"/>
+              </a:ext>
+            </a:extLst>
+          </a:blip>
+          <a:stretch>
+            <a:fillRect/>
+          </a:stretch>
+        </p:blipFill>
+        <p:spPr>
+          <a:xfrm>
+            <a:off x="2798064" y="685800"/>
+            <a:ext cx="5980835" cy="5989320"/>
+          </a:xfrm>
+        </p:spPr>
+      </p:pic>
+      <p:sp>
+        <p:nvSpPr>
+          <p:cNvPr id="6" name="TextBox 5"/>
+          <p:cNvSpPr txBox="1"/>
+          <p:nvPr/>
+        </p:nvSpPr>
+        <p:spPr>
+          <a:xfrm>
+            <a:off x="9906000" y="-1"/>
+            <a:ext cx="2286000" cy="2031325"/>
+          </a:xfrm>
+          <a:prstGeom prst="rect">
+            <a:avLst/>
+          </a:prstGeom>
+          <a:solidFill>
+            <a:srgbClr val="FFFF00"/>
+          </a:solidFill>
+          <a:ln>
+            <a:noFill/>
+          </a:ln>
+        </p:spPr>
+        <p:txBody>
+          <a:bodyPr wrap="square" rtlCol="0">
+            <a:spAutoFit/>
+          </a:bodyPr>
+          <a:lstStyle/>
+          <a:p>
+            <a:pPr algn="ctr"/>
+            <a:endParaRPr lang="en-US" dirty="0" smtClean="0"/>
+          </a:p>
+          <a:p>
+            <a:pPr algn="ctr"/>
+            <a:endParaRPr lang="en-US" dirty="0"/>
+          </a:p>
+          <a:p>
+            <a:pPr algn="ctr"/>
+            <a:r>
+              <a:rPr lang="en-US" dirty="0" smtClean="0"/>
+              <a:t>Please leave this area blank to allow for picture in picture recording</a:t>
+            </a:r>
+          </a:p>
+          <a:p>
+            <a:pPr algn="ctr"/>
+            <a:endParaRPr lang="en-US" dirty="0"/>
+          </a:p>
+        </p:txBody>
+      </p:sp>
+    </p:spTree>
+    <p:extLst>
+      <p:ext uri="{BB962C8B-B14F-4D97-AF65-F5344CB8AC3E}">
+        <p14:creationId xmlns:p14="http://schemas.microsoft.com/office/powerpoint/2010/main" val="1300449595"/>
+      </p:ext>
+    </p:extLst>
+  </p:cSld>
+  <p:clrMapOvr>
+    <a:masterClrMapping/>
+  </p:clrMapOvr>
+  <p:timing>
+    <p:tnLst>
+      <p:par>
+        <p:cTn id="1" dur="indefinite" restart="never" nodeType="tmRoot"/>
+      </p:par>
+    </p:tnLst>
+  </p:timing>
+</p:sld>
+</file>
+
+<file path=ppt/slides/slide28.xml><?xml version="1.0" encoding="utf-8"?>
+<p:sld xmlns:a="http://schemas.openxmlformats.org/drawingml/2006/main" xmlns:r="http://schemas.openxmlformats.org/officeDocument/2006/relationships" xmlns:p="http://schemas.openxmlformats.org/presentationml/2006/main">
+  <p:cSld>
+    <p:spTree>
+      <p:nvGrpSpPr>
+        <p:cNvPr id="1" name=""/>
+        <p:cNvGrpSpPr/>
+        <p:nvPr/>
+      </p:nvGrpSpPr>
+      <p:grpSpPr>
+        <a:xfrm>
+          <a:off x="0" y="0"/>
+          <a:ext cx="0" cy="0"/>
+          <a:chOff x="0" y="0"/>
+          <a:chExt cx="0" cy="0"/>
+        </a:xfrm>
+      </p:grpSpPr>
+      <p:sp>
+        <p:nvSpPr>
+          <p:cNvPr id="2" name="Title 1"/>
+          <p:cNvSpPr>
+            <a:spLocks noGrp="1"/>
+          </p:cNvSpPr>
+          <p:nvPr>
+            <p:ph type="title"/>
+          </p:nvPr>
+        </p:nvSpPr>
+        <p:spPr/>
+        <p:txBody>
+          <a:bodyPr/>
+          <a:lstStyle/>
+          <a:p>
+            <a:r>
+              <a:rPr lang="en-US" dirty="0" err="1" smtClean="0"/>
+              <a:t>MediatR</a:t>
+            </a:r>
+            <a:endParaRPr lang="en-US" dirty="0"/>
+          </a:p>
+        </p:txBody>
+      </p:sp>
+      <p:pic>
+        <p:nvPicPr>
+          <p:cNvPr id="5" name="Content Placeholder 4"/>
+          <p:cNvPicPr>
+            <a:picLocks noGrp="1" noChangeAspect="1"/>
+          </p:cNvPicPr>
+          <p:nvPr>
+            <p:ph sz="quarter" idx="10"/>
+          </p:nvPr>
+        </p:nvPicPr>
+        <p:blipFill>
+          <a:blip r:embed="rId2">
+            <a:extLst>
+              <a:ext uri="{28A0092B-C50C-407E-A947-70E740481C1C}">
+                <a14:useLocalDpi xmlns:a14="http://schemas.microsoft.com/office/drawing/2010/main" val="0"/>
+              </a:ext>
+            </a:extLst>
+          </a:blip>
+          <a:stretch>
+            <a:fillRect/>
+          </a:stretch>
+        </p:blipFill>
+        <p:spPr>
+          <a:xfrm>
+            <a:off x="2798064" y="685800"/>
+            <a:ext cx="5980835" cy="5989319"/>
+          </a:xfrm>
+        </p:spPr>
+      </p:pic>
+      <p:sp>
+        <p:nvSpPr>
+          <p:cNvPr id="4" name="TextBox 3"/>
+          <p:cNvSpPr txBox="1"/>
+          <p:nvPr/>
+        </p:nvSpPr>
+        <p:spPr>
+          <a:xfrm>
+            <a:off x="9906000" y="-1"/>
+            <a:ext cx="2286000" cy="2031325"/>
+          </a:xfrm>
+          <a:prstGeom prst="rect">
+            <a:avLst/>
+          </a:prstGeom>
+          <a:solidFill>
+            <a:srgbClr val="FFFF00"/>
+          </a:solidFill>
+          <a:ln>
+            <a:noFill/>
+          </a:ln>
+        </p:spPr>
+        <p:txBody>
+          <a:bodyPr wrap="square" rtlCol="0">
+            <a:spAutoFit/>
+          </a:bodyPr>
+          <a:lstStyle/>
+          <a:p>
+            <a:pPr algn="ctr"/>
+            <a:endParaRPr lang="en-US" dirty="0" smtClean="0"/>
+          </a:p>
+          <a:p>
+            <a:pPr algn="ctr"/>
+            <a:endParaRPr lang="en-US" dirty="0"/>
+          </a:p>
+          <a:p>
+            <a:pPr algn="ctr"/>
+            <a:r>
+              <a:rPr lang="en-US" dirty="0" smtClean="0"/>
+              <a:t>Please leave this area blank to allow for picture in picture recording</a:t>
+            </a:r>
+          </a:p>
+          <a:p>
+            <a:pPr algn="ctr"/>
+            <a:endParaRPr lang="en-US" dirty="0"/>
+          </a:p>
+        </p:txBody>
+      </p:sp>
+    </p:spTree>
+    <p:extLst>
+      <p:ext uri="{BB962C8B-B14F-4D97-AF65-F5344CB8AC3E}">
+        <p14:creationId xmlns:p14="http://schemas.microsoft.com/office/powerpoint/2010/main" val="2214335877"/>
+      </p:ext>
+    </p:extLst>
+  </p:cSld>
+  <p:clrMapOvr>
+    <a:masterClrMapping/>
+  </p:clrMapOvr>
+  <p:timing>
+    <p:tnLst>
+      <p:par>
+        <p:cTn id="1" dur="indefinite" restart="never" nodeType="tmRoot"/>
+      </p:par>
+    </p:tnLst>
+  </p:timing>
+</p:sld>
+</file>
+
+<file path=ppt/slides/slide29.xml><?xml version="1.0" encoding="utf-8"?>
+<p:sld xmlns:a="http://schemas.openxmlformats.org/drawingml/2006/main" xmlns:r="http://schemas.openxmlformats.org/officeDocument/2006/relationships" xmlns:p="http://schemas.openxmlformats.org/presentationml/2006/main">
+  <p:cSld>
+    <p:spTree>
+      <p:nvGrpSpPr>
+        <p:cNvPr id="1" name=""/>
+        <p:cNvGrpSpPr/>
+        <p:nvPr/>
+      </p:nvGrpSpPr>
+      <p:grpSpPr>
+        <a:xfrm>
+          <a:off x="0" y="0"/>
+          <a:ext cx="0" cy="0"/>
+          <a:chOff x="0" y="0"/>
+          <a:chExt cx="0" cy="0"/>
+        </a:xfrm>
+      </p:grpSpPr>
+      <p:sp>
+        <p:nvSpPr>
+          <p:cNvPr id="2" name="Title 1"/>
+          <p:cNvSpPr>
+            <a:spLocks noGrp="1"/>
+          </p:cNvSpPr>
+          <p:nvPr>
+            <p:ph type="title"/>
+          </p:nvPr>
+        </p:nvSpPr>
+        <p:spPr/>
+        <p:txBody>
+          <a:bodyPr/>
+          <a:lstStyle/>
+          <a:p>
+            <a:r>
+              <a:rPr lang="en-US" dirty="0" err="1" smtClean="0"/>
+              <a:t>MediatR</a:t>
+            </a:r>
+            <a:endParaRPr lang="en-US" dirty="0"/>
+          </a:p>
+        </p:txBody>
+      </p:sp>
+      <p:pic>
+        <p:nvPicPr>
+          <p:cNvPr id="5" name="Content Placeholder 4"/>
+          <p:cNvPicPr>
+            <a:picLocks noGrp="1" noChangeAspect="1"/>
+          </p:cNvPicPr>
+          <p:nvPr>
+            <p:ph sz="quarter" idx="10"/>
+          </p:nvPr>
+        </p:nvPicPr>
+        <p:blipFill>
+          <a:blip r:embed="rId2">
+            <a:extLst>
+              <a:ext uri="{28A0092B-C50C-407E-A947-70E740481C1C}">
+                <a14:useLocalDpi xmlns:a14="http://schemas.microsoft.com/office/drawing/2010/main" val="0"/>
+              </a:ext>
+            </a:extLst>
+          </a:blip>
+          <a:stretch>
+            <a:fillRect/>
+          </a:stretch>
+        </p:blipFill>
+        <p:spPr>
+          <a:xfrm>
+            <a:off x="2798064" y="685800"/>
+            <a:ext cx="5980834" cy="5989319"/>
+          </a:xfrm>
+        </p:spPr>
+      </p:pic>
+      <p:sp>
+        <p:nvSpPr>
+          <p:cNvPr id="4" name="TextBox 3"/>
+          <p:cNvSpPr txBox="1"/>
+          <p:nvPr/>
+        </p:nvSpPr>
+        <p:spPr>
+          <a:xfrm>
+            <a:off x="9906000" y="-1"/>
+            <a:ext cx="2286000" cy="2031325"/>
+          </a:xfrm>
+          <a:prstGeom prst="rect">
+            <a:avLst/>
+          </a:prstGeom>
+          <a:solidFill>
+            <a:srgbClr val="FFFF00"/>
+          </a:solidFill>
+          <a:ln>
+            <a:noFill/>
+          </a:ln>
+        </p:spPr>
+        <p:txBody>
+          <a:bodyPr wrap="square" rtlCol="0">
+            <a:spAutoFit/>
+          </a:bodyPr>
+          <a:lstStyle/>
+          <a:p>
+            <a:pPr algn="ctr"/>
+            <a:endParaRPr lang="en-US" dirty="0" smtClean="0"/>
+          </a:p>
+          <a:p>
+            <a:pPr algn="ctr"/>
+            <a:endParaRPr lang="en-US" dirty="0"/>
+          </a:p>
+          <a:p>
+            <a:pPr algn="ctr"/>
+            <a:r>
+              <a:rPr lang="en-US" dirty="0" smtClean="0"/>
+              <a:t>Please leave this area blank to allow for picture in picture recording</a:t>
+            </a:r>
+          </a:p>
+          <a:p>
+            <a:pPr algn="ctr"/>
+            <a:endParaRPr lang="en-US" dirty="0"/>
+          </a:p>
+        </p:txBody>
+      </p:sp>
+    </p:spTree>
+    <p:extLst>
+      <p:ext uri="{BB962C8B-B14F-4D97-AF65-F5344CB8AC3E}">
+        <p14:creationId xmlns:p14="http://schemas.microsoft.com/office/powerpoint/2010/main" val="140184624"/>
+      </p:ext>
+    </p:extLst>
+  </p:cSld>
+  <p:clrMapOvr>
+    <a:masterClrMapping/>
+  </p:clrMapOvr>
+  <p:timing>
+    <p:tnLst>
+      <p:par>
+        <p:cTn id="1" dur="indefinite" restart="never" nodeType="tmRoot"/>
       </p:par>
     </p:tnLst>
   </p:timing>
@@ -8108,14 +9178,14 @@
                 <a:gridCol w="5762625">
                   <a:extLst>
                     <a:ext uri="{9D8B030D-6E8A-4147-A177-3AD203B41FA5}">
-                      <a16:colId xmlns="" xmlns:a16="http://schemas.microsoft.com/office/drawing/2014/main" val="1632794655"/>
+                      <a16:colId xmlns:a16="http://schemas.microsoft.com/office/drawing/2014/main" xmlns="" val="1632794655"/>
                     </a:ext>
                   </a:extLst>
                 </a:gridCol>
                 <a:gridCol w="5762625">
                   <a:extLst>
                     <a:ext uri="{9D8B030D-6E8A-4147-A177-3AD203B41FA5}">
-                      <a16:colId xmlns="" xmlns:a16="http://schemas.microsoft.com/office/drawing/2014/main" val="2011313899"/>
+                      <a16:colId xmlns:a16="http://schemas.microsoft.com/office/drawing/2014/main" xmlns="" val="2011313899"/>
                     </a:ext>
                   </a:extLst>
                 </a:gridCol>
@@ -8160,7 +9230,7 @@
                 </a:tc>
                 <a:extLst>
                   <a:ext uri="{0D108BD9-81ED-4DB2-BD59-A6C34878D82A}">
-                    <a16:rowId xmlns="" xmlns:a16="http://schemas.microsoft.com/office/drawing/2014/main" val="1789177411"/>
+                    <a16:rowId xmlns:a16="http://schemas.microsoft.com/office/drawing/2014/main" xmlns="" val="1789177411"/>
                   </a:ext>
                 </a:extLst>
               </a:tr>
@@ -8175,14 +9245,7 @@
                           <a:latin typeface="Segoe UI Light" panose="020B0502040204020203" pitchFamily="34" charset="0"/>
                           <a:cs typeface="Segoe UI Light" panose="020B0502040204020203" pitchFamily="34" charset="0"/>
                         </a:rPr>
-                        <a:t>01 | </a:t>
-                      </a:r>
-                      <a:r>
-                        <a:rPr lang="en-US" sz="2400" dirty="0" smtClean="0">
-                          <a:latin typeface="Segoe UI Light" panose="020B0502040204020203" pitchFamily="34" charset="0"/>
-                          <a:cs typeface="Segoe UI Light" panose="020B0502040204020203" pitchFamily="34" charset="0"/>
-                        </a:rPr>
-                        <a:t>Introduction</a:t>
+                        <a:t>01 | Introduction</a:t>
                       </a:r>
                       <a:endParaRPr lang="en-US" sz="2400" dirty="0">
                         <a:latin typeface="Segoe UI Light" panose="020B0502040204020203" pitchFamily="34" charset="0"/>
@@ -8238,7 +9301,7 @@
                 </a:tc>
                 <a:extLst>
                   <a:ext uri="{0D108BD9-81ED-4DB2-BD59-A6C34878D82A}">
-                    <a16:rowId xmlns="" xmlns:a16="http://schemas.microsoft.com/office/drawing/2014/main" val="3842815335"/>
+                    <a16:rowId xmlns:a16="http://schemas.microsoft.com/office/drawing/2014/main" xmlns="" val="3842815335"/>
                   </a:ext>
                 </a:extLst>
               </a:tr>
@@ -8253,14 +9316,7 @@
                           <a:latin typeface="Segoe UI Light" panose="020B0502040204020203" pitchFamily="34" charset="0"/>
                           <a:cs typeface="Segoe UI Light" panose="020B0502040204020203" pitchFamily="34" charset="0"/>
                         </a:rPr>
-                        <a:t>02 | </a:t>
-                      </a:r>
-                      <a:r>
-                        <a:rPr lang="en-US" sz="2400" b="1" dirty="0" smtClean="0">
-                          <a:latin typeface="Segoe UI Light" panose="020B0502040204020203" pitchFamily="34" charset="0"/>
-                          <a:cs typeface="Segoe UI Light" panose="020B0502040204020203" pitchFamily="34" charset="0"/>
-                        </a:rPr>
-                        <a:t>Application Architecture</a:t>
+                        <a:t>02 | Application Architecture</a:t>
                       </a:r>
                       <a:endParaRPr lang="en-US" sz="2400" b="1" dirty="0">
                         <a:latin typeface="Segoe UI Light" panose="020B0502040204020203" pitchFamily="34" charset="0"/>
@@ -8302,7 +9358,7 @@
                 </a:tc>
                 <a:extLst>
                   <a:ext uri="{0D108BD9-81ED-4DB2-BD59-A6C34878D82A}">
-                    <a16:rowId xmlns="" xmlns:a16="http://schemas.microsoft.com/office/drawing/2014/main" val="321066646"/>
+                    <a16:rowId xmlns:a16="http://schemas.microsoft.com/office/drawing/2014/main" xmlns="" val="321066646"/>
                   </a:ext>
                 </a:extLst>
               </a:tr>
@@ -8341,14 +9397,7 @@
                           <a:latin typeface="Segoe UI Light" panose="020B0502040204020203" pitchFamily="34" charset="0"/>
                           <a:cs typeface="Segoe UI Light" panose="020B0502040204020203" pitchFamily="34" charset="0"/>
                         </a:rPr>
-                        <a:t> | </a:t>
-                      </a:r>
-                      <a:r>
-                        <a:rPr lang="en-US" sz="2400" baseline="0" dirty="0" smtClean="0">
-                          <a:latin typeface="Segoe UI Light" panose="020B0502040204020203" pitchFamily="34" charset="0"/>
-                          <a:cs typeface="Segoe UI Light" panose="020B0502040204020203" pitchFamily="34" charset="0"/>
-                        </a:rPr>
-                        <a:t>DNS</a:t>
+                        <a:t> | DNS</a:t>
                       </a:r>
                       <a:endParaRPr lang="en-US" sz="2400" dirty="0" smtClean="0">
                         <a:latin typeface="Segoe UI Light" panose="020B0502040204020203" pitchFamily="34" charset="0"/>
@@ -8394,7 +9443,7 @@
                 </a:tc>
                 <a:extLst>
                   <a:ext uri="{0D108BD9-81ED-4DB2-BD59-A6C34878D82A}">
-                    <a16:rowId xmlns="" xmlns:a16="http://schemas.microsoft.com/office/drawing/2014/main" val="3812060533"/>
+                    <a16:rowId xmlns:a16="http://schemas.microsoft.com/office/drawing/2014/main" xmlns="" val="3812060533"/>
                   </a:ext>
                 </a:extLst>
               </a:tr>
@@ -8409,14 +9458,7 @@
                           <a:latin typeface="Segoe UI Light" panose="020B0502040204020203" pitchFamily="34" charset="0"/>
                           <a:cs typeface="Segoe UI Light" panose="020B0502040204020203" pitchFamily="34" charset="0"/>
                         </a:rPr>
-                        <a:t>04 | </a:t>
-                      </a:r>
-                      <a:r>
-                        <a:rPr lang="en-US" sz="2400" dirty="0" smtClean="0">
-                          <a:latin typeface="Segoe UI Light" panose="020B0502040204020203" pitchFamily="34" charset="0"/>
-                          <a:cs typeface="Segoe UI Light" panose="020B0502040204020203" pitchFamily="34" charset="0"/>
-                        </a:rPr>
-                        <a:t>Batch</a:t>
+                        <a:t>04 | Batch</a:t>
                       </a:r>
                       <a:endParaRPr lang="en-US" sz="2400" dirty="0">
                         <a:latin typeface="Segoe UI Light" panose="020B0502040204020203" pitchFamily="34" charset="0"/>
@@ -8436,21 +9478,7 @@
                           <a:latin typeface="Segoe UI Light" panose="020B0502040204020203" pitchFamily="34" charset="0"/>
                           <a:cs typeface="Segoe UI Light" panose="020B0502040204020203" pitchFamily="34" charset="0"/>
                         </a:rPr>
-                        <a:t>08 </a:t>
-                      </a:r>
-                      <a:r>
-                        <a:rPr lang="en-US" sz="2400" dirty="0" smtClean="0">
-                          <a:latin typeface="Segoe UI Light" panose="020B0502040204020203" pitchFamily="34" charset="0"/>
-                          <a:cs typeface="Segoe UI Light" panose="020B0502040204020203" pitchFamily="34" charset="0"/>
-                        </a:rPr>
-                        <a:t>| </a:t>
-                      </a:r>
-                      <a:r>
-                        <a:rPr lang="en-US" sz="2400" dirty="0" smtClean="0">
-                          <a:latin typeface="Segoe UI Light" panose="020B0502040204020203" pitchFamily="34" charset="0"/>
-                          <a:cs typeface="Segoe UI Light" panose="020B0502040204020203" pitchFamily="34" charset="0"/>
-                        </a:rPr>
-                        <a:t>Review and Summary</a:t>
+                        <a:t>08 | Review and Summary</a:t>
                       </a:r>
                       <a:endParaRPr lang="en-US" sz="2400" dirty="0">
                         <a:latin typeface="Segoe UI Light" panose="020B0502040204020203" pitchFamily="34" charset="0"/>
@@ -8462,7 +9490,7 @@
                 </a:tc>
                 <a:extLst>
                   <a:ext uri="{0D108BD9-81ED-4DB2-BD59-A6C34878D82A}">
-                    <a16:rowId xmlns="" xmlns:a16="http://schemas.microsoft.com/office/drawing/2014/main" val="733235577"/>
+                    <a16:rowId xmlns:a16="http://schemas.microsoft.com/office/drawing/2014/main" xmlns="" val="733235577"/>
                   </a:ext>
                 </a:extLst>
               </a:tr>
@@ -8491,7 +9519,1555 @@
   <p:timing>
     <p:tnLst>
       <p:par>
-        <p:cTn xmlns:p14="http://schemas.microsoft.com/office/powerpoint/2010/main" id="1" dur="indefinite" restart="never" nodeType="tmRoot"/>
+        <p:cTn id="1" dur="indefinite" restart="never" nodeType="tmRoot"/>
+      </p:par>
+    </p:tnLst>
+  </p:timing>
+</p:sld>
+</file>
+
+<file path=ppt/slides/slide30.xml><?xml version="1.0" encoding="utf-8"?>
+<p:sld xmlns:a="http://schemas.openxmlformats.org/drawingml/2006/main" xmlns:r="http://schemas.openxmlformats.org/officeDocument/2006/relationships" xmlns:p="http://schemas.openxmlformats.org/presentationml/2006/main">
+  <p:cSld>
+    <p:spTree>
+      <p:nvGrpSpPr>
+        <p:cNvPr id="1" name=""/>
+        <p:cNvGrpSpPr/>
+        <p:nvPr/>
+      </p:nvGrpSpPr>
+      <p:grpSpPr>
+        <a:xfrm>
+          <a:off x="0" y="0"/>
+          <a:ext cx="0" cy="0"/>
+          <a:chOff x="0" y="0"/>
+          <a:chExt cx="0" cy="0"/>
+        </a:xfrm>
+      </p:grpSpPr>
+      <p:sp>
+        <p:nvSpPr>
+          <p:cNvPr id="2" name="Title 1"/>
+          <p:cNvSpPr>
+            <a:spLocks noGrp="1"/>
+          </p:cNvSpPr>
+          <p:nvPr>
+            <p:ph type="title"/>
+          </p:nvPr>
+        </p:nvSpPr>
+        <p:spPr/>
+        <p:txBody>
+          <a:bodyPr/>
+          <a:lstStyle/>
+          <a:p>
+            <a:r>
+              <a:rPr lang="en-US" dirty="0" err="1" smtClean="0"/>
+              <a:t>MediatR</a:t>
+            </a:r>
+            <a:endParaRPr lang="en-US" dirty="0"/>
+          </a:p>
+        </p:txBody>
+      </p:sp>
+      <p:pic>
+        <p:nvPicPr>
+          <p:cNvPr id="5" name="Content Placeholder 4"/>
+          <p:cNvPicPr>
+            <a:picLocks noGrp="1" noChangeAspect="1"/>
+          </p:cNvPicPr>
+          <p:nvPr>
+            <p:ph sz="quarter" idx="10"/>
+          </p:nvPr>
+        </p:nvPicPr>
+        <p:blipFill>
+          <a:blip r:embed="rId2">
+            <a:extLst>
+              <a:ext uri="{28A0092B-C50C-407E-A947-70E740481C1C}">
+                <a14:useLocalDpi xmlns:a14="http://schemas.microsoft.com/office/drawing/2010/main" val="0"/>
+              </a:ext>
+            </a:extLst>
+          </a:blip>
+          <a:stretch>
+            <a:fillRect/>
+          </a:stretch>
+        </p:blipFill>
+        <p:spPr>
+          <a:xfrm>
+            <a:off x="2798064" y="685800"/>
+            <a:ext cx="5980834" cy="5989318"/>
+          </a:xfrm>
+        </p:spPr>
+      </p:pic>
+      <p:sp>
+        <p:nvSpPr>
+          <p:cNvPr id="4" name="TextBox 3"/>
+          <p:cNvSpPr txBox="1"/>
+          <p:nvPr/>
+        </p:nvSpPr>
+        <p:spPr>
+          <a:xfrm>
+            <a:off x="9906000" y="-1"/>
+            <a:ext cx="2286000" cy="2031325"/>
+          </a:xfrm>
+          <a:prstGeom prst="rect">
+            <a:avLst/>
+          </a:prstGeom>
+          <a:solidFill>
+            <a:srgbClr val="FFFF00"/>
+          </a:solidFill>
+          <a:ln>
+            <a:noFill/>
+          </a:ln>
+        </p:spPr>
+        <p:txBody>
+          <a:bodyPr wrap="square" rtlCol="0">
+            <a:spAutoFit/>
+          </a:bodyPr>
+          <a:lstStyle/>
+          <a:p>
+            <a:pPr algn="ctr"/>
+            <a:endParaRPr lang="en-US" dirty="0" smtClean="0"/>
+          </a:p>
+          <a:p>
+            <a:pPr algn="ctr"/>
+            <a:endParaRPr lang="en-US" dirty="0"/>
+          </a:p>
+          <a:p>
+            <a:pPr algn="ctr"/>
+            <a:r>
+              <a:rPr lang="en-US" dirty="0" smtClean="0"/>
+              <a:t>Please leave this area blank to allow for picture in picture recording</a:t>
+            </a:r>
+          </a:p>
+          <a:p>
+            <a:pPr algn="ctr"/>
+            <a:endParaRPr lang="en-US" dirty="0"/>
+          </a:p>
+        </p:txBody>
+      </p:sp>
+    </p:spTree>
+    <p:extLst>
+      <p:ext uri="{BB962C8B-B14F-4D97-AF65-F5344CB8AC3E}">
+        <p14:creationId xmlns:p14="http://schemas.microsoft.com/office/powerpoint/2010/main" val="467843597"/>
+      </p:ext>
+    </p:extLst>
+  </p:cSld>
+  <p:clrMapOvr>
+    <a:masterClrMapping/>
+  </p:clrMapOvr>
+  <p:timing>
+    <p:tnLst>
+      <p:par>
+        <p:cTn id="1" dur="indefinite" restart="never" nodeType="tmRoot"/>
+      </p:par>
+    </p:tnLst>
+  </p:timing>
+</p:sld>
+</file>
+
+<file path=ppt/slides/slide31.xml><?xml version="1.0" encoding="utf-8"?>
+<p:sld xmlns:a="http://schemas.openxmlformats.org/drawingml/2006/main" xmlns:r="http://schemas.openxmlformats.org/officeDocument/2006/relationships" xmlns:p="http://schemas.openxmlformats.org/presentationml/2006/main">
+  <p:cSld>
+    <p:spTree>
+      <p:nvGrpSpPr>
+        <p:cNvPr id="1" name=""/>
+        <p:cNvGrpSpPr/>
+        <p:nvPr/>
+      </p:nvGrpSpPr>
+      <p:grpSpPr>
+        <a:xfrm>
+          <a:off x="0" y="0"/>
+          <a:ext cx="0" cy="0"/>
+          <a:chOff x="0" y="0"/>
+          <a:chExt cx="0" cy="0"/>
+        </a:xfrm>
+      </p:grpSpPr>
+      <p:sp>
+        <p:nvSpPr>
+          <p:cNvPr id="2" name="Title 1"/>
+          <p:cNvSpPr>
+            <a:spLocks noGrp="1"/>
+          </p:cNvSpPr>
+          <p:nvPr>
+            <p:ph type="title"/>
+          </p:nvPr>
+        </p:nvSpPr>
+        <p:spPr/>
+        <p:txBody>
+          <a:bodyPr/>
+          <a:lstStyle/>
+          <a:p>
+            <a:r>
+              <a:rPr lang="en-US" dirty="0" err="1" smtClean="0"/>
+              <a:t>MediatR</a:t>
+            </a:r>
+            <a:endParaRPr lang="en-US" dirty="0"/>
+          </a:p>
+        </p:txBody>
+      </p:sp>
+      <p:pic>
+        <p:nvPicPr>
+          <p:cNvPr id="5" name="Content Placeholder 4"/>
+          <p:cNvPicPr>
+            <a:picLocks noGrp="1" noChangeAspect="1"/>
+          </p:cNvPicPr>
+          <p:nvPr>
+            <p:ph sz="quarter" idx="10"/>
+          </p:nvPr>
+        </p:nvPicPr>
+        <p:blipFill>
+          <a:blip r:embed="rId2">
+            <a:extLst>
+              <a:ext uri="{28A0092B-C50C-407E-A947-70E740481C1C}">
+                <a14:useLocalDpi xmlns:a14="http://schemas.microsoft.com/office/drawing/2010/main" val="0"/>
+              </a:ext>
+            </a:extLst>
+          </a:blip>
+          <a:stretch>
+            <a:fillRect/>
+          </a:stretch>
+        </p:blipFill>
+        <p:spPr>
+          <a:xfrm>
+            <a:off x="2798064" y="685800"/>
+            <a:ext cx="5980833" cy="5989318"/>
+          </a:xfrm>
+        </p:spPr>
+      </p:pic>
+      <p:sp>
+        <p:nvSpPr>
+          <p:cNvPr id="4" name="TextBox 3"/>
+          <p:cNvSpPr txBox="1"/>
+          <p:nvPr/>
+        </p:nvSpPr>
+        <p:spPr>
+          <a:xfrm>
+            <a:off x="9906000" y="-1"/>
+            <a:ext cx="2286000" cy="2031325"/>
+          </a:xfrm>
+          <a:prstGeom prst="rect">
+            <a:avLst/>
+          </a:prstGeom>
+          <a:solidFill>
+            <a:srgbClr val="FFFF00"/>
+          </a:solidFill>
+          <a:ln>
+            <a:noFill/>
+          </a:ln>
+        </p:spPr>
+        <p:txBody>
+          <a:bodyPr wrap="square" rtlCol="0">
+            <a:spAutoFit/>
+          </a:bodyPr>
+          <a:lstStyle/>
+          <a:p>
+            <a:pPr algn="ctr"/>
+            <a:endParaRPr lang="en-US" dirty="0" smtClean="0"/>
+          </a:p>
+          <a:p>
+            <a:pPr algn="ctr"/>
+            <a:endParaRPr lang="en-US" dirty="0"/>
+          </a:p>
+          <a:p>
+            <a:pPr algn="ctr"/>
+            <a:r>
+              <a:rPr lang="en-US" dirty="0" smtClean="0"/>
+              <a:t>Please leave this area blank to allow for picture in picture recording</a:t>
+            </a:r>
+          </a:p>
+          <a:p>
+            <a:pPr algn="ctr"/>
+            <a:endParaRPr lang="en-US" dirty="0"/>
+          </a:p>
+        </p:txBody>
+      </p:sp>
+    </p:spTree>
+    <p:extLst>
+      <p:ext uri="{BB962C8B-B14F-4D97-AF65-F5344CB8AC3E}">
+        <p14:creationId xmlns:p14="http://schemas.microsoft.com/office/powerpoint/2010/main" val="3915396960"/>
+      </p:ext>
+    </p:extLst>
+  </p:cSld>
+  <p:clrMapOvr>
+    <a:masterClrMapping/>
+  </p:clrMapOvr>
+  <p:timing>
+    <p:tnLst>
+      <p:par>
+        <p:cTn id="1" dur="indefinite" restart="never" nodeType="tmRoot"/>
+      </p:par>
+    </p:tnLst>
+  </p:timing>
+</p:sld>
+</file>
+
+<file path=ppt/slides/slide32.xml><?xml version="1.0" encoding="utf-8"?>
+<p:sld xmlns:a="http://schemas.openxmlformats.org/drawingml/2006/main" xmlns:r="http://schemas.openxmlformats.org/officeDocument/2006/relationships" xmlns:p="http://schemas.openxmlformats.org/presentationml/2006/main">
+  <p:cSld>
+    <p:spTree>
+      <p:nvGrpSpPr>
+        <p:cNvPr id="1" name=""/>
+        <p:cNvGrpSpPr/>
+        <p:nvPr/>
+      </p:nvGrpSpPr>
+      <p:grpSpPr>
+        <a:xfrm>
+          <a:off x="0" y="0"/>
+          <a:ext cx="0" cy="0"/>
+          <a:chOff x="0" y="0"/>
+          <a:chExt cx="0" cy="0"/>
+        </a:xfrm>
+      </p:grpSpPr>
+      <p:sp>
+        <p:nvSpPr>
+          <p:cNvPr id="2" name="Title 1"/>
+          <p:cNvSpPr>
+            <a:spLocks noGrp="1"/>
+          </p:cNvSpPr>
+          <p:nvPr>
+            <p:ph type="title"/>
+          </p:nvPr>
+        </p:nvSpPr>
+        <p:spPr/>
+        <p:txBody>
+          <a:bodyPr/>
+          <a:lstStyle/>
+          <a:p>
+            <a:r>
+              <a:rPr lang="en-US" dirty="0" err="1" smtClean="0"/>
+              <a:t>MediatR</a:t>
+            </a:r>
+            <a:endParaRPr lang="en-US" dirty="0"/>
+          </a:p>
+        </p:txBody>
+      </p:sp>
+      <p:pic>
+        <p:nvPicPr>
+          <p:cNvPr id="5" name="Content Placeholder 4"/>
+          <p:cNvPicPr>
+            <a:picLocks noGrp="1" noChangeAspect="1"/>
+          </p:cNvPicPr>
+          <p:nvPr>
+            <p:ph sz="quarter" idx="10"/>
+          </p:nvPr>
+        </p:nvPicPr>
+        <p:blipFill>
+          <a:blip r:embed="rId2">
+            <a:extLst>
+              <a:ext uri="{28A0092B-C50C-407E-A947-70E740481C1C}">
+                <a14:useLocalDpi xmlns:a14="http://schemas.microsoft.com/office/drawing/2010/main" val="0"/>
+              </a:ext>
+            </a:extLst>
+          </a:blip>
+          <a:stretch>
+            <a:fillRect/>
+          </a:stretch>
+        </p:blipFill>
+        <p:spPr>
+          <a:xfrm>
+            <a:off x="2798064" y="685800"/>
+            <a:ext cx="5980833" cy="5989317"/>
+          </a:xfrm>
+        </p:spPr>
+      </p:pic>
+      <p:sp>
+        <p:nvSpPr>
+          <p:cNvPr id="4" name="TextBox 3"/>
+          <p:cNvSpPr txBox="1"/>
+          <p:nvPr/>
+        </p:nvSpPr>
+        <p:spPr>
+          <a:xfrm>
+            <a:off x="9906000" y="-1"/>
+            <a:ext cx="2286000" cy="2031325"/>
+          </a:xfrm>
+          <a:prstGeom prst="rect">
+            <a:avLst/>
+          </a:prstGeom>
+          <a:solidFill>
+            <a:srgbClr val="FFFF00"/>
+          </a:solidFill>
+          <a:ln>
+            <a:noFill/>
+          </a:ln>
+        </p:spPr>
+        <p:txBody>
+          <a:bodyPr wrap="square" rtlCol="0">
+            <a:spAutoFit/>
+          </a:bodyPr>
+          <a:lstStyle/>
+          <a:p>
+            <a:pPr algn="ctr"/>
+            <a:endParaRPr lang="en-US" dirty="0" smtClean="0"/>
+          </a:p>
+          <a:p>
+            <a:pPr algn="ctr"/>
+            <a:endParaRPr lang="en-US" dirty="0"/>
+          </a:p>
+          <a:p>
+            <a:pPr algn="ctr"/>
+            <a:r>
+              <a:rPr lang="en-US" dirty="0" smtClean="0"/>
+              <a:t>Please leave this area blank to allow for picture in picture recording</a:t>
+            </a:r>
+          </a:p>
+          <a:p>
+            <a:pPr algn="ctr"/>
+            <a:endParaRPr lang="en-US" dirty="0"/>
+          </a:p>
+        </p:txBody>
+      </p:sp>
+    </p:spTree>
+    <p:extLst>
+      <p:ext uri="{BB962C8B-B14F-4D97-AF65-F5344CB8AC3E}">
+        <p14:creationId xmlns:p14="http://schemas.microsoft.com/office/powerpoint/2010/main" val="2969436410"/>
+      </p:ext>
+    </p:extLst>
+  </p:cSld>
+  <p:clrMapOvr>
+    <a:masterClrMapping/>
+  </p:clrMapOvr>
+  <p:timing>
+    <p:tnLst>
+      <p:par>
+        <p:cTn id="1" dur="indefinite" restart="never" nodeType="tmRoot"/>
+      </p:par>
+    </p:tnLst>
+  </p:timing>
+</p:sld>
+</file>
+
+<file path=ppt/slides/slide33.xml><?xml version="1.0" encoding="utf-8"?>
+<p:sld xmlns:a="http://schemas.openxmlformats.org/drawingml/2006/main" xmlns:r="http://schemas.openxmlformats.org/officeDocument/2006/relationships" xmlns:p="http://schemas.openxmlformats.org/presentationml/2006/main">
+  <p:cSld>
+    <p:spTree>
+      <p:nvGrpSpPr>
+        <p:cNvPr id="1" name=""/>
+        <p:cNvGrpSpPr/>
+        <p:nvPr/>
+      </p:nvGrpSpPr>
+      <p:grpSpPr>
+        <a:xfrm>
+          <a:off x="0" y="0"/>
+          <a:ext cx="0" cy="0"/>
+          <a:chOff x="0" y="0"/>
+          <a:chExt cx="0" cy="0"/>
+        </a:xfrm>
+      </p:grpSpPr>
+      <p:sp>
+        <p:nvSpPr>
+          <p:cNvPr id="2" name="Title 1"/>
+          <p:cNvSpPr>
+            <a:spLocks noGrp="1"/>
+          </p:cNvSpPr>
+          <p:nvPr>
+            <p:ph type="title"/>
+          </p:nvPr>
+        </p:nvSpPr>
+        <p:spPr/>
+        <p:txBody>
+          <a:bodyPr/>
+          <a:lstStyle/>
+          <a:p>
+            <a:r>
+              <a:rPr lang="en-US" dirty="0" err="1" smtClean="0"/>
+              <a:t>MediatR</a:t>
+            </a:r>
+            <a:endParaRPr lang="en-US" dirty="0"/>
+          </a:p>
+        </p:txBody>
+      </p:sp>
+      <p:pic>
+        <p:nvPicPr>
+          <p:cNvPr id="5" name="Content Placeholder 4"/>
+          <p:cNvPicPr>
+            <a:picLocks noGrp="1" noChangeAspect="1"/>
+          </p:cNvPicPr>
+          <p:nvPr>
+            <p:ph sz="quarter" idx="10"/>
+          </p:nvPr>
+        </p:nvPicPr>
+        <p:blipFill>
+          <a:blip r:embed="rId2">
+            <a:extLst>
+              <a:ext uri="{28A0092B-C50C-407E-A947-70E740481C1C}">
+                <a14:useLocalDpi xmlns:a14="http://schemas.microsoft.com/office/drawing/2010/main" val="0"/>
+              </a:ext>
+            </a:extLst>
+          </a:blip>
+          <a:stretch>
+            <a:fillRect/>
+          </a:stretch>
+        </p:blipFill>
+        <p:spPr>
+          <a:xfrm>
+            <a:off x="2798064" y="685800"/>
+            <a:ext cx="5980832" cy="5989317"/>
+          </a:xfrm>
+        </p:spPr>
+      </p:pic>
+      <p:sp>
+        <p:nvSpPr>
+          <p:cNvPr id="4" name="TextBox 3"/>
+          <p:cNvSpPr txBox="1"/>
+          <p:nvPr/>
+        </p:nvSpPr>
+        <p:spPr>
+          <a:xfrm>
+            <a:off x="9906000" y="-1"/>
+            <a:ext cx="2286000" cy="2031325"/>
+          </a:xfrm>
+          <a:prstGeom prst="rect">
+            <a:avLst/>
+          </a:prstGeom>
+          <a:solidFill>
+            <a:srgbClr val="FFFF00"/>
+          </a:solidFill>
+          <a:ln>
+            <a:noFill/>
+          </a:ln>
+        </p:spPr>
+        <p:txBody>
+          <a:bodyPr wrap="square" rtlCol="0">
+            <a:spAutoFit/>
+          </a:bodyPr>
+          <a:lstStyle/>
+          <a:p>
+            <a:pPr algn="ctr"/>
+            <a:endParaRPr lang="en-US" dirty="0" smtClean="0"/>
+          </a:p>
+          <a:p>
+            <a:pPr algn="ctr"/>
+            <a:endParaRPr lang="en-US" dirty="0"/>
+          </a:p>
+          <a:p>
+            <a:pPr algn="ctr"/>
+            <a:r>
+              <a:rPr lang="en-US" dirty="0" smtClean="0"/>
+              <a:t>Please leave this area blank to allow for picture in picture recording</a:t>
+            </a:r>
+          </a:p>
+          <a:p>
+            <a:pPr algn="ctr"/>
+            <a:endParaRPr lang="en-US" dirty="0"/>
+          </a:p>
+        </p:txBody>
+      </p:sp>
+    </p:spTree>
+    <p:extLst>
+      <p:ext uri="{BB962C8B-B14F-4D97-AF65-F5344CB8AC3E}">
+        <p14:creationId xmlns:p14="http://schemas.microsoft.com/office/powerpoint/2010/main" val="3206217056"/>
+      </p:ext>
+    </p:extLst>
+  </p:cSld>
+  <p:clrMapOvr>
+    <a:masterClrMapping/>
+  </p:clrMapOvr>
+  <p:timing>
+    <p:tnLst>
+      <p:par>
+        <p:cTn id="1" dur="indefinite" restart="never" nodeType="tmRoot"/>
+      </p:par>
+    </p:tnLst>
+  </p:timing>
+</p:sld>
+</file>
+
+<file path=ppt/slides/slide34.xml><?xml version="1.0" encoding="utf-8"?>
+<p:sld xmlns:a="http://schemas.openxmlformats.org/drawingml/2006/main" xmlns:r="http://schemas.openxmlformats.org/officeDocument/2006/relationships" xmlns:p="http://schemas.openxmlformats.org/presentationml/2006/main">
+  <p:cSld>
+    <p:spTree>
+      <p:nvGrpSpPr>
+        <p:cNvPr id="1" name=""/>
+        <p:cNvGrpSpPr/>
+        <p:nvPr/>
+      </p:nvGrpSpPr>
+      <p:grpSpPr>
+        <a:xfrm>
+          <a:off x="0" y="0"/>
+          <a:ext cx="0" cy="0"/>
+          <a:chOff x="0" y="0"/>
+          <a:chExt cx="0" cy="0"/>
+        </a:xfrm>
+      </p:grpSpPr>
+      <p:sp>
+        <p:nvSpPr>
+          <p:cNvPr id="2" name="Title 1"/>
+          <p:cNvSpPr>
+            <a:spLocks noGrp="1"/>
+          </p:cNvSpPr>
+          <p:nvPr>
+            <p:ph type="title"/>
+          </p:nvPr>
+        </p:nvSpPr>
+        <p:spPr/>
+        <p:txBody>
+          <a:bodyPr/>
+          <a:lstStyle/>
+          <a:p>
+            <a:r>
+              <a:rPr lang="en-US" dirty="0" err="1" smtClean="0"/>
+              <a:t>MediatR</a:t>
+            </a:r>
+            <a:endParaRPr lang="en-US" dirty="0"/>
+          </a:p>
+        </p:txBody>
+      </p:sp>
+      <p:pic>
+        <p:nvPicPr>
+          <p:cNvPr id="5" name="Content Placeholder 4"/>
+          <p:cNvPicPr>
+            <a:picLocks noGrp="1" noChangeAspect="1"/>
+          </p:cNvPicPr>
+          <p:nvPr>
+            <p:ph sz="quarter" idx="10"/>
+          </p:nvPr>
+        </p:nvPicPr>
+        <p:blipFill>
+          <a:blip r:embed="rId3">
+            <a:extLst>
+              <a:ext uri="{28A0092B-C50C-407E-A947-70E740481C1C}">
+                <a14:useLocalDpi xmlns:a14="http://schemas.microsoft.com/office/drawing/2010/main" val="0"/>
+              </a:ext>
+            </a:extLst>
+          </a:blip>
+          <a:stretch>
+            <a:fillRect/>
+          </a:stretch>
+        </p:blipFill>
+        <p:spPr>
+          <a:xfrm>
+            <a:off x="2798064" y="685800"/>
+            <a:ext cx="8729476" cy="5989320"/>
+          </a:xfrm>
+        </p:spPr>
+      </p:pic>
+      <p:sp>
+        <p:nvSpPr>
+          <p:cNvPr id="4" name="TextBox 3"/>
+          <p:cNvSpPr txBox="1"/>
+          <p:nvPr/>
+        </p:nvSpPr>
+        <p:spPr>
+          <a:xfrm>
+            <a:off x="9906000" y="-1"/>
+            <a:ext cx="2286000" cy="2031325"/>
+          </a:xfrm>
+          <a:prstGeom prst="rect">
+            <a:avLst/>
+          </a:prstGeom>
+          <a:solidFill>
+            <a:srgbClr val="FFFF00"/>
+          </a:solidFill>
+          <a:ln>
+            <a:noFill/>
+          </a:ln>
+        </p:spPr>
+        <p:txBody>
+          <a:bodyPr wrap="square" rtlCol="0">
+            <a:spAutoFit/>
+          </a:bodyPr>
+          <a:lstStyle/>
+          <a:p>
+            <a:pPr algn="ctr"/>
+            <a:endParaRPr lang="en-US" dirty="0" smtClean="0"/>
+          </a:p>
+          <a:p>
+            <a:pPr algn="ctr"/>
+            <a:endParaRPr lang="en-US" dirty="0"/>
+          </a:p>
+          <a:p>
+            <a:pPr algn="ctr"/>
+            <a:r>
+              <a:rPr lang="en-US" dirty="0" smtClean="0"/>
+              <a:t>Please leave this area blank to allow for picture in picture recording</a:t>
+            </a:r>
+          </a:p>
+          <a:p>
+            <a:pPr algn="ctr"/>
+            <a:endParaRPr lang="en-US" dirty="0"/>
+          </a:p>
+        </p:txBody>
+      </p:sp>
+    </p:spTree>
+    <p:extLst>
+      <p:ext uri="{BB962C8B-B14F-4D97-AF65-F5344CB8AC3E}">
+        <p14:creationId xmlns:p14="http://schemas.microsoft.com/office/powerpoint/2010/main" val="567731557"/>
+      </p:ext>
+    </p:extLst>
+  </p:cSld>
+  <p:clrMapOvr>
+    <a:masterClrMapping/>
+  </p:clrMapOvr>
+  <p:timing>
+    <p:tnLst>
+      <p:par>
+        <p:cTn id="1" dur="indefinite" restart="never" nodeType="tmRoot"/>
+      </p:par>
+    </p:tnLst>
+  </p:timing>
+</p:sld>
+</file>
+
+<file path=ppt/slides/slide35.xml><?xml version="1.0" encoding="utf-8"?>
+<p:sld xmlns:a="http://schemas.openxmlformats.org/drawingml/2006/main" xmlns:r="http://schemas.openxmlformats.org/officeDocument/2006/relationships" xmlns:p="http://schemas.openxmlformats.org/presentationml/2006/main">
+  <p:cSld>
+    <p:spTree>
+      <p:nvGrpSpPr>
+        <p:cNvPr id="1" name=""/>
+        <p:cNvGrpSpPr/>
+        <p:nvPr/>
+      </p:nvGrpSpPr>
+      <p:grpSpPr>
+        <a:xfrm>
+          <a:off x="0" y="0"/>
+          <a:ext cx="0" cy="0"/>
+          <a:chOff x="0" y="0"/>
+          <a:chExt cx="0" cy="0"/>
+        </a:xfrm>
+      </p:grpSpPr>
+      <p:sp>
+        <p:nvSpPr>
+          <p:cNvPr id="2" name="Title 1"/>
+          <p:cNvSpPr>
+            <a:spLocks noGrp="1"/>
+          </p:cNvSpPr>
+          <p:nvPr>
+            <p:ph type="title"/>
+          </p:nvPr>
+        </p:nvSpPr>
+        <p:spPr/>
+        <p:txBody>
+          <a:bodyPr/>
+          <a:lstStyle/>
+          <a:p>
+            <a:r>
+              <a:rPr lang="en-US" dirty="0" err="1" smtClean="0"/>
+              <a:t>MediatR</a:t>
+            </a:r>
+            <a:r>
+              <a:rPr lang="en-US" dirty="0" smtClean="0"/>
+              <a:t> – How do we arrange code?</a:t>
+            </a:r>
+            <a:endParaRPr lang="en-US" dirty="0"/>
+          </a:p>
+        </p:txBody>
+      </p:sp>
+      <p:sp>
+        <p:nvSpPr>
+          <p:cNvPr id="4" name="TextBox 3"/>
+          <p:cNvSpPr txBox="1"/>
+          <p:nvPr/>
+        </p:nvSpPr>
+        <p:spPr>
+          <a:xfrm>
+            <a:off x="9906000" y="-1"/>
+            <a:ext cx="2286000" cy="2031325"/>
+          </a:xfrm>
+          <a:prstGeom prst="rect">
+            <a:avLst/>
+          </a:prstGeom>
+          <a:solidFill>
+            <a:srgbClr val="FFFF00"/>
+          </a:solidFill>
+          <a:ln>
+            <a:noFill/>
+          </a:ln>
+        </p:spPr>
+        <p:txBody>
+          <a:bodyPr wrap="square" rtlCol="0">
+            <a:spAutoFit/>
+          </a:bodyPr>
+          <a:lstStyle/>
+          <a:p>
+            <a:pPr algn="ctr"/>
+            <a:endParaRPr lang="en-US" dirty="0" smtClean="0"/>
+          </a:p>
+          <a:p>
+            <a:pPr algn="ctr"/>
+            <a:endParaRPr lang="en-US" dirty="0"/>
+          </a:p>
+          <a:p>
+            <a:pPr algn="ctr"/>
+            <a:r>
+              <a:rPr lang="en-US" dirty="0" smtClean="0"/>
+              <a:t>Please leave this area blank to allow for picture in picture recording</a:t>
+            </a:r>
+          </a:p>
+          <a:p>
+            <a:pPr algn="ctr"/>
+            <a:endParaRPr lang="en-US" dirty="0"/>
+          </a:p>
+        </p:txBody>
+      </p:sp>
+      <p:sp>
+        <p:nvSpPr>
+          <p:cNvPr id="3" name="Content Placeholder 2"/>
+          <p:cNvSpPr>
+            <a:spLocks noGrp="1"/>
+          </p:cNvSpPr>
+          <p:nvPr>
+            <p:ph sz="quarter" idx="10"/>
+          </p:nvPr>
+        </p:nvSpPr>
+        <p:spPr/>
+        <p:txBody>
+          <a:bodyPr/>
+          <a:lstStyle/>
+          <a:p>
+            <a:endParaRPr lang="en-US"/>
+          </a:p>
+        </p:txBody>
+      </p:sp>
+    </p:spTree>
+    <p:extLst>
+      <p:ext uri="{BB962C8B-B14F-4D97-AF65-F5344CB8AC3E}">
+        <p14:creationId xmlns:p14="http://schemas.microsoft.com/office/powerpoint/2010/main" val="4063311460"/>
+      </p:ext>
+    </p:extLst>
+  </p:cSld>
+  <p:clrMapOvr>
+    <a:masterClrMapping/>
+  </p:clrMapOvr>
+  <p:timing>
+    <p:tnLst>
+      <p:par>
+        <p:cTn id="1" dur="indefinite" restart="never" nodeType="tmRoot"/>
+      </p:par>
+    </p:tnLst>
+  </p:timing>
+</p:sld>
+</file>
+
+<file path=ppt/slides/slide36.xml><?xml version="1.0" encoding="utf-8"?>
+<p:sld xmlns:a="http://schemas.openxmlformats.org/drawingml/2006/main" xmlns:r="http://schemas.openxmlformats.org/officeDocument/2006/relationships" xmlns:p="http://schemas.openxmlformats.org/presentationml/2006/main">
+  <p:cSld>
+    <p:spTree>
+      <p:nvGrpSpPr>
+        <p:cNvPr id="1" name=""/>
+        <p:cNvGrpSpPr/>
+        <p:nvPr/>
+      </p:nvGrpSpPr>
+      <p:grpSpPr>
+        <a:xfrm>
+          <a:off x="0" y="0"/>
+          <a:ext cx="0" cy="0"/>
+          <a:chOff x="0" y="0"/>
+          <a:chExt cx="0" cy="0"/>
+        </a:xfrm>
+      </p:grpSpPr>
+      <p:sp>
+        <p:nvSpPr>
+          <p:cNvPr id="2" name="Title 1"/>
+          <p:cNvSpPr>
+            <a:spLocks noGrp="1"/>
+          </p:cNvSpPr>
+          <p:nvPr>
+            <p:ph type="title"/>
+          </p:nvPr>
+        </p:nvSpPr>
+        <p:spPr/>
+        <p:txBody>
+          <a:bodyPr/>
+          <a:lstStyle/>
+          <a:p>
+            <a:r>
+              <a:rPr lang="en-US" dirty="0" smtClean="0"/>
+              <a:t>Twitter Authentication</a:t>
+            </a:r>
+            <a:endParaRPr lang="en-US" dirty="0"/>
+          </a:p>
+        </p:txBody>
+      </p:sp>
+      <p:pic>
+        <p:nvPicPr>
+          <p:cNvPr id="5" name="Content Placeholder 4"/>
+          <p:cNvPicPr>
+            <a:picLocks noGrp="1" noChangeAspect="1"/>
+          </p:cNvPicPr>
+          <p:nvPr>
+            <p:ph sz="quarter" idx="10"/>
+          </p:nvPr>
+        </p:nvPicPr>
+        <p:blipFill>
+          <a:blip r:embed="rId3">
+            <a:extLst>
+              <a:ext uri="{28A0092B-C50C-407E-A947-70E740481C1C}">
+                <a14:useLocalDpi xmlns:a14="http://schemas.microsoft.com/office/drawing/2010/main" val="0"/>
+              </a:ext>
+            </a:extLst>
+          </a:blip>
+          <a:stretch>
+            <a:fillRect/>
+          </a:stretch>
+        </p:blipFill>
+        <p:spPr>
+          <a:xfrm>
+            <a:off x="1388081" y="2325957"/>
+            <a:ext cx="2381250" cy="2905125"/>
+          </a:xfrm>
+        </p:spPr>
+      </p:pic>
+      <p:sp>
+        <p:nvSpPr>
+          <p:cNvPr id="4" name="TextBox 3"/>
+          <p:cNvSpPr txBox="1"/>
+          <p:nvPr/>
+        </p:nvSpPr>
+        <p:spPr>
+          <a:xfrm>
+            <a:off x="9906000" y="-1"/>
+            <a:ext cx="2286000" cy="2031325"/>
+          </a:xfrm>
+          <a:prstGeom prst="rect">
+            <a:avLst/>
+          </a:prstGeom>
+          <a:solidFill>
+            <a:srgbClr val="FFFF00"/>
+          </a:solidFill>
+          <a:ln>
+            <a:noFill/>
+          </a:ln>
+        </p:spPr>
+        <p:txBody>
+          <a:bodyPr wrap="square" rtlCol="0">
+            <a:spAutoFit/>
+          </a:bodyPr>
+          <a:lstStyle/>
+          <a:p>
+            <a:pPr algn="ctr"/>
+            <a:endParaRPr lang="en-US" dirty="0" smtClean="0"/>
+          </a:p>
+          <a:p>
+            <a:pPr algn="ctr"/>
+            <a:endParaRPr lang="en-US" dirty="0"/>
+          </a:p>
+          <a:p>
+            <a:pPr algn="ctr"/>
+            <a:r>
+              <a:rPr lang="en-US" dirty="0" smtClean="0"/>
+              <a:t>Please leave this area blank to allow for picture in picture recording</a:t>
+            </a:r>
+          </a:p>
+          <a:p>
+            <a:pPr algn="ctr"/>
+            <a:endParaRPr lang="en-US" dirty="0"/>
+          </a:p>
+        </p:txBody>
+      </p:sp>
+      <p:pic>
+        <p:nvPicPr>
+          <p:cNvPr id="6" name="Picture 5"/>
+          <p:cNvPicPr>
+            <a:picLocks noChangeAspect="1"/>
+          </p:cNvPicPr>
+          <p:nvPr/>
+        </p:nvPicPr>
+        <p:blipFill>
+          <a:blip r:embed="rId4">
+            <a:extLst>
+              <a:ext uri="{28A0092B-C50C-407E-A947-70E740481C1C}">
+                <a14:useLocalDpi xmlns:a14="http://schemas.microsoft.com/office/drawing/2010/main" val="0"/>
+              </a:ext>
+            </a:extLst>
+          </a:blip>
+          <a:stretch>
+            <a:fillRect/>
+          </a:stretch>
+        </p:blipFill>
+        <p:spPr>
+          <a:xfrm>
+            <a:off x="4262826" y="1473274"/>
+            <a:ext cx="3757808" cy="3757808"/>
+          </a:xfrm>
+          <a:prstGeom prst="rect">
+            <a:avLst/>
+          </a:prstGeom>
+        </p:spPr>
+      </p:pic>
+      <p:sp>
+        <p:nvSpPr>
+          <p:cNvPr id="7" name="Rectangle 6"/>
+          <p:cNvSpPr/>
+          <p:nvPr/>
+        </p:nvSpPr>
+        <p:spPr>
+          <a:xfrm>
+            <a:off x="9590489" y="6627168"/>
+            <a:ext cx="2656496" cy="230832"/>
+          </a:xfrm>
+          <a:prstGeom prst="rect">
+            <a:avLst/>
+          </a:prstGeom>
+        </p:spPr>
+        <p:txBody>
+          <a:bodyPr wrap="none">
+            <a:spAutoFit/>
+          </a:bodyPr>
+          <a:lstStyle/>
+          <a:p>
+            <a:r>
+              <a:rPr lang="en-US" sz="900" dirty="0"/>
+              <a:t>http://balzanomichele.blogspot.ca/p/password.html</a:t>
+            </a:r>
+          </a:p>
+        </p:txBody>
+      </p:sp>
+      <p:sp>
+        <p:nvSpPr>
+          <p:cNvPr id="8" name="Rectangle 7"/>
+          <p:cNvSpPr/>
+          <p:nvPr/>
+        </p:nvSpPr>
+        <p:spPr>
+          <a:xfrm>
+            <a:off x="0" y="6627168"/>
+            <a:ext cx="6505899" cy="230832"/>
+          </a:xfrm>
+          <a:prstGeom prst="rect">
+            <a:avLst/>
+          </a:prstGeom>
+        </p:spPr>
+        <p:txBody>
+          <a:bodyPr wrap="square">
+            <a:spAutoFit/>
+          </a:bodyPr>
+          <a:lstStyle/>
+          <a:p>
+            <a:r>
+              <a:rPr lang="en-US" sz="900" dirty="0"/>
+              <a:t>http://bmj2k.com/2013/06/21/imponderable-98-lomza-poland/</a:t>
+            </a:r>
+          </a:p>
+        </p:txBody>
+      </p:sp>
+    </p:spTree>
+    <p:extLst>
+      <p:ext uri="{BB962C8B-B14F-4D97-AF65-F5344CB8AC3E}">
+        <p14:creationId xmlns:p14="http://schemas.microsoft.com/office/powerpoint/2010/main" val="3962534892"/>
+      </p:ext>
+    </p:extLst>
+  </p:cSld>
+  <p:clrMapOvr>
+    <a:masterClrMapping/>
+  </p:clrMapOvr>
+  <p:timing>
+    <p:tnLst>
+      <p:par>
+        <p:cTn id="1" dur="indefinite" restart="never" nodeType="tmRoot">
+          <p:childTnLst>
+            <p:seq concurrent="1" nextAc="seek">
+              <p:cTn id="2" dur="indefinite" nodeType="mainSeq">
+                <p:childTnLst>
+                  <p:par>
+                    <p:cTn id="3" fill="hold">
+                      <p:stCondLst>
+                        <p:cond delay="indefinite"/>
+                      </p:stCondLst>
+                      <p:childTnLst>
+                        <p:par>
+                          <p:cTn id="4" fill="hold">
+                            <p:stCondLst>
+                              <p:cond delay="0"/>
+                            </p:stCondLst>
+                            <p:childTnLst>
+                              <p:par>
+                                <p:cTn id="5" presetID="42" presetClass="entr" presetSubtype="0" fill="hold" nodeType="clickEffect">
+                                  <p:stCondLst>
+                                    <p:cond delay="0"/>
+                                  </p:stCondLst>
+                                  <p:childTnLst>
+                                    <p:set>
+                                      <p:cBhvr>
+                                        <p:cTn id="6" dur="1" fill="hold">
+                                          <p:stCondLst>
+                                            <p:cond delay="0"/>
+                                          </p:stCondLst>
+                                        </p:cTn>
+                                        <p:tgtEl>
+                                          <p:spTgt spid="5"/>
+                                        </p:tgtEl>
+                                        <p:attrNameLst>
+                                          <p:attrName>style.visibility</p:attrName>
+                                        </p:attrNameLst>
+                                      </p:cBhvr>
+                                      <p:to>
+                                        <p:strVal val="visible"/>
+                                      </p:to>
+                                    </p:set>
+                                    <p:animEffect transition="in" filter="fade">
+                                      <p:cBhvr>
+                                        <p:cTn id="7" dur="1000"/>
+                                        <p:tgtEl>
+                                          <p:spTgt spid="5"/>
+                                        </p:tgtEl>
+                                      </p:cBhvr>
+                                    </p:animEffect>
+                                    <p:anim calcmode="lin" valueType="num">
+                                      <p:cBhvr>
+                                        <p:cTn id="8" dur="1000" fill="hold"/>
+                                        <p:tgtEl>
+                                          <p:spTgt spid="5"/>
+                                        </p:tgtEl>
+                                        <p:attrNameLst>
+                                          <p:attrName>ppt_x</p:attrName>
+                                        </p:attrNameLst>
+                                      </p:cBhvr>
+                                      <p:tavLst>
+                                        <p:tav tm="0">
+                                          <p:val>
+                                            <p:strVal val="#ppt_x"/>
+                                          </p:val>
+                                        </p:tav>
+                                        <p:tav tm="100000">
+                                          <p:val>
+                                            <p:strVal val="#ppt_x"/>
+                                          </p:val>
+                                        </p:tav>
+                                      </p:tavLst>
+                                    </p:anim>
+                                    <p:anim calcmode="lin" valueType="num">
+                                      <p:cBhvr>
+                                        <p:cTn id="9" dur="1000" fill="hold"/>
+                                        <p:tgtEl>
+                                          <p:spTgt spid="5"/>
+                                        </p:tgtEl>
+                                        <p:attrNameLst>
+                                          <p:attrName>ppt_y</p:attrName>
+                                        </p:attrNameLst>
+                                      </p:cBhvr>
+                                      <p:tavLst>
+                                        <p:tav tm="0">
+                                          <p:val>
+                                            <p:strVal val="#ppt_y+.1"/>
+                                          </p:val>
+                                        </p:tav>
+                                        <p:tav tm="100000">
+                                          <p:val>
+                                            <p:strVal val="#ppt_y"/>
+                                          </p:val>
+                                        </p:tav>
+                                      </p:tavLst>
+                                    </p:anim>
+                                  </p:childTnLst>
+                                </p:cTn>
+                              </p:par>
+                            </p:childTnLst>
+                          </p:cTn>
+                        </p:par>
+                      </p:childTnLst>
+                    </p:cTn>
+                  </p:par>
+                </p:childTnLst>
+              </p:cTn>
+              <p:prevCondLst>
+                <p:cond evt="onPrev" delay="0">
+                  <p:tgtEl>
+                    <p:sldTgt/>
+                  </p:tgtEl>
+                </p:cond>
+              </p:prevCondLst>
+              <p:nextCondLst>
+                <p:cond evt="onNext" delay="0">
+                  <p:tgtEl>
+                    <p:sldTgt/>
+                  </p:tgtEl>
+                </p:cond>
+              </p:nextCondLst>
+            </p:seq>
+          </p:childTnLst>
+        </p:cTn>
+      </p:par>
+    </p:tnLst>
+  </p:timing>
+</p:sld>
+</file>
+
+<file path=ppt/slides/slide37.xml><?xml version="1.0" encoding="utf-8"?>
+<p:sld xmlns:a="http://schemas.openxmlformats.org/drawingml/2006/main" xmlns:r="http://schemas.openxmlformats.org/officeDocument/2006/relationships" xmlns:p="http://schemas.openxmlformats.org/presentationml/2006/main">
+  <p:cSld>
+    <p:spTree>
+      <p:nvGrpSpPr>
+        <p:cNvPr id="1" name=""/>
+        <p:cNvGrpSpPr/>
+        <p:nvPr/>
+      </p:nvGrpSpPr>
+      <p:grpSpPr>
+        <a:xfrm>
+          <a:off x="0" y="0"/>
+          <a:ext cx="0" cy="0"/>
+          <a:chOff x="0" y="0"/>
+          <a:chExt cx="0" cy="0"/>
+        </a:xfrm>
+      </p:grpSpPr>
+      <p:sp>
+        <p:nvSpPr>
+          <p:cNvPr id="2" name="Title 1"/>
+          <p:cNvSpPr>
+            <a:spLocks noGrp="1"/>
+          </p:cNvSpPr>
+          <p:nvPr>
+            <p:ph type="title"/>
+          </p:nvPr>
+        </p:nvSpPr>
+        <p:spPr/>
+        <p:txBody>
+          <a:bodyPr/>
+          <a:lstStyle/>
+          <a:p>
+            <a:r>
+              <a:rPr lang="en-US" dirty="0" smtClean="0"/>
+              <a:t>Twitter Authentication</a:t>
+            </a:r>
+            <a:endParaRPr lang="en-US" dirty="0"/>
+          </a:p>
+        </p:txBody>
+      </p:sp>
+      <p:pic>
+        <p:nvPicPr>
+          <p:cNvPr id="5" name="Content Placeholder 4"/>
+          <p:cNvPicPr>
+            <a:picLocks noGrp="1" noChangeAspect="1"/>
+          </p:cNvPicPr>
+          <p:nvPr>
+            <p:ph sz="quarter" idx="10"/>
+          </p:nvPr>
+        </p:nvPicPr>
+        <p:blipFill>
+          <a:blip r:embed="rId3">
+            <a:extLst>
+              <a:ext uri="{28A0092B-C50C-407E-A947-70E740481C1C}">
+                <a14:useLocalDpi xmlns:a14="http://schemas.microsoft.com/office/drawing/2010/main" val="0"/>
+              </a:ext>
+            </a:extLst>
+          </a:blip>
+          <a:stretch>
+            <a:fillRect/>
+          </a:stretch>
+        </p:blipFill>
+        <p:spPr>
+          <a:xfrm>
+            <a:off x="1388081" y="2325957"/>
+            <a:ext cx="2381250" cy="2905125"/>
+          </a:xfrm>
+        </p:spPr>
+      </p:pic>
+      <p:sp>
+        <p:nvSpPr>
+          <p:cNvPr id="4" name="TextBox 3"/>
+          <p:cNvSpPr txBox="1"/>
+          <p:nvPr/>
+        </p:nvSpPr>
+        <p:spPr>
+          <a:xfrm>
+            <a:off x="9906000" y="-1"/>
+            <a:ext cx="2286000" cy="2031325"/>
+          </a:xfrm>
+          <a:prstGeom prst="rect">
+            <a:avLst/>
+          </a:prstGeom>
+          <a:solidFill>
+            <a:srgbClr val="FFFF00"/>
+          </a:solidFill>
+          <a:ln>
+            <a:noFill/>
+          </a:ln>
+        </p:spPr>
+        <p:txBody>
+          <a:bodyPr wrap="square" rtlCol="0">
+            <a:spAutoFit/>
+          </a:bodyPr>
+          <a:lstStyle/>
+          <a:p>
+            <a:pPr algn="ctr"/>
+            <a:endParaRPr lang="en-US" dirty="0" smtClean="0"/>
+          </a:p>
+          <a:p>
+            <a:pPr algn="ctr"/>
+            <a:endParaRPr lang="en-US" dirty="0"/>
+          </a:p>
+          <a:p>
+            <a:pPr algn="ctr"/>
+            <a:r>
+              <a:rPr lang="en-US" dirty="0" smtClean="0"/>
+              <a:t>Please leave this area blank to allow for picture in picture recording</a:t>
+            </a:r>
+          </a:p>
+          <a:p>
+            <a:pPr algn="ctr"/>
+            <a:endParaRPr lang="en-US" dirty="0"/>
+          </a:p>
+        </p:txBody>
+      </p:sp>
+      <p:sp>
+        <p:nvSpPr>
+          <p:cNvPr id="8" name="Rectangle 7"/>
+          <p:cNvSpPr/>
+          <p:nvPr/>
+        </p:nvSpPr>
+        <p:spPr>
+          <a:xfrm>
+            <a:off x="0" y="6627168"/>
+            <a:ext cx="6505899" cy="230832"/>
+          </a:xfrm>
+          <a:prstGeom prst="rect">
+            <a:avLst/>
+          </a:prstGeom>
+        </p:spPr>
+        <p:txBody>
+          <a:bodyPr wrap="square">
+            <a:spAutoFit/>
+          </a:bodyPr>
+          <a:lstStyle/>
+          <a:p>
+            <a:r>
+              <a:rPr lang="en-US" sz="900" dirty="0"/>
+              <a:t>http://bmj2k.com/2013/06/21/imponderable-98-lomza-poland/</a:t>
+            </a:r>
+          </a:p>
+        </p:txBody>
+      </p:sp>
+      <p:sp>
+        <p:nvSpPr>
+          <p:cNvPr id="3" name="Rectangle 2"/>
+          <p:cNvSpPr/>
+          <p:nvPr/>
+        </p:nvSpPr>
+        <p:spPr>
+          <a:xfrm>
+            <a:off x="4242062" y="1451728"/>
+            <a:ext cx="3770722" cy="3779354"/>
+          </a:xfrm>
+          <a:prstGeom prst="rect">
+            <a:avLst/>
+          </a:prstGeom>
+          <a:noFill/>
+        </p:spPr>
+        <p:style>
+          <a:lnRef idx="2">
+            <a:schemeClr val="accent1">
+              <a:shade val="50000"/>
+            </a:schemeClr>
+          </a:lnRef>
+          <a:fillRef idx="1">
+            <a:schemeClr val="accent1"/>
+          </a:fillRef>
+          <a:effectRef idx="0">
+            <a:schemeClr val="accent1"/>
+          </a:effectRef>
+          <a:fontRef idx="minor">
+            <a:schemeClr val="lt1"/>
+          </a:fontRef>
+        </p:style>
+        <p:txBody>
+          <a:bodyPr rtlCol="0" anchor="ctr"/>
+          <a:lstStyle/>
+          <a:p>
+            <a:pPr algn="ctr"/>
+            <a:endParaRPr lang="en-US"/>
+          </a:p>
+        </p:txBody>
+      </p:sp>
+      <p:sp>
+        <p:nvSpPr>
+          <p:cNvPr id="9" name="TextBox 8"/>
+          <p:cNvSpPr txBox="1"/>
+          <p:nvPr/>
+        </p:nvSpPr>
+        <p:spPr>
+          <a:xfrm>
+            <a:off x="5382705" y="1427918"/>
+            <a:ext cx="2507530" cy="3939540"/>
+          </a:xfrm>
+          <a:prstGeom prst="rect">
+            <a:avLst/>
+          </a:prstGeom>
+          <a:noFill/>
+        </p:spPr>
+        <p:txBody>
+          <a:bodyPr wrap="square" rtlCol="0">
+            <a:spAutoFit/>
+          </a:bodyPr>
+          <a:lstStyle/>
+          <a:p>
+            <a:r>
+              <a:rPr lang="en-US" sz="25000" dirty="0" smtClean="0"/>
+              <a:t>?</a:t>
+            </a:r>
+            <a:endParaRPr lang="en-US" sz="25000" dirty="0"/>
+          </a:p>
+        </p:txBody>
+      </p:sp>
+    </p:spTree>
+    <p:extLst>
+      <p:ext uri="{BB962C8B-B14F-4D97-AF65-F5344CB8AC3E}">
+        <p14:creationId xmlns:p14="http://schemas.microsoft.com/office/powerpoint/2010/main" val="3361086949"/>
+      </p:ext>
+    </p:extLst>
+  </p:cSld>
+  <p:clrMapOvr>
+    <a:masterClrMapping/>
+  </p:clrMapOvr>
+  <p:timing>
+    <p:tnLst>
+      <p:par>
+        <p:cTn id="1" dur="indefinite" restart="never" nodeType="tmRoot">
+          <p:childTnLst>
+            <p:seq concurrent="1" nextAc="seek">
+              <p:cTn id="2" dur="indefinite" nodeType="mainSeq">
+                <p:childTnLst>
+                  <p:par>
+                    <p:cTn id="3" fill="hold">
+                      <p:stCondLst>
+                        <p:cond delay="indefinite"/>
+                      </p:stCondLst>
+                      <p:childTnLst>
+                        <p:par>
+                          <p:cTn id="4" fill="hold">
+                            <p:stCondLst>
+                              <p:cond delay="0"/>
+                            </p:stCondLst>
+                            <p:childTnLst>
+                              <p:par>
+                                <p:cTn id="5" presetID="42" presetClass="entr" presetSubtype="0" fill="hold" nodeType="clickEffect">
+                                  <p:stCondLst>
+                                    <p:cond delay="0"/>
+                                  </p:stCondLst>
+                                  <p:childTnLst>
+                                    <p:set>
+                                      <p:cBhvr>
+                                        <p:cTn id="6" dur="1" fill="hold">
+                                          <p:stCondLst>
+                                            <p:cond delay="0"/>
+                                          </p:stCondLst>
+                                        </p:cTn>
+                                        <p:tgtEl>
+                                          <p:spTgt spid="5"/>
+                                        </p:tgtEl>
+                                        <p:attrNameLst>
+                                          <p:attrName>style.visibility</p:attrName>
+                                        </p:attrNameLst>
+                                      </p:cBhvr>
+                                      <p:to>
+                                        <p:strVal val="visible"/>
+                                      </p:to>
+                                    </p:set>
+                                    <p:animEffect transition="in" filter="fade">
+                                      <p:cBhvr>
+                                        <p:cTn id="7" dur="1000"/>
+                                        <p:tgtEl>
+                                          <p:spTgt spid="5"/>
+                                        </p:tgtEl>
+                                      </p:cBhvr>
+                                    </p:animEffect>
+                                    <p:anim calcmode="lin" valueType="num">
+                                      <p:cBhvr>
+                                        <p:cTn id="8" dur="1000" fill="hold"/>
+                                        <p:tgtEl>
+                                          <p:spTgt spid="5"/>
+                                        </p:tgtEl>
+                                        <p:attrNameLst>
+                                          <p:attrName>ppt_x</p:attrName>
+                                        </p:attrNameLst>
+                                      </p:cBhvr>
+                                      <p:tavLst>
+                                        <p:tav tm="0">
+                                          <p:val>
+                                            <p:strVal val="#ppt_x"/>
+                                          </p:val>
+                                        </p:tav>
+                                        <p:tav tm="100000">
+                                          <p:val>
+                                            <p:strVal val="#ppt_x"/>
+                                          </p:val>
+                                        </p:tav>
+                                      </p:tavLst>
+                                    </p:anim>
+                                    <p:anim calcmode="lin" valueType="num">
+                                      <p:cBhvr>
+                                        <p:cTn id="9" dur="1000" fill="hold"/>
+                                        <p:tgtEl>
+                                          <p:spTgt spid="5"/>
+                                        </p:tgtEl>
+                                        <p:attrNameLst>
+                                          <p:attrName>ppt_y</p:attrName>
+                                        </p:attrNameLst>
+                                      </p:cBhvr>
+                                      <p:tavLst>
+                                        <p:tav tm="0">
+                                          <p:val>
+                                            <p:strVal val="#ppt_y+.1"/>
+                                          </p:val>
+                                        </p:tav>
+                                        <p:tav tm="100000">
+                                          <p:val>
+                                            <p:strVal val="#ppt_y"/>
+                                          </p:val>
+                                        </p:tav>
+                                      </p:tavLst>
+                                    </p:anim>
+                                  </p:childTnLst>
+                                </p:cTn>
+                              </p:par>
+                            </p:childTnLst>
+                          </p:cTn>
+                        </p:par>
+                      </p:childTnLst>
+                    </p:cTn>
+                  </p:par>
+                </p:childTnLst>
+              </p:cTn>
+              <p:prevCondLst>
+                <p:cond evt="onPrev" delay="0">
+                  <p:tgtEl>
+                    <p:sldTgt/>
+                  </p:tgtEl>
+                </p:cond>
+              </p:prevCondLst>
+              <p:nextCondLst>
+                <p:cond evt="onNext" delay="0">
+                  <p:tgtEl>
+                    <p:sldTgt/>
+                  </p:tgtEl>
+                </p:cond>
+              </p:nextCondLst>
+            </p:seq>
+          </p:childTnLst>
+        </p:cTn>
+      </p:par>
+    </p:tnLst>
+  </p:timing>
+</p:sld>
+</file>
+
+<file path=ppt/slides/slide38.xml><?xml version="1.0" encoding="utf-8"?>
+<p:sld xmlns:a="http://schemas.openxmlformats.org/drawingml/2006/main" xmlns:r="http://schemas.openxmlformats.org/officeDocument/2006/relationships" xmlns:p="http://schemas.openxmlformats.org/presentationml/2006/main">
+  <p:cSld>
+    <p:spTree>
+      <p:nvGrpSpPr>
+        <p:cNvPr id="1" name=""/>
+        <p:cNvGrpSpPr/>
+        <p:nvPr/>
+      </p:nvGrpSpPr>
+      <p:grpSpPr>
+        <a:xfrm>
+          <a:off x="0" y="0"/>
+          <a:ext cx="0" cy="0"/>
+          <a:chOff x="0" y="0"/>
+          <a:chExt cx="0" cy="0"/>
+        </a:xfrm>
+      </p:grpSpPr>
+    </p:spTree>
+    <p:extLst>
+      <p:ext uri="{BB962C8B-B14F-4D97-AF65-F5344CB8AC3E}">
+        <p14:creationId xmlns:p14="http://schemas.microsoft.com/office/powerpoint/2010/main" val="898363405"/>
+      </p:ext>
+    </p:extLst>
+  </p:cSld>
+  <p:clrMapOvr>
+    <a:masterClrMapping/>
+  </p:clrMapOvr>
+  <p:timing>
+    <p:tnLst>
+      <p:par>
+        <p:cTn id="1" dur="indefinite" restart="never" nodeType="tmRoot"/>
       </p:par>
     </p:tnLst>
   </p:timing>
@@ -8577,11 +11153,7 @@
             <a:pPr lvl="1"/>
             <a:r>
               <a:rPr lang="en-US" dirty="0" smtClean="0"/>
-              <a:t>Difficult to scale</a:t>
-            </a:r>
-            <a:r>
-              <a:rPr lang="en-US" dirty="0" smtClean="0"/>
-              <a:t> </a:t>
+              <a:t>Difficult to scale </a:t>
             </a:r>
             <a:endParaRPr lang="en-US" dirty="0"/>
           </a:p>
@@ -8651,7 +11223,7 @@
   <p:timing>
     <p:tnLst>
       <p:par>
-        <p:cTn xmlns:p14="http://schemas.microsoft.com/office/powerpoint/2010/main" id="1" dur="indefinite" restart="never" nodeType="tmRoot"/>
+        <p:cTn id="1" dur="indefinite" restart="never" nodeType="tmRoot"/>
       </p:par>
     </p:tnLst>
   </p:timing>
@@ -8807,7 +11379,7 @@
   <p:timing>
     <p:tnLst>
       <p:par>
-        <p:cTn xmlns:p14="http://schemas.microsoft.com/office/powerpoint/2010/main" id="1" dur="indefinite" restart="never" nodeType="tmRoot"/>
+        <p:cTn id="1" dur="indefinite" restart="never" nodeType="tmRoot"/>
       </p:par>
     </p:tnLst>
   </p:timing>
@@ -9033,7 +11605,7 @@
   <p:timing>
     <p:tnLst>
       <p:par>
-        <p:cTn xmlns:p14="http://schemas.microsoft.com/office/powerpoint/2010/main" id="1" dur="indefinite" restart="never" nodeType="tmRoot"/>
+        <p:cTn id="1" dur="indefinite" restart="never" nodeType="tmRoot"/>
       </p:par>
     </p:tnLst>
   </p:timing>
@@ -9178,7 +11750,7 @@
   <p:timing>
     <p:tnLst>
       <p:par>
-        <p:cTn xmlns:p14="http://schemas.microsoft.com/office/powerpoint/2010/main" id="1" dur="indefinite" restart="never" nodeType="tmRoot"/>
+        <p:cTn id="1" dur="indefinite" restart="never" nodeType="tmRoot"/>
       </p:par>
     </p:tnLst>
   </p:timing>
@@ -9366,7 +11938,7 @@
   <p:timing>
     <p:tnLst>
       <p:par>
-        <p:cTn xmlns:p14="http://schemas.microsoft.com/office/powerpoint/2010/main" id="1" dur="indefinite" restart="never" nodeType="tmRoot"/>
+        <p:cTn id="1" dur="indefinite" restart="never" nodeType="tmRoot"/>
       </p:par>
     </p:tnLst>
   </p:timing>
@@ -9536,7 +12108,7 @@
   <p:timing>
     <p:tnLst>
       <p:par>
-        <p:cTn xmlns:p14="http://schemas.microsoft.com/office/powerpoint/2010/main" id="1" dur="indefinite" restart="never" nodeType="tmRoot"/>
+        <p:cTn id="1" dur="indefinite" restart="never" nodeType="tmRoot"/>
       </p:par>
     </p:tnLst>
   </p:timing>
@@ -10083,7 +12655,7 @@
   <a:extraClrSchemeLst/>
   <a:extLst>
     <a:ext uri="{05A4C25C-085E-4340-85A3-A5531E510DB2}">
-      <thm15:themeFamily xmlns:thm15="http://schemas.microsoft.com/office/thememl/2012/main" xmlns="" name="Office Theme" id="{62F939B6-93AF-4DB8-9C6B-D6C7DFDC589F}" vid="{4A3C46E8-61CC-4603-A589-7422A47A8E4A}"/>
+      <thm15:themeFamily xmlns:thm15="http://schemas.microsoft.com/office/thememl/2012/main" name="Office Theme" id="{62F939B6-93AF-4DB8-9C6B-D6C7DFDC589F}" vid="{4A3C46E8-61CC-4603-A589-7422A47A8E4A}"/>
     </a:ext>
   </a:extLst>
 </a:theme>
@@ -10344,13 +12916,65 @@
   <a:extraClrSchemeLst/>
   <a:extLst>
     <a:ext uri="{05A4C25C-085E-4340-85A3-A5531E510DB2}">
-      <thm15:themeFamily xmlns:thm15="http://schemas.microsoft.com/office/thememl/2012/main" xmlns="" name="Office Theme" id="{62F939B6-93AF-4DB8-9C6B-D6C7DFDC589F}" vid="{4A3C46E8-61CC-4603-A589-7422A47A8E4A}"/>
+      <thm15:themeFamily xmlns:thm15="http://schemas.microsoft.com/office/thememl/2012/main" name="Office Theme" id="{62F939B6-93AF-4DB8-9C6B-D6C7DFDC589F}" vid="{4A3C46E8-61CC-4603-A589-7422A47A8E4A}"/>
     </a:ext>
   </a:extLst>
 </a:theme>
 </file>
 
 <file path=customXml/item1.xml><?xml version="1.0" encoding="utf-8"?>
+<p:properties xmlns:p="http://schemas.microsoft.com/office/2006/metadata/properties" xmlns:xsi="http://www.w3.org/2001/XMLSchema-instance" xmlns:pc="http://schemas.microsoft.com/office/infopath/2007/PartnerControls">
+  <documentManagement>
+    <TaxCatchAll xmlns="230e9df3-be65-4c73-a93b-d1236ebd677e"/>
+    <PublishingExpirationDate xmlns="http://schemas.microsoft.com/sharepoint/v3" xsi:nil="true"/>
+    <PublishingStartDate xmlns="http://schemas.microsoft.com/sharepoint/v3" xsi:nil="true"/>
+    <TaxKeywordTaxHTField xmlns="230e9df3-be65-4c73-a93b-d1236ebd677e">
+      <Terms xmlns="http://schemas.microsoft.com/office/infopath/2007/PartnerControls"/>
+    </TaxKeywordTaxHTField>
+    <SharedWithUsers xmlns="27aa9422-7f1f-4c84-9cdf-302b1a67e513">
+      <UserInfo>
+        <DisplayName>Shriram Natarajan (SHRI)</DisplayName>
+        <AccountId>3899</AccountId>
+        <AccountType/>
+      </UserInfo>
+      <UserInfo>
+        <DisplayName>Andrew Nickels</DisplayName>
+        <AccountId>24014</AccountId>
+        <AccountType/>
+      </UserInfo>
+      <UserInfo>
+        <DisplayName>Steven Goddard (WSSC)</DisplayName>
+        <AccountId>29711</AccountId>
+        <AccountType/>
+      </UserInfo>
+      <UserInfo>
+        <DisplayName>Jim Clark (LEARNING)</DisplayName>
+        <AccountId>86</AccountId>
+        <AccountType/>
+      </UserInfo>
+      <UserInfo>
+        <DisplayName>Vijay Kumar</DisplayName>
+        <AccountId>53758</AccountId>
+        <AccountType/>
+      </UserInfo>
+    </SharedWithUsers>
+    <SharingHintHash xmlns="27aa9422-7f1f-4c84-9cdf-302b1a67e513">1366665793</SharingHintHash>
+    <_ip_UnifiedCompliancePolicyUIAction xmlns="http://schemas.microsoft.com/sharepoint/v3" xsi:nil="true"/>
+    <_ip_UnifiedCompliancePolicyProperties xmlns="http://schemas.microsoft.com/sharepoint/v3" xsi:nil="true"/>
+  </documentManagement>
+</p:properties>
+</file>
+
+<file path=customXml/item2.xml><?xml version="1.0" encoding="utf-8"?>
+<?mso-contentType ?>
+<FormTemplates xmlns="http://schemas.microsoft.com/sharepoint/v3/contenttype/forms">
+  <Display>DocumentLibraryForm</Display>
+  <Edit>DocumentLibraryForm</Edit>
+  <New>DocumentLibraryForm</New>
+</FormTemplates>
+</file>
+
+<file path=customXml/item3.xml><?xml version="1.0" encoding="utf-8"?>
 <ct:contentTypeSchema xmlns:ct="http://schemas.microsoft.com/office/2006/metadata/contentType" xmlns:ma="http://schemas.microsoft.com/office/2006/metadata/properties/metaAttributes" ct:_="" ma:_="" ma:contentTypeName="Document" ma:contentTypeID="0x010100496889825850D44592AC5D2F43187AE4" ma:contentTypeVersion="9" ma:contentTypeDescription="Create a new document." ma:contentTypeScope="" ma:versionID="fa7e7aa81c9af57d0e724452ff5695cd">
   <xsd:schema xmlns:xsd="http://www.w3.org/2001/XMLSchema" xmlns:xs="http://www.w3.org/2001/XMLSchema" xmlns:p="http://schemas.microsoft.com/office/2006/metadata/properties" xmlns:ns1="http://schemas.microsoft.com/sharepoint/v3" xmlns:ns2="230e9df3-be65-4c73-a93b-d1236ebd677e" xmlns:ns3="27aa9422-7f1f-4c84-9cdf-302b1a67e513" targetNamespace="http://schemas.microsoft.com/office/2006/metadata/properties" ma:root="true" ma:fieldsID="ef7d28e69d816f0a5e355ee49f463c96" ns1:_="" ns2:_="" ns3:_="">
     <xsd:import namespace="http://schemas.microsoft.com/sharepoint/v3"/>
@@ -10558,59 +13182,27 @@
 </ct:contentTypeSchema>
 </file>
 
-<file path=customXml/item2.xml><?xml version="1.0" encoding="utf-8"?>
-<?mso-contentType ?>
-<FormTemplates xmlns="http://schemas.microsoft.com/sharepoint/v3/contenttype/forms">
-  <Display>DocumentLibraryForm</Display>
-  <Edit>DocumentLibraryForm</Edit>
-  <New>DocumentLibraryForm</New>
-</FormTemplates>
+<file path=customXml/itemProps1.xml><?xml version="1.0" encoding="utf-8"?>
+<ds:datastoreItem xmlns:ds="http://schemas.openxmlformats.org/officeDocument/2006/customXml" ds:itemID="{7025FDD9-4C58-4084-9F89-0E6ADD6FFF55}">
+  <ds:schemaRefs>
+    <ds:schemaRef ds:uri="http://schemas.microsoft.com/office/2006/metadata/properties"/>
+    <ds:schemaRef ds:uri="http://schemas.microsoft.com/office/infopath/2007/PartnerControls"/>
+    <ds:schemaRef ds:uri="230e9df3-be65-4c73-a93b-d1236ebd677e"/>
+    <ds:schemaRef ds:uri="http://schemas.microsoft.com/sharepoint/v3"/>
+    <ds:schemaRef ds:uri="27aa9422-7f1f-4c84-9cdf-302b1a67e513"/>
+  </ds:schemaRefs>
+</ds:datastoreItem>
 </file>
 
-<file path=customXml/item3.xml><?xml version="1.0" encoding="utf-8"?>
-<p:properties xmlns:p="http://schemas.microsoft.com/office/2006/metadata/properties" xmlns:xsi="http://www.w3.org/2001/XMLSchema-instance" xmlns:pc="http://schemas.microsoft.com/office/infopath/2007/PartnerControls">
-  <documentManagement>
-    <TaxCatchAll xmlns="230e9df3-be65-4c73-a93b-d1236ebd677e"/>
-    <PublishingExpirationDate xmlns="http://schemas.microsoft.com/sharepoint/v3" xsi:nil="true"/>
-    <PublishingStartDate xmlns="http://schemas.microsoft.com/sharepoint/v3" xsi:nil="true"/>
-    <TaxKeywordTaxHTField xmlns="230e9df3-be65-4c73-a93b-d1236ebd677e">
-      <Terms xmlns="http://schemas.microsoft.com/office/infopath/2007/PartnerControls"/>
-    </TaxKeywordTaxHTField>
-    <SharedWithUsers xmlns="27aa9422-7f1f-4c84-9cdf-302b1a67e513">
-      <UserInfo>
-        <DisplayName>Shriram Natarajan (SHRI)</DisplayName>
-        <AccountId>3899</AccountId>
-        <AccountType/>
-      </UserInfo>
-      <UserInfo>
-        <DisplayName>Andrew Nickels</DisplayName>
-        <AccountId>24014</AccountId>
-        <AccountType/>
-      </UserInfo>
-      <UserInfo>
-        <DisplayName>Steven Goddard (WSSC)</DisplayName>
-        <AccountId>29711</AccountId>
-        <AccountType/>
-      </UserInfo>
-      <UserInfo>
-        <DisplayName>Jim Clark (LEARNING)</DisplayName>
-        <AccountId>86</AccountId>
-        <AccountType/>
-      </UserInfo>
-      <UserInfo>
-        <DisplayName>Vijay Kumar</DisplayName>
-        <AccountId>53758</AccountId>
-        <AccountType/>
-      </UserInfo>
-    </SharedWithUsers>
-    <SharingHintHash xmlns="27aa9422-7f1f-4c84-9cdf-302b1a67e513">1366665793</SharingHintHash>
-    <_ip_UnifiedCompliancePolicyUIAction xmlns="http://schemas.microsoft.com/sharepoint/v3" xsi:nil="true"/>
-    <_ip_UnifiedCompliancePolicyProperties xmlns="http://schemas.microsoft.com/sharepoint/v3" xsi:nil="true"/>
-  </documentManagement>
-</p:properties>
+<file path=customXml/itemProps2.xml><?xml version="1.0" encoding="utf-8"?>
+<ds:datastoreItem xmlns:ds="http://schemas.openxmlformats.org/officeDocument/2006/customXml" ds:itemID="{B0CA13EC-1D3C-4D6F-8D1C-E8A452CFC79A}">
+  <ds:schemaRefs>
+    <ds:schemaRef ds:uri="http://schemas.microsoft.com/sharepoint/v3/contenttype/forms"/>
+  </ds:schemaRefs>
+</ds:datastoreItem>
 </file>
 
-<file path=customXml/itemProps1.xml><?xml version="1.0" encoding="utf-8"?>
+<file path=customXml/itemProps3.xml><?xml version="1.0" encoding="utf-8"?>
 <ds:datastoreItem xmlns:ds="http://schemas.openxmlformats.org/officeDocument/2006/customXml" ds:itemID="{B8E57EAE-DEC5-48ED-98EA-03E186D6E9F9}">
   <ds:schemaRefs>
     <ds:schemaRef ds:uri="http://schemas.microsoft.com/office/2006/metadata/contentType"/>
@@ -10628,24 +13220,4 @@
     <ds:schemaRef ds:uri="http://schemas.microsoft.com/internal/obd"/>
   </ds:schemaRefs>
 </ds:datastoreItem>
-</file>
-
-<file path=customXml/itemProps2.xml><?xml version="1.0" encoding="utf-8"?>
-<ds:datastoreItem xmlns:ds="http://schemas.openxmlformats.org/officeDocument/2006/customXml" ds:itemID="{B0CA13EC-1D3C-4D6F-8D1C-E8A452CFC79A}">
-  <ds:schemaRefs>
-    <ds:schemaRef ds:uri="http://schemas.microsoft.com/sharepoint/v3/contenttype/forms"/>
-  </ds:schemaRefs>
-</ds:datastoreItem>
-</file>
-
-<file path=customXml/itemProps3.xml><?xml version="1.0" encoding="utf-8"?>
-<ds:datastoreItem xmlns:ds="http://schemas.openxmlformats.org/officeDocument/2006/customXml" ds:itemID="{7025FDD9-4C58-4084-9F89-0E6ADD6FFF55}">
-  <ds:schemaRefs>
-    <ds:schemaRef ds:uri="http://schemas.microsoft.com/office/2006/metadata/properties"/>
-    <ds:schemaRef ds:uri="http://schemas.microsoft.com/office/infopath/2007/PartnerControls"/>
-    <ds:schemaRef ds:uri="230e9df3-be65-4c73-a93b-d1236ebd677e"/>
-    <ds:schemaRef ds:uri="http://schemas.microsoft.com/sharepoint/v3"/>
-    <ds:schemaRef ds:uri="27aa9422-7f1f-4c84-9cdf-302b1a67e513"/>
-  </ds:schemaRefs>
-</ds:datastoreItem>
 </file>
</xml_diff>

<commit_message>
Add start of presenation for batch
</commit_message>
<xml_diff>
--- a/presentations/02 - Application Architecture.pptx
+++ b/presentations/02 - Application Architecture.pptx
@@ -13185,11 +13185,17 @@
 <file path=customXml/itemProps1.xml><?xml version="1.0" encoding="utf-8"?>
 <ds:datastoreItem xmlns:ds="http://schemas.openxmlformats.org/officeDocument/2006/customXml" ds:itemID="{7025FDD9-4C58-4084-9F89-0E6ADD6FFF55}">
   <ds:schemaRefs>
+    <ds:schemaRef ds:uri="http://purl.org/dc/elements/1.1/"/>
     <ds:schemaRef ds:uri="http://schemas.microsoft.com/office/2006/metadata/properties"/>
+    <ds:schemaRef ds:uri="http://www.w3.org/XML/1998/namespace"/>
+    <ds:schemaRef ds:uri="http://purl.org/dc/terms/"/>
+    <ds:schemaRef ds:uri="230e9df3-be65-4c73-a93b-d1236ebd677e"/>
+    <ds:schemaRef ds:uri="http://schemas.microsoft.com/office/2006/documentManagement/types"/>
     <ds:schemaRef ds:uri="http://schemas.microsoft.com/office/infopath/2007/PartnerControls"/>
-    <ds:schemaRef ds:uri="230e9df3-be65-4c73-a93b-d1236ebd677e"/>
+    <ds:schemaRef ds:uri="http://schemas.openxmlformats.org/package/2006/metadata/core-properties"/>
+    <ds:schemaRef ds:uri="27aa9422-7f1f-4c84-9cdf-302b1a67e513"/>
     <ds:schemaRef ds:uri="http://schemas.microsoft.com/sharepoint/v3"/>
-    <ds:schemaRef ds:uri="27aa9422-7f1f-4c84-9cdf-302b1a67e513"/>
+    <ds:schemaRef ds:uri="http://purl.org/dc/dcmitype/"/>
   </ds:schemaRefs>
 </ds:datastoreItem>
 </file>

</xml_diff>